<commit_message>
updated pdf file in Lecture 1
</commit_message>
<xml_diff>
--- a/Lecture_1/ABilandzic_PH8124_SS2020_0c.pptx
+++ b/Lecture_1/ABilandzic_PH8124_SS2020_0c.pptx
@@ -5,41 +5,42 @@
     <p:sldMasterId id="2147484288" r:id="rId1"/>
   </p:sldMasterIdLst>
   <p:notesMasterIdLst>
-    <p:notesMasterId r:id="rId31"/>
+    <p:notesMasterId r:id="rId32"/>
   </p:notesMasterIdLst>
   <p:handoutMasterIdLst>
-    <p:handoutMasterId r:id="rId32"/>
+    <p:handoutMasterId r:id="rId33"/>
   </p:handoutMasterIdLst>
   <p:sldIdLst>
     <p:sldId id="785" r:id="rId2"/>
     <p:sldId id="1160" r:id="rId3"/>
     <p:sldId id="1163" r:id="rId4"/>
-    <p:sldId id="1164" r:id="rId5"/>
-    <p:sldId id="1165" r:id="rId6"/>
-    <p:sldId id="1167" r:id="rId7"/>
-    <p:sldId id="1226" r:id="rId8"/>
-    <p:sldId id="1246" r:id="rId9"/>
-    <p:sldId id="1243" r:id="rId10"/>
-    <p:sldId id="1228" r:id="rId11"/>
-    <p:sldId id="1225" r:id="rId12"/>
-    <p:sldId id="1230" r:id="rId13"/>
-    <p:sldId id="1231" r:id="rId14"/>
-    <p:sldId id="1232" r:id="rId15"/>
-    <p:sldId id="1247" r:id="rId16"/>
-    <p:sldId id="1229" r:id="rId17"/>
-    <p:sldId id="1233" r:id="rId18"/>
-    <p:sldId id="1234" r:id="rId19"/>
-    <p:sldId id="1238" r:id="rId20"/>
-    <p:sldId id="1235" r:id="rId21"/>
-    <p:sldId id="1236" r:id="rId22"/>
-    <p:sldId id="1248" r:id="rId23"/>
-    <p:sldId id="1244" r:id="rId24"/>
-    <p:sldId id="1227" r:id="rId25"/>
-    <p:sldId id="1239" r:id="rId26"/>
-    <p:sldId id="1240" r:id="rId27"/>
-    <p:sldId id="1245" r:id="rId28"/>
-    <p:sldId id="1242" r:id="rId29"/>
-    <p:sldId id="1158" r:id="rId30"/>
+    <p:sldId id="1249" r:id="rId5"/>
+    <p:sldId id="1164" r:id="rId6"/>
+    <p:sldId id="1165" r:id="rId7"/>
+    <p:sldId id="1167" r:id="rId8"/>
+    <p:sldId id="1226" r:id="rId9"/>
+    <p:sldId id="1246" r:id="rId10"/>
+    <p:sldId id="1243" r:id="rId11"/>
+    <p:sldId id="1228" r:id="rId12"/>
+    <p:sldId id="1225" r:id="rId13"/>
+    <p:sldId id="1230" r:id="rId14"/>
+    <p:sldId id="1231" r:id="rId15"/>
+    <p:sldId id="1232" r:id="rId16"/>
+    <p:sldId id="1247" r:id="rId17"/>
+    <p:sldId id="1229" r:id="rId18"/>
+    <p:sldId id="1233" r:id="rId19"/>
+    <p:sldId id="1234" r:id="rId20"/>
+    <p:sldId id="1238" r:id="rId21"/>
+    <p:sldId id="1235" r:id="rId22"/>
+    <p:sldId id="1236" r:id="rId23"/>
+    <p:sldId id="1248" r:id="rId24"/>
+    <p:sldId id="1244" r:id="rId25"/>
+    <p:sldId id="1227" r:id="rId26"/>
+    <p:sldId id="1239" r:id="rId27"/>
+    <p:sldId id="1240" r:id="rId28"/>
+    <p:sldId id="1245" r:id="rId29"/>
+    <p:sldId id="1242" r:id="rId30"/>
+    <p:sldId id="1158" r:id="rId31"/>
   </p:sldIdLst>
   <p:sldSz cx="9144000" cy="6858000" type="screen4x3"/>
   <p:notesSz cx="6858000" cy="9144000"/>
@@ -332,7 +333,7 @@
           <a:p>
             <a:fld id="{F929CBCE-E64B-4074-AF48-7FACC033E4C9}" type="datetimeFigureOut">
               <a:rPr lang="en-US" smtClean="0"/>
-              <a:t>4/14/2020</a:t>
+              <a:t>4/16/2020</a:t>
             </a:fld>
             <a:endParaRPr lang="en-US"/>
           </a:p>
@@ -5479,13 +5480,8 @@
             </a:br>
             <a:r>
               <a:rPr lang="en-US" sz="2400" dirty="0" smtClean="0"/>
-              <a:t>Lecture 1, </a:t>
-            </a:r>
-            <a:r>
-              <a:rPr lang="en-US" sz="2400" dirty="0" smtClean="0"/>
-              <a:t>23.04.2020</a:t>
-            </a:r>
-            <a:endParaRPr lang="en-US" sz="2400" dirty="0" smtClean="0"/>
+              <a:t>Lecture 1, 23.04.2020</a:t>
+            </a:r>
           </a:p>
         </p:txBody>
       </p:sp>
@@ -5869,8 +5865,8 @@
         </p:nvSpPr>
         <p:spPr>
           <a:xfrm>
-            <a:off x="457200" y="2590800"/>
-            <a:ext cx="8229600" cy="1066800"/>
+            <a:off x="228600" y="381000"/>
+            <a:ext cx="8686800" cy="1066800"/>
           </a:xfrm>
         </p:spPr>
         <p:txBody>
@@ -5880,10 +5876,63 @@
           <a:lstStyle/>
           <a:p>
             <a:r>
-              <a:rPr lang="da-DK" b="1" dirty="0" smtClean="0"/>
-              <a:t>Introduction</a:t>
-            </a:r>
-            <a:endParaRPr lang="en-US" b="1" dirty="0"/>
+              <a:rPr lang="en-US" sz="3200" b="1" dirty="0" smtClean="0">
+                <a:effectLst/>
+              </a:rPr>
+              <a:t>Trivia</a:t>
+            </a:r>
+            <a:endParaRPr lang="en-US" sz="3200" dirty="0"/>
+          </a:p>
+        </p:txBody>
+      </p:sp>
+      <p:sp>
+        <p:nvSpPr>
+          <p:cNvPr id="3" name="Content Placeholder 2"/>
+          <p:cNvSpPr>
+            <a:spLocks noGrp="1"/>
+          </p:cNvSpPr>
+          <p:nvPr>
+            <p:ph idx="1"/>
+          </p:nvPr>
+        </p:nvSpPr>
+        <p:spPr>
+          <a:xfrm>
+            <a:off x="304800" y="1371600"/>
+            <a:ext cx="8686800" cy="4724400"/>
+          </a:xfrm>
+        </p:spPr>
+        <p:txBody>
+          <a:bodyPr>
+            <a:normAutofit/>
+          </a:bodyPr>
+          <a:lstStyle/>
+          <a:p>
+            <a:r>
+              <a:rPr lang="da-DK" dirty="0" smtClean="0"/>
+              <a:t>No lecture on: </a:t>
+            </a:r>
+          </a:p>
+          <a:p>
+            <a:pPr lvl="1"/>
+            <a:r>
+              <a:rPr lang="da-DK" dirty="0" smtClean="0">
+                <a:solidFill>
+                  <a:srgbClr val="FF0000"/>
+                </a:solidFill>
+              </a:rPr>
+              <a:t>May 21st – Ascension Day</a:t>
+            </a:r>
+          </a:p>
+          <a:p>
+            <a:pPr lvl="1"/>
+            <a:r>
+              <a:rPr lang="da-DK" dirty="0" smtClean="0">
+                <a:solidFill>
+                  <a:srgbClr val="FF0000"/>
+                </a:solidFill>
+              </a:rPr>
+              <a:t>June 11th – Corpus Christi</a:t>
+            </a:r>
           </a:p>
         </p:txBody>
       </p:sp>
@@ -5919,7 +5968,7 @@
     </p:spTree>
     <p:extLst>
       <p:ext uri="{BB962C8B-B14F-4D97-AF65-F5344CB8AC3E}">
-        <p14:creationId xmlns:p14="http://schemas.microsoft.com/office/powerpoint/2010/main" val="513966085"/>
+        <p14:creationId xmlns:p14="http://schemas.microsoft.com/office/powerpoint/2010/main" val="3925187551"/>
       </p:ext>
     </p:extLst>
   </p:cSld>
@@ -5965,8 +6014,8 @@
         </p:nvSpPr>
         <p:spPr>
           <a:xfrm>
-            <a:off x="228600" y="381000"/>
-            <a:ext cx="8686800" cy="1066800"/>
+            <a:off x="457200" y="2590800"/>
+            <a:ext cx="8229600" cy="1066800"/>
           </a:xfrm>
         </p:spPr>
         <p:txBody>
@@ -5976,40 +6025,10 @@
           <a:lstStyle/>
           <a:p>
             <a:r>
-              <a:rPr lang="da-DK" sz="3200" b="1" dirty="0" smtClean="0"/>
-              <a:t>Free advert (#1)</a:t>
-            </a:r>
-            <a:endParaRPr lang="en-US" sz="3200" dirty="0"/>
-          </a:p>
-        </p:txBody>
-      </p:sp>
-      <p:sp>
-        <p:nvSpPr>
-          <p:cNvPr id="3" name="Content Placeholder 2"/>
-          <p:cNvSpPr>
-            <a:spLocks noGrp="1"/>
-          </p:cNvSpPr>
-          <p:nvPr>
-            <p:ph idx="1"/>
-          </p:nvPr>
-        </p:nvSpPr>
-        <p:spPr>
-          <a:xfrm>
-            <a:off x="304800" y="1371600"/>
-            <a:ext cx="8686800" cy="990600"/>
-          </a:xfrm>
-        </p:spPr>
-        <p:txBody>
-          <a:bodyPr>
-            <a:normAutofit/>
-          </a:bodyPr>
-          <a:lstStyle/>
-          <a:p>
-            <a:r>
-              <a:rPr lang="en-GB" dirty="0" smtClean="0"/>
-              <a:t>Why Linux? Statistics for all desktop/laptop computers:</a:t>
-            </a:r>
-            <a:endParaRPr lang="en-GB" dirty="0"/>
+              <a:rPr lang="da-DK" b="1" dirty="0" smtClean="0"/>
+              <a:t>Introduction</a:t>
+            </a:r>
+            <a:endParaRPr lang="en-US" b="1" dirty="0"/>
           </a:p>
         </p:txBody>
       </p:sp>
@@ -6042,34 +6061,10 @@
           </a:p>
         </p:txBody>
       </p:sp>
-      <p:pic>
-        <p:nvPicPr>
-          <p:cNvPr id="5" name="Picture 4"/>
-          <p:cNvPicPr>
-            <a:picLocks noChangeAspect="1"/>
-          </p:cNvPicPr>
-          <p:nvPr/>
-        </p:nvPicPr>
-        <p:blipFill>
-          <a:blip r:embed="rId2"/>
-          <a:stretch>
-            <a:fillRect/>
-          </a:stretch>
-        </p:blipFill>
-        <p:spPr>
-          <a:xfrm>
-            <a:off x="362770" y="1981200"/>
-            <a:ext cx="8400230" cy="4048125"/>
-          </a:xfrm>
-          <a:prstGeom prst="rect">
-            <a:avLst/>
-          </a:prstGeom>
-        </p:spPr>
-      </p:pic>
     </p:spTree>
     <p:extLst>
       <p:ext uri="{BB962C8B-B14F-4D97-AF65-F5344CB8AC3E}">
-        <p14:creationId xmlns:p14="http://schemas.microsoft.com/office/powerpoint/2010/main" val="19200694"/>
+        <p14:creationId xmlns:p14="http://schemas.microsoft.com/office/powerpoint/2010/main" val="513966085"/>
       </p:ext>
     </p:extLst>
   </p:cSld>
@@ -6157,20 +6152,9 @@
           <a:p>
             <a:r>
               <a:rPr lang="en-GB" dirty="0" smtClean="0"/>
-              <a:t>Why </a:t>
-            </a:r>
-            <a:r>
-              <a:rPr lang="en-GB" dirty="0"/>
-              <a:t>Linux? Statistics for </a:t>
-            </a:r>
-            <a:r>
-              <a:rPr lang="en-GB" dirty="0" smtClean="0"/>
-              <a:t>supercomputers</a:t>
-            </a:r>
-            <a:r>
-              <a:rPr lang="en-GB" dirty="0"/>
-              <a:t>:</a:t>
-            </a:r>
+              <a:t>Why Linux? Statistics for all desktop/laptop computers:</a:t>
+            </a:r>
+            <a:endParaRPr lang="en-GB" dirty="0"/>
           </a:p>
         </p:txBody>
       </p:sp>
@@ -6219,8 +6203,8 @@
         </p:blipFill>
         <p:spPr>
           <a:xfrm>
-            <a:off x="737402" y="1828800"/>
-            <a:ext cx="7720798" cy="5029200"/>
+            <a:off x="362770" y="1981200"/>
+            <a:ext cx="8400230" cy="4048125"/>
           </a:xfrm>
           <a:prstGeom prst="rect">
             <a:avLst/>
@@ -6230,7 +6214,7 @@
     </p:spTree>
     <p:extLst>
       <p:ext uri="{BB962C8B-B14F-4D97-AF65-F5344CB8AC3E}">
-        <p14:creationId xmlns:p14="http://schemas.microsoft.com/office/powerpoint/2010/main" val="4196132013"/>
+        <p14:creationId xmlns:p14="http://schemas.microsoft.com/office/powerpoint/2010/main" val="19200694"/>
       </p:ext>
     </p:extLst>
   </p:cSld>
@@ -6307,7 +6291,7 @@
         <p:spPr>
           <a:xfrm>
             <a:off x="304800" y="1371600"/>
-            <a:ext cx="8686800" cy="2133600"/>
+            <a:ext cx="8686800" cy="990600"/>
           </a:xfrm>
         </p:spPr>
         <p:txBody>
@@ -6322,58 +6306,16 @@
             </a:r>
             <a:r>
               <a:rPr lang="en-GB" dirty="0"/>
-              <a:t>Linux? </a:t>
-            </a:r>
-            <a:endParaRPr lang="en-GB" dirty="0" smtClean="0"/>
-          </a:p>
-          <a:p>
+              <a:t>Linux? Statistics for </a:t>
+            </a:r>
+            <a:r>
+              <a:rPr lang="en-GB" dirty="0" smtClean="0"/>
+              <a:t>supercomputers</a:t>
+            </a:r>
             <a:r>
               <a:rPr lang="en-GB" dirty="0"/>
-              <a:t>Linux is by far the leading operating system in computers used in scientific </a:t>
-            </a:r>
-            <a:r>
-              <a:rPr lang="en-GB" dirty="0" smtClean="0"/>
-              <a:t>research (CERN, NASA, etc.)</a:t>
-            </a:r>
-          </a:p>
-          <a:p>
-            <a:r>
-              <a:rPr lang="en-GB" dirty="0"/>
-              <a:t>Developed </a:t>
-            </a:r>
-            <a:r>
-              <a:rPr lang="en-GB" dirty="0" smtClean="0"/>
-              <a:t>initially by </a:t>
-            </a:r>
-            <a:r>
-              <a:rPr lang="en-GB" dirty="0"/>
-              <a:t>Linus </a:t>
-            </a:r>
-            <a:r>
-              <a:rPr lang="en-GB" dirty="0" smtClean="0"/>
-              <a:t>Torvalds </a:t>
-            </a:r>
-            <a:r>
-              <a:rPr lang="en-GB" dirty="0" smtClean="0"/>
-              <a:t>in the </a:t>
-            </a:r>
-            <a:r>
-              <a:rPr lang="en-GB" dirty="0" smtClean="0"/>
-              <a:t>early </a:t>
-            </a:r>
-            <a:r>
-              <a:rPr lang="en-GB" dirty="0" smtClean="0"/>
-              <a:t>90s, and then by </a:t>
-            </a:r>
-            <a:r>
-              <a:rPr lang="en-GB" dirty="0"/>
-              <a:t>thousands of </a:t>
-            </a:r>
-            <a:r>
-              <a:rPr lang="en-GB" dirty="0" smtClean="0"/>
-              <a:t>collaborators afterwards</a:t>
-            </a:r>
-            <a:endParaRPr lang="en-GB" dirty="0"/>
+              <a:t>:</a:t>
+            </a:r>
           </a:p>
         </p:txBody>
       </p:sp>
@@ -6408,7 +6350,7 @@
       </p:sp>
       <p:pic>
         <p:nvPicPr>
-          <p:cNvPr id="6" name="Picture 5"/>
+          <p:cNvPr id="5" name="Picture 4"/>
           <p:cNvPicPr>
             <a:picLocks noChangeAspect="1"/>
           </p:cNvPicPr>
@@ -6422,83 +6364,18 @@
         </p:blipFill>
         <p:spPr>
           <a:xfrm>
-            <a:off x="961860" y="3352800"/>
-            <a:ext cx="2771940" cy="3392456"/>
+            <a:off x="737402" y="1828800"/>
+            <a:ext cx="7720798" cy="5029200"/>
           </a:xfrm>
           <a:prstGeom prst="rect">
             <a:avLst/>
           </a:prstGeom>
         </p:spPr>
       </p:pic>
-      <p:sp>
-        <p:nvSpPr>
-          <p:cNvPr id="12" name="Rectangle 11"/>
-          <p:cNvSpPr/>
-          <p:nvPr/>
-        </p:nvSpPr>
-        <p:spPr>
-          <a:xfrm>
-            <a:off x="3963182" y="4382869"/>
-            <a:ext cx="4572000" cy="646331"/>
-          </a:xfrm>
-          <a:prstGeom prst="rect">
-            <a:avLst/>
-          </a:prstGeom>
-        </p:spPr>
-        <p:txBody>
-          <a:bodyPr>
-            <a:spAutoFit/>
-          </a:bodyPr>
-          <a:lstStyle/>
-          <a:p>
-            <a:r>
-              <a:rPr lang="en-GB" dirty="0" smtClean="0">
-                <a:solidFill>
-                  <a:srgbClr val="222222"/>
-                </a:solidFill>
-                <a:effectLst/>
-                <a:latin typeface="Arial" panose="020B0604020202020204" pitchFamily="34" charset="0"/>
-              </a:rPr>
-              <a:t>Penguin named Tux </a:t>
-            </a:r>
-            <a:r>
-              <a:rPr lang="en-GB" dirty="0">
-                <a:solidFill>
-                  <a:srgbClr val="222222"/>
-                </a:solidFill>
-                <a:effectLst/>
-                <a:latin typeface="Arial" panose="020B0604020202020204" pitchFamily="34" charset="0"/>
-              </a:rPr>
-              <a:t>is the most commonly used </a:t>
-            </a:r>
-            <a:r>
-              <a:rPr lang="en-GB" dirty="0" smtClean="0">
-                <a:solidFill>
-                  <a:srgbClr val="222222"/>
-                </a:solidFill>
-                <a:effectLst/>
-                <a:latin typeface="Arial" panose="020B0604020202020204" pitchFamily="34" charset="0"/>
-              </a:rPr>
-              <a:t>logo </a:t>
-            </a:r>
-            <a:r>
-              <a:rPr lang="en-GB" dirty="0">
-                <a:solidFill>
-                  <a:srgbClr val="222222"/>
-                </a:solidFill>
-                <a:effectLst/>
-                <a:latin typeface="Arial" panose="020B0604020202020204" pitchFamily="34" charset="0"/>
-              </a:rPr>
-              <a:t>for Linux</a:t>
-            </a:r>
-            <a:endParaRPr lang="en-US" dirty="0"/>
-          </a:p>
-        </p:txBody>
-      </p:sp>
     </p:spTree>
     <p:extLst>
       <p:ext uri="{BB962C8B-B14F-4D97-AF65-F5344CB8AC3E}">
-        <p14:creationId xmlns:p14="http://schemas.microsoft.com/office/powerpoint/2010/main" val="391029610"/>
+        <p14:creationId xmlns:p14="http://schemas.microsoft.com/office/powerpoint/2010/main" val="4196132013"/>
       </p:ext>
     </p:extLst>
   </p:cSld>
@@ -6575,40 +6452,59 @@
         <p:spPr>
           <a:xfrm>
             <a:off x="304800" y="1371600"/>
-            <a:ext cx="8686800" cy="2286000"/>
+            <a:ext cx="8686800" cy="2133600"/>
           </a:xfrm>
         </p:spPr>
         <p:txBody>
           <a:bodyPr>
-            <a:normAutofit lnSpcReduction="10000"/>
+            <a:normAutofit/>
           </a:bodyPr>
           <a:lstStyle/>
           <a:p>
             <a:r>
               <a:rPr lang="en-GB" dirty="0" smtClean="0"/>
-              <a:t>Plethora of different Linux distributions (Ubuntu, Fedora, CentOS, Scientific Linux, </a:t>
-            </a:r>
-            <a:r>
-              <a:rPr lang="en-DE" dirty="0" smtClean="0"/>
-              <a:t>…</a:t>
+              <a:t>Why </a:t>
+            </a:r>
+            <a:r>
+              <a:rPr lang="en-GB" dirty="0"/>
+              <a:t>Linux? </a:t>
+            </a:r>
+            <a:endParaRPr lang="en-GB" dirty="0" smtClean="0"/>
+          </a:p>
+          <a:p>
+            <a:r>
+              <a:rPr lang="en-GB" dirty="0"/>
+              <a:t>Linux is by far the leading operating system in computers used in scientific </a:t>
             </a:r>
             <a:r>
               <a:rPr lang="en-GB" dirty="0" smtClean="0"/>
-              <a:t>)</a:t>
-            </a:r>
-          </a:p>
-          <a:p>
+              <a:t>research (CERN, NASA, etc.)</a:t>
+            </a:r>
+          </a:p>
+          <a:p>
+            <a:r>
+              <a:rPr lang="en-GB" dirty="0"/>
+              <a:t>Developed </a:t>
+            </a:r>
             <a:r>
               <a:rPr lang="en-GB" dirty="0" smtClean="0"/>
-              <a:t>The material presented in this course will be demonstrated on Ubuntu, but no worries... everything applies also to any other Linux distribution (as we are covering </a:t>
+              <a:t>initially by </a:t>
+            </a:r>
+            <a:r>
+              <a:rPr lang="en-GB" dirty="0"/>
+              <a:t>Linus </a:t>
             </a:r>
             <a:r>
               <a:rPr lang="en-GB" dirty="0" smtClean="0"/>
-              <a:t>only the </a:t>
+              <a:t>Torvalds in the early 90s, and then by </a:t>
+            </a:r>
+            <a:r>
+              <a:rPr lang="en-GB" dirty="0"/>
+              <a:t>thousands of </a:t>
             </a:r>
             <a:r>
               <a:rPr lang="en-GB" dirty="0" smtClean="0"/>
-              <a:t>core Linux  functionalities!)</a:t>
+              <a:t>collaborators afterwards</a:t>
             </a:r>
             <a:endParaRPr lang="en-GB" dirty="0"/>
           </a:p>
@@ -6645,49 +6541,97 @@
       </p:sp>
       <p:pic>
         <p:nvPicPr>
-          <p:cNvPr id="3074" name="Picture 2" descr="The Ubuntu logo"/>
+          <p:cNvPr id="6" name="Picture 5"/>
           <p:cNvPicPr>
-            <a:picLocks noChangeAspect="1" noChangeArrowheads="1"/>
+            <a:picLocks noChangeAspect="1"/>
           </p:cNvPicPr>
           <p:nvPr/>
         </p:nvPicPr>
         <p:blipFill>
-          <a:blip r:embed="rId2">
-            <a:extLst>
-              <a:ext uri="{28A0092B-C50C-407E-A947-70E740481C1C}">
-                <a14:useLocalDpi xmlns:a14="http://schemas.microsoft.com/office/drawing/2010/main" val="0"/>
-              </a:ext>
-            </a:extLst>
-          </a:blip>
-          <a:srcRect/>
+          <a:blip r:embed="rId2"/>
           <a:stretch>
             <a:fillRect/>
           </a:stretch>
         </p:blipFill>
-        <p:spPr bwMode="auto">
-          <a:xfrm>
-            <a:off x="2019300" y="3886200"/>
-            <a:ext cx="5143500" cy="2314575"/>
+        <p:spPr>
+          <a:xfrm>
+            <a:off x="961860" y="3352800"/>
+            <a:ext cx="2771940" cy="3392456"/>
           </a:xfrm>
           <a:prstGeom prst="rect">
             <a:avLst/>
           </a:prstGeom>
-          <a:noFill/>
-          <a:extLst>
-            <a:ext uri="{909E8E84-426E-40DD-AFC4-6F175D3DCCD1}">
-              <a14:hiddenFill xmlns:a14="http://schemas.microsoft.com/office/drawing/2010/main">
+        </p:spPr>
+      </p:pic>
+      <p:sp>
+        <p:nvSpPr>
+          <p:cNvPr id="12" name="Rectangle 11"/>
+          <p:cNvSpPr/>
+          <p:nvPr/>
+        </p:nvSpPr>
+        <p:spPr>
+          <a:xfrm>
+            <a:off x="3963182" y="4382869"/>
+            <a:ext cx="4572000" cy="646331"/>
+          </a:xfrm>
+          <a:prstGeom prst="rect">
+            <a:avLst/>
+          </a:prstGeom>
+        </p:spPr>
+        <p:txBody>
+          <a:bodyPr>
+            <a:spAutoFit/>
+          </a:bodyPr>
+          <a:lstStyle/>
+          <a:p>
+            <a:r>
+              <a:rPr lang="en-GB" dirty="0" smtClean="0">
                 <a:solidFill>
-                  <a:srgbClr val="FFFFFF"/>
+                  <a:srgbClr val="222222"/>
                 </a:solidFill>
-              </a14:hiddenFill>
-            </a:ext>
-          </a:extLst>
-        </p:spPr>
-      </p:pic>
+                <a:effectLst/>
+                <a:latin typeface="Arial" panose="020B0604020202020204" pitchFamily="34" charset="0"/>
+              </a:rPr>
+              <a:t>Penguin named Tux </a:t>
+            </a:r>
+            <a:r>
+              <a:rPr lang="en-GB" dirty="0">
+                <a:solidFill>
+                  <a:srgbClr val="222222"/>
+                </a:solidFill>
+                <a:effectLst/>
+                <a:latin typeface="Arial" panose="020B0604020202020204" pitchFamily="34" charset="0"/>
+              </a:rPr>
+              <a:t>is the most commonly used </a:t>
+            </a:r>
+            <a:r>
+              <a:rPr lang="en-GB" dirty="0" smtClean="0">
+                <a:solidFill>
+                  <a:srgbClr val="222222"/>
+                </a:solidFill>
+                <a:effectLst/>
+                <a:latin typeface="Arial" panose="020B0604020202020204" pitchFamily="34" charset="0"/>
+              </a:rPr>
+              <a:t>logo </a:t>
+            </a:r>
+            <a:r>
+              <a:rPr lang="en-GB" dirty="0">
+                <a:solidFill>
+                  <a:srgbClr val="222222"/>
+                </a:solidFill>
+                <a:effectLst/>
+                <a:latin typeface="Arial" panose="020B0604020202020204" pitchFamily="34" charset="0"/>
+              </a:rPr>
+              <a:t>for Linux</a:t>
+            </a:r>
+            <a:endParaRPr lang="en-US" dirty="0"/>
+          </a:p>
+        </p:txBody>
+      </p:sp>
     </p:spTree>
     <p:extLst>
       <p:ext uri="{BB962C8B-B14F-4D97-AF65-F5344CB8AC3E}">
-        <p14:creationId xmlns:p14="http://schemas.microsoft.com/office/powerpoint/2010/main" val="2652951255"/>
+        <p14:creationId xmlns:p14="http://schemas.microsoft.com/office/powerpoint/2010/main" val="391029610"/>
       </p:ext>
     </p:extLst>
   </p:cSld>
@@ -6745,7 +6689,7 @@
           <a:p>
             <a:r>
               <a:rPr lang="da-DK" sz="3200" b="1" dirty="0" smtClean="0"/>
-              <a:t>Getting Ubuntu for Windows users</a:t>
+              <a:t>Free advert (#1)</a:t>
             </a:r>
             <a:endParaRPr lang="en-US" sz="3200" dirty="0"/>
           </a:p>
@@ -6769,51 +6713,29 @@
         </p:spPr>
         <p:txBody>
           <a:bodyPr>
-            <a:normAutofit/>
+            <a:normAutofit lnSpcReduction="10000"/>
           </a:bodyPr>
           <a:lstStyle/>
           <a:p>
             <a:r>
               <a:rPr lang="en-GB" dirty="0" smtClean="0"/>
-              <a:t>If you hav</a:t>
+              <a:t>Plethora of different Linux distributions (Ubuntu, Fedora, CentOS, Scientific Linux, </a:t>
+            </a:r>
+            <a:r>
+              <a:rPr lang="en-DE" dirty="0" smtClean="0"/>
+              <a:t>…</a:t>
             </a:r>
             <a:r>
               <a:rPr lang="en-GB" dirty="0" smtClean="0"/>
-              <a:t>e on your laptop only Windows, you could either:</a:t>
-            </a:r>
-          </a:p>
-          <a:p>
-            <a:pPr lvl="1"/>
-            <a:r>
-              <a:rPr lang="en-GB" dirty="0"/>
-              <a:t>install Ubuntu </a:t>
-            </a:r>
+              <a:t>)</a:t>
+            </a:r>
+          </a:p>
+          <a:p>
             <a:r>
               <a:rPr lang="en-GB" dirty="0" smtClean="0"/>
-              <a:t>from the following link </a:t>
-            </a:r>
-          </a:p>
-          <a:p>
-            <a:pPr marL="411480" lvl="1" indent="0">
-              <a:buNone/>
-            </a:pPr>
-            <a:r>
-              <a:rPr lang="en-GB" sz="1050" dirty="0"/>
-              <a:t> </a:t>
-            </a:r>
-            <a:r>
-              <a:rPr lang="en-GB" sz="1050" dirty="0" smtClean="0"/>
-              <a:t>      </a:t>
-            </a:r>
-            <a:r>
-              <a:rPr lang="en-GB" sz="1600" dirty="0" smtClean="0"/>
-              <a:t>https</a:t>
-            </a:r>
-            <a:r>
-              <a:rPr lang="en-GB" sz="1600" dirty="0"/>
-              <a:t>://www.microsoft.com/en-us/p/ubuntu/9nblggh4msv6?activetab=pivot:overviewtab</a:t>
-            </a:r>
-            <a:endParaRPr lang="en-GB" sz="1600" dirty="0"/>
+              <a:t>The material presented in this course will be demonstrated on Ubuntu, but no worries... everything applies also to any other Linux distribution (as we are covering only the core Linux  functionalities!)</a:t>
+            </a:r>
+            <a:endParaRPr lang="en-GB" dirty="0"/>
           </a:p>
         </p:txBody>
       </p:sp>
@@ -6841,6 +6763,204 @@
                 <a:defRPr/>
               </a:pPr>
               <a:t>15</a:t>
+            </a:fld>
+            <a:endParaRPr lang="en-US" dirty="0"/>
+          </a:p>
+        </p:txBody>
+      </p:sp>
+      <p:pic>
+        <p:nvPicPr>
+          <p:cNvPr id="3074" name="Picture 2" descr="The Ubuntu logo"/>
+          <p:cNvPicPr>
+            <a:picLocks noChangeAspect="1" noChangeArrowheads="1"/>
+          </p:cNvPicPr>
+          <p:nvPr/>
+        </p:nvPicPr>
+        <p:blipFill>
+          <a:blip r:embed="rId2">
+            <a:extLst>
+              <a:ext uri="{28A0092B-C50C-407E-A947-70E740481C1C}">
+                <a14:useLocalDpi xmlns:a14="http://schemas.microsoft.com/office/drawing/2010/main" val="0"/>
+              </a:ext>
+            </a:extLst>
+          </a:blip>
+          <a:srcRect/>
+          <a:stretch>
+            <a:fillRect/>
+          </a:stretch>
+        </p:blipFill>
+        <p:spPr bwMode="auto">
+          <a:xfrm>
+            <a:off x="2019300" y="3886200"/>
+            <a:ext cx="5143500" cy="2314575"/>
+          </a:xfrm>
+          <a:prstGeom prst="rect">
+            <a:avLst/>
+          </a:prstGeom>
+          <a:noFill/>
+          <a:extLst>
+            <a:ext uri="{909E8E84-426E-40DD-AFC4-6F175D3DCCD1}">
+              <a14:hiddenFill xmlns:a14="http://schemas.microsoft.com/office/drawing/2010/main">
+                <a:solidFill>
+                  <a:srgbClr val="FFFFFF"/>
+                </a:solidFill>
+              </a14:hiddenFill>
+            </a:ext>
+          </a:extLst>
+        </p:spPr>
+      </p:pic>
+    </p:spTree>
+    <p:extLst>
+      <p:ext uri="{BB962C8B-B14F-4D97-AF65-F5344CB8AC3E}">
+        <p14:creationId xmlns:p14="http://schemas.microsoft.com/office/powerpoint/2010/main" val="2652951255"/>
+      </p:ext>
+    </p:extLst>
+  </p:cSld>
+  <p:clrMapOvr>
+    <a:masterClrMapping/>
+  </p:clrMapOvr>
+  <p:timing>
+    <p:tnLst>
+      <p:par>
+        <p:cTn id="1" dur="indefinite" restart="never" nodeType="tmRoot"/>
+      </p:par>
+    </p:tnLst>
+  </p:timing>
+</p:sld>
+</file>
+
+<file path=ppt/slides/slide16.xml><?xml version="1.0" encoding="utf-8"?>
+<p:sld xmlns:a="http://schemas.openxmlformats.org/drawingml/2006/main" xmlns:r="http://schemas.openxmlformats.org/officeDocument/2006/relationships" xmlns:p="http://schemas.openxmlformats.org/presentationml/2006/main">
+  <p:cSld>
+    <p:spTree>
+      <p:nvGrpSpPr>
+        <p:cNvPr id="1" name=""/>
+        <p:cNvGrpSpPr/>
+        <p:nvPr/>
+      </p:nvGrpSpPr>
+      <p:grpSpPr>
+        <a:xfrm>
+          <a:off x="0" y="0"/>
+          <a:ext cx="0" cy="0"/>
+          <a:chOff x="0" y="0"/>
+          <a:chExt cx="0" cy="0"/>
+        </a:xfrm>
+      </p:grpSpPr>
+      <p:sp>
+        <p:nvSpPr>
+          <p:cNvPr id="2" name="Title 1"/>
+          <p:cNvSpPr>
+            <a:spLocks noGrp="1"/>
+          </p:cNvSpPr>
+          <p:nvPr>
+            <p:ph type="title"/>
+          </p:nvPr>
+        </p:nvSpPr>
+        <p:spPr>
+          <a:xfrm>
+            <a:off x="228600" y="381000"/>
+            <a:ext cx="8686800" cy="1066800"/>
+          </a:xfrm>
+        </p:spPr>
+        <p:txBody>
+          <a:bodyPr>
+            <a:normAutofit/>
+          </a:bodyPr>
+          <a:lstStyle/>
+          <a:p>
+            <a:r>
+              <a:rPr lang="da-DK" sz="3200" b="1" dirty="0" smtClean="0"/>
+              <a:t>Getting Ubuntu for Windows users</a:t>
+            </a:r>
+            <a:endParaRPr lang="en-US" sz="3200" dirty="0"/>
+          </a:p>
+        </p:txBody>
+      </p:sp>
+      <p:sp>
+        <p:nvSpPr>
+          <p:cNvPr id="3" name="Content Placeholder 2"/>
+          <p:cNvSpPr>
+            <a:spLocks noGrp="1"/>
+          </p:cNvSpPr>
+          <p:nvPr>
+            <p:ph idx="1"/>
+          </p:nvPr>
+        </p:nvSpPr>
+        <p:spPr>
+          <a:xfrm>
+            <a:off x="304800" y="1371600"/>
+            <a:ext cx="8686800" cy="2286000"/>
+          </a:xfrm>
+        </p:spPr>
+        <p:txBody>
+          <a:bodyPr>
+            <a:normAutofit/>
+          </a:bodyPr>
+          <a:lstStyle/>
+          <a:p>
+            <a:r>
+              <a:rPr lang="en-GB" dirty="0" smtClean="0"/>
+              <a:t>If you have on your laptop only Windows, you could either:</a:t>
+            </a:r>
+          </a:p>
+          <a:p>
+            <a:pPr lvl="1"/>
+            <a:r>
+              <a:rPr lang="en-GB" dirty="0"/>
+              <a:t>install Ubuntu </a:t>
+            </a:r>
+            <a:r>
+              <a:rPr lang="en-GB" dirty="0" smtClean="0"/>
+              <a:t>from the following link </a:t>
+            </a:r>
+          </a:p>
+          <a:p>
+            <a:pPr marL="411480" lvl="1" indent="0">
+              <a:buNone/>
+            </a:pPr>
+            <a:r>
+              <a:rPr lang="en-GB" sz="1050" dirty="0"/>
+              <a:t> </a:t>
+            </a:r>
+            <a:r>
+              <a:rPr lang="en-GB" sz="1050" dirty="0" smtClean="0"/>
+              <a:t>      </a:t>
+            </a:r>
+            <a:r>
+              <a:rPr lang="en-GB" sz="1600" dirty="0" smtClean="0"/>
+              <a:t>https</a:t>
+            </a:r>
+            <a:r>
+              <a:rPr lang="en-GB" sz="1600" dirty="0"/>
+              <a:t>://www.microsoft.com/en-us/p/ubuntu/9nblggh4msv6?activetab=pivot:overviewtab</a:t>
+            </a:r>
+          </a:p>
+        </p:txBody>
+      </p:sp>
+      <p:sp>
+        <p:nvSpPr>
+          <p:cNvPr id="4" name="Slide Number Placeholder 3"/>
+          <p:cNvSpPr>
+            <a:spLocks noGrp="1"/>
+          </p:cNvSpPr>
+          <p:nvPr>
+            <p:ph type="sldNum" sz="quarter" idx="12"/>
+          </p:nvPr>
+        </p:nvSpPr>
+        <p:spPr/>
+        <p:txBody>
+          <a:bodyPr/>
+          <a:lstStyle/>
+          <a:p>
+            <a:pPr>
+              <a:defRPr/>
+            </a:pPr>
+            <a:fld id="{B3B39CE4-1B0F-442B-AED0-7E4EF4FD7138}" type="slidenum">
+              <a:rPr lang="en-US" smtClean="0"/>
+              <a:pPr>
+                <a:defRPr/>
+              </a:pPr>
+              <a:t>16</a:t>
             </a:fld>
             <a:endParaRPr lang="en-US" dirty="0"/>
           </a:p>
@@ -7091,13 +7211,19 @@
               <a:rPr lang="en-GB" dirty="0">
                 <a:effectLst/>
               </a:rPr>
-              <a:t>( https://www.putty.org/ ) and then use it to connect to some machine running Linux, </a:t>
+              <a:t>( https://www.putty.org/ ) and then use it to connect to some machine running Linux</a:t>
             </a:r>
             <a:r>
               <a:rPr lang="en-GB" dirty="0" smtClean="0">
                 <a:effectLst/>
               </a:rPr>
-              <a:t>and on which </a:t>
+              <a:t>, </a:t>
+            </a:r>
+            <a:r>
+              <a:rPr lang="en-GB" dirty="0" smtClean="0">
+                <a:effectLst/>
+              </a:rPr>
+              <a:t>on which </a:t>
             </a:r>
             <a:r>
               <a:rPr lang="en-GB" dirty="0">
@@ -7146,7 +7272,7 @@
 </p:sld>
 </file>
 
-<file path=ppt/slides/slide16.xml><?xml version="1.0" encoding="utf-8"?>
+<file path=ppt/slides/slide17.xml><?xml version="1.0" encoding="utf-8"?>
 <p:sld xmlns:a="http://schemas.openxmlformats.org/drawingml/2006/main" xmlns:r="http://schemas.openxmlformats.org/officeDocument/2006/relationships" xmlns:p="http://schemas.openxmlformats.org/presentationml/2006/main">
   <p:cSld>
     <p:spTree>
@@ -7262,7 +7388,7 @@
               <a:pPr>
                 <a:defRPr/>
               </a:pPr>
-              <a:t>16</a:t>
+              <a:t>17</a:t>
             </a:fld>
             <a:endParaRPr lang="en-US" dirty="0"/>
           </a:p>
@@ -7540,174 +7666,6 @@
 </p:sld>
 </file>
 
-<file path=ppt/slides/slide17.xml><?xml version="1.0" encoding="utf-8"?>
-<p:sld xmlns:a="http://schemas.openxmlformats.org/drawingml/2006/main" xmlns:r="http://schemas.openxmlformats.org/officeDocument/2006/relationships" xmlns:p="http://schemas.openxmlformats.org/presentationml/2006/main">
-  <p:cSld>
-    <p:spTree>
-      <p:nvGrpSpPr>
-        <p:cNvPr id="1" name=""/>
-        <p:cNvGrpSpPr/>
-        <p:nvPr/>
-      </p:nvGrpSpPr>
-      <p:grpSpPr>
-        <a:xfrm>
-          <a:off x="0" y="0"/>
-          <a:ext cx="0" cy="0"/>
-          <a:chOff x="0" y="0"/>
-          <a:chExt cx="0" cy="0"/>
-        </a:xfrm>
-      </p:grpSpPr>
-      <p:sp>
-        <p:nvSpPr>
-          <p:cNvPr id="2" name="Title 1"/>
-          <p:cNvSpPr>
-            <a:spLocks noGrp="1"/>
-          </p:cNvSpPr>
-          <p:nvPr>
-            <p:ph type="title"/>
-          </p:nvPr>
-        </p:nvSpPr>
-        <p:spPr>
-          <a:xfrm>
-            <a:off x="228600" y="381000"/>
-            <a:ext cx="8686800" cy="1066800"/>
-          </a:xfrm>
-        </p:spPr>
-        <p:txBody>
-          <a:bodyPr>
-            <a:normAutofit/>
-          </a:bodyPr>
-          <a:lstStyle/>
-          <a:p>
-            <a:r>
-              <a:rPr lang="da-DK" sz="3200" b="1" dirty="0" smtClean="0"/>
-              <a:t>Free advert (#2)</a:t>
-            </a:r>
-            <a:endParaRPr lang="en-US" sz="3200" dirty="0"/>
-          </a:p>
-        </p:txBody>
-      </p:sp>
-      <p:sp>
-        <p:nvSpPr>
-          <p:cNvPr id="3" name="Content Placeholder 2"/>
-          <p:cNvSpPr>
-            <a:spLocks noGrp="1"/>
-          </p:cNvSpPr>
-          <p:nvPr>
-            <p:ph idx="1"/>
-          </p:nvPr>
-        </p:nvSpPr>
-        <p:spPr>
-          <a:xfrm>
-            <a:off x="304800" y="1371600"/>
-            <a:ext cx="8686800" cy="4648200"/>
-          </a:xfrm>
-        </p:spPr>
-        <p:txBody>
-          <a:bodyPr>
-            <a:normAutofit/>
-          </a:bodyPr>
-          <a:lstStyle/>
-          <a:p>
-            <a:r>
-              <a:rPr lang="en-GB" dirty="0" smtClean="0"/>
-              <a:t>What we can do in the terminal?</a:t>
-            </a:r>
-            <a:endParaRPr lang="en-US" dirty="0" smtClean="0"/>
-          </a:p>
-          <a:p>
-            <a:pPr lvl="1"/>
-            <a:r>
-              <a:rPr lang="en-GB" dirty="0" smtClean="0"/>
-              <a:t>Not that much with the mouse</a:t>
-            </a:r>
-            <a:r>
-              <a:rPr lang="en-DE" dirty="0" smtClean="0"/>
-              <a:t>…</a:t>
-            </a:r>
-            <a:endParaRPr lang="en-GB" dirty="0" smtClean="0"/>
-          </a:p>
-          <a:p>
-            <a:r>
-              <a:rPr lang="en-GB" dirty="0"/>
-              <a:t>Next, you can start typing and pressing ‘Enter’, but especially if you do it for the first time most likely whatever you have typed in the terminal will produce only the error </a:t>
-            </a:r>
-            <a:r>
-              <a:rPr lang="en-GB" dirty="0" smtClean="0"/>
-              <a:t>messages</a:t>
-            </a:r>
-          </a:p>
-          <a:p>
-            <a:pPr lvl="1"/>
-            <a:r>
-              <a:rPr lang="en-GB" dirty="0" smtClean="0"/>
-              <a:t>Still</a:t>
-            </a:r>
-            <a:r>
-              <a:rPr lang="en-GB" dirty="0"/>
-              <a:t>, that is something, as it clearly means that there is some secret/magic language which is trying to respond to, or to interpret, your command input, as soon as you have typed something in the terminal and pressed ‘Enter’. What is that secret built-in language available in the terminal</a:t>
-            </a:r>
-            <a:r>
-              <a:rPr lang="en-GB" dirty="0" smtClean="0"/>
-              <a:t>?</a:t>
-            </a:r>
-            <a:endParaRPr lang="en-US" dirty="0"/>
-          </a:p>
-          <a:p>
-            <a:pPr lvl="1"/>
-            <a:endParaRPr lang="en-GB" dirty="0"/>
-          </a:p>
-        </p:txBody>
-      </p:sp>
-      <p:sp>
-        <p:nvSpPr>
-          <p:cNvPr id="4" name="Slide Number Placeholder 3"/>
-          <p:cNvSpPr>
-            <a:spLocks noGrp="1"/>
-          </p:cNvSpPr>
-          <p:nvPr>
-            <p:ph type="sldNum" sz="quarter" idx="12"/>
-          </p:nvPr>
-        </p:nvSpPr>
-        <p:spPr/>
-        <p:txBody>
-          <a:bodyPr/>
-          <a:lstStyle/>
-          <a:p>
-            <a:pPr>
-              <a:defRPr/>
-            </a:pPr>
-            <a:fld id="{B3B39CE4-1B0F-442B-AED0-7E4EF4FD7138}" type="slidenum">
-              <a:rPr lang="en-US" smtClean="0"/>
-              <a:pPr>
-                <a:defRPr/>
-              </a:pPr>
-              <a:t>17</a:t>
-            </a:fld>
-            <a:endParaRPr lang="en-US" dirty="0"/>
-          </a:p>
-        </p:txBody>
-      </p:sp>
-    </p:spTree>
-    <p:extLst>
-      <p:ext uri="{BB962C8B-B14F-4D97-AF65-F5344CB8AC3E}">
-        <p14:creationId xmlns:p14="http://schemas.microsoft.com/office/powerpoint/2010/main" val="3587298211"/>
-      </p:ext>
-    </p:extLst>
-  </p:cSld>
-  <p:clrMapOvr>
-    <a:masterClrMapping/>
-  </p:clrMapOvr>
-  <p:timing>
-    <p:tnLst>
-      <p:par>
-        <p:cTn id="1" dur="indefinite" restart="never" nodeType="tmRoot"/>
-      </p:par>
-    </p:tnLst>
-  </p:timing>
-</p:sld>
-</file>
-
 <file path=ppt/slides/slide18.xml><?xml version="1.0" encoding="utf-8"?>
 <p:sld xmlns:a="http://schemas.openxmlformats.org/drawingml/2006/main" xmlns:r="http://schemas.openxmlformats.org/officeDocument/2006/relationships" xmlns:p="http://schemas.openxmlformats.org/presentationml/2006/main">
   <p:cSld>
@@ -7737,38 +7695,8 @@
         </p:nvSpPr>
         <p:spPr>
           <a:xfrm>
-            <a:off x="304800" y="533400"/>
-            <a:ext cx="8839200" cy="838200"/>
-          </a:xfrm>
-        </p:spPr>
-        <p:txBody>
-          <a:bodyPr>
-            <a:noAutofit/>
-          </a:bodyPr>
-          <a:lstStyle/>
-          <a:p>
-            <a:r>
-              <a:rPr lang="da-DK" sz="3200" b="1" dirty="0" smtClean="0"/>
-              <a:t>Linux shells</a:t>
-            </a:r>
-            <a:endParaRPr lang="en-US" sz="3200" dirty="0"/>
-          </a:p>
-        </p:txBody>
-      </p:sp>
-      <p:sp>
-        <p:nvSpPr>
-          <p:cNvPr id="3" name="Content Placeholder 2"/>
-          <p:cNvSpPr>
-            <a:spLocks noGrp="1"/>
-          </p:cNvSpPr>
-          <p:nvPr>
-            <p:ph idx="1"/>
-          </p:nvPr>
-        </p:nvSpPr>
-        <p:spPr>
-          <a:xfrm>
-            <a:off x="304800" y="1371600"/>
-            <a:ext cx="8686800" cy="5029200"/>
+            <a:off x="228600" y="381000"/>
+            <a:ext cx="8686800" cy="1066800"/>
           </a:xfrm>
         </p:spPr>
         <p:txBody>
@@ -7778,98 +7706,82 @@
           <a:lstStyle/>
           <a:p>
             <a:r>
-              <a:rPr lang="en-US" dirty="0" smtClean="0"/>
-              <a:t>Loosely speaking, shell is </a:t>
-            </a:r>
-            <a:r>
-              <a:rPr lang="en-US" dirty="0"/>
-              <a:t>any program that </a:t>
-            </a:r>
-            <a:r>
-              <a:rPr lang="en-US" dirty="0" smtClean="0"/>
-              <a:t>user employs </a:t>
-            </a:r>
-            <a:r>
-              <a:rPr lang="en-US" dirty="0"/>
-              <a:t>to type </a:t>
-            </a:r>
-            <a:r>
-              <a:rPr lang="en-US" dirty="0" smtClean="0"/>
-              <a:t>commands in the terminal (text window)</a:t>
-            </a:r>
-          </a:p>
-          <a:p>
-            <a:r>
-              <a:rPr lang="da-DK" dirty="0" smtClean="0"/>
-              <a:t>Example shells:</a:t>
-            </a:r>
+              <a:rPr lang="da-DK" sz="3200" b="1" dirty="0" smtClean="0"/>
+              <a:t>Free advert (#2)</a:t>
+            </a:r>
+            <a:endParaRPr lang="en-US" sz="3200" dirty="0"/>
+          </a:p>
+        </p:txBody>
+      </p:sp>
+      <p:sp>
+        <p:nvSpPr>
+          <p:cNvPr id="3" name="Content Placeholder 2"/>
+          <p:cNvSpPr>
+            <a:spLocks noGrp="1"/>
+          </p:cNvSpPr>
+          <p:nvPr>
+            <p:ph idx="1"/>
+          </p:nvPr>
+        </p:nvSpPr>
+        <p:spPr>
+          <a:xfrm>
+            <a:off x="304800" y="1371600"/>
+            <a:ext cx="8686800" cy="4648200"/>
+          </a:xfrm>
+        </p:spPr>
+        <p:txBody>
+          <a:bodyPr>
+            <a:normAutofit/>
+          </a:bodyPr>
+          <a:lstStyle/>
+          <a:p>
+            <a:r>
+              <a:rPr lang="en-GB" dirty="0" smtClean="0"/>
+              <a:t>What we can do in the terminal?</a:t>
+            </a:r>
+            <a:endParaRPr lang="en-US" dirty="0" smtClean="0"/>
           </a:p>
           <a:p>
             <a:pPr lvl="1"/>
             <a:r>
-              <a:rPr lang="da-DK" dirty="0"/>
-              <a:t>s</a:t>
-            </a:r>
-            <a:r>
-              <a:rPr lang="da-DK" dirty="0" smtClean="0"/>
-              <a:t>h</a:t>
+              <a:rPr lang="en-GB" dirty="0" smtClean="0"/>
+              <a:t>Not that much with the mouse</a:t>
+            </a:r>
+            <a:r>
+              <a:rPr lang="en-DE" dirty="0" smtClean="0"/>
+              <a:t>…</a:t>
+            </a:r>
+            <a:endParaRPr lang="en-GB" dirty="0" smtClean="0"/>
+          </a:p>
+          <a:p>
+            <a:r>
+              <a:rPr lang="en-GB" dirty="0"/>
+              <a:t>Next, you can start typing and pressing ‘Enter’, but especially if you do it for the first time most likely whatever you have typed in the terminal will produce only the error </a:t>
+            </a:r>
+            <a:r>
+              <a:rPr lang="en-GB" dirty="0" smtClean="0"/>
+              <a:t>messages</a:t>
             </a:r>
           </a:p>
           <a:p>
             <a:pPr lvl="1"/>
             <a:r>
-              <a:rPr lang="da-DK" dirty="0" smtClean="0"/>
-              <a:t>bash</a:t>
-            </a:r>
+              <a:rPr lang="en-GB" dirty="0" smtClean="0"/>
+              <a:t>Still</a:t>
+            </a:r>
+            <a:r>
+              <a:rPr lang="en-GB" dirty="0"/>
+              <a:t>, that is something, as it clearly means that there is some secret/magic language which is trying to respond to, or to interpret, your command input, as soon as you have typed something in the terminal and pressed ‘Enter’. What is that secret built-in language available in the terminal</a:t>
+            </a:r>
+            <a:r>
+              <a:rPr lang="en-GB" dirty="0" smtClean="0"/>
+              <a:t>?</a:t>
+            </a:r>
+            <a:endParaRPr lang="en-US" dirty="0"/>
           </a:p>
           <a:p>
             <a:pPr lvl="1"/>
-            <a:r>
-              <a:rPr lang="da-DK" dirty="0" smtClean="0"/>
-              <a:t>ksh</a:t>
-            </a:r>
-          </a:p>
-          <a:p>
-            <a:pPr lvl="1"/>
-            <a:r>
-              <a:rPr lang="da-DK" dirty="0" smtClean="0"/>
-              <a:t>csh</a:t>
-            </a:r>
-          </a:p>
-          <a:p>
-            <a:pPr lvl="1"/>
-            <a:r>
-              <a:rPr lang="da-DK" dirty="0" smtClean="0"/>
-              <a:t>fish</a:t>
-            </a:r>
-          </a:p>
-          <a:p>
-            <a:pPr lvl="1"/>
-            <a:r>
-              <a:rPr lang="da-DK" dirty="0" smtClean="0"/>
-              <a:t>PowerShell (developed by Microsoft!)</a:t>
-            </a:r>
-          </a:p>
-          <a:p>
-            <a:r>
-              <a:rPr lang="da-DK" dirty="0" smtClean="0"/>
-              <a:t>Since ‘bash’ is the default shell on most Linux distributions </a:t>
-            </a:r>
-            <a:r>
-              <a:rPr lang="da-DK" dirty="0" smtClean="0"/>
-              <a:t>nowadays, </a:t>
-            </a:r>
-            <a:r>
-              <a:rPr lang="da-DK" dirty="0" smtClean="0"/>
-              <a:t>we focus on it</a:t>
-            </a:r>
-          </a:p>
-          <a:p>
-            <a:pPr lvl="1"/>
-            <a:r>
-              <a:rPr lang="da-DK" dirty="0" smtClean="0"/>
-              <a:t>If not set by default, just type ‘bash’ in the terminal, and you are in the ‘bash’ wonderland </a:t>
-            </a:r>
+            <a:endParaRPr lang="en-GB" dirty="0"/>
           </a:p>
         </p:txBody>
       </p:sp>
@@ -7902,49 +7814,10 @@
           </a:p>
         </p:txBody>
       </p:sp>
-      <p:sp>
-        <p:nvSpPr>
-          <p:cNvPr id="5" name="AutoShape 2" descr="data:image/jpeg;base64,/9j/4AAQSkZJRgABAQAAAQABAAD/2wCEAAkGBxAPEBUPDxAQEBAPDxAQEA8PEBAQDw4PFREWFhUVFRUYHiggGBomHRYXITEhJSkrLi4uGB8zODMsNygtLisBCgoKDg0OGxAQFzIlHh8tListKy0tMS0tLS0tLS8tLi0tLS0vLSstLS0tLS0tLSstLS0wLS0tNzUtNzcrNy8tLv/AABEIAJ4BPwMBIgACEQEDEQH/xAAbAAACAwEBAQAAAAAAAAAAAAAAAQIEBQYDB//EAEMQAAEEAQMBBQMHCgUDBQAAAAEAAgMRBAUSITEGEyJBUTJhcRQVI4GRstEzUlNic4KSk6HBQkNUcrEHovAWY6Ph8f/EABkBAQEBAQEBAAAAAAAAAAAAAAABBAMCBf/EAC8RAAICAQIEBAUDBQAAAAAAAAABAhEDEiEEMUHwE1GR4SIyYYGxFEJiI0NSodH/2gAMAwEAAhEDEQA/APuKEIQAhCEAIQhACSaRQAkmkgEUJpKASCmkoUSSZQgEkmhCiKSaSgEkmkoASTSUKJJNCAikpJKAikpJKFEkmkoBJJpWEKAYSpdyfUJGVR71S0NxujPx+C8yp96k42psUghnVCbOqA2EIQtRxBCEIAQhCAEIQgEhBQgEkmUKASSaEKIpJpKAEk0kAkJpKFEkmkgEhMpKASSaShRJJpIBJKSShSKE0lAQkdQJ9FRdOvfUXVGT8P8AlYhn96zZZ06OkI2aJnS79Zpn96O/XHxDppNMTKbZllCf3qbZ/eqshNJsxutejOqpae+7+r+6us6rTB2rObVGuhCFsOAIQhACEIQAhCEAJJpFACSaRQAUk0lACRTSQokIKFAJJNBQokk0lAJJNCgEkmkoUSSaSASSkkoBJFNJQpXzot8bmjqWmviOQuNM67krj+1GnGN3fRj6N3tgf4HevwKx8XF1qXQ74WrplTv0d+sc5CXylfO8Q1aDaE69GzrEblLe0HTXzESOFRA3z/me4e73rpjbm6R4klFWzoNKiLYwT1f4vgPJXWdUJs6r6sVSSMbdmshCFrOIIQhACEIQAhCEAIQhAJCChAJBQhQCQhCFEUk0lAJCaSFEhMpKASSy4ceSW3meVtveA1pAa0BxAA49y9Pm1/8AqJv4m/guam3uonql5l9CofNr/wDUzfa38Ejpsn+pm/7PwU1S/wAfwKXmX1EmlROmyf6mb/s/BUs/Ela01kSurmjso1zR4XmWRpXp/B6UU+psd631XhmZrI2l3p6rEh1WM8FwBHUHghUdYzWTMMDHW5xF1zQXCfErTaPaxb7nSadqLZ2GSqYDV31I60vbHyWvBIPAJB+K4zE0zIa3YyTbH6bel9aW/h6RI1u0TvA61tZ1+xTFmyS/aWcIrqX58wDpR+KpS57zYLGOBFEG+QvX5kf+nd/BH+CkNFf+nP8ALj/Be34r6fg8rQupyc+jNJJbbbJpvUAelqo/Qz5O/ou2OiP/AE5/lsS+Y3/pv/iYsr4Nv9p2Wf6mLoXZ3HAD3u72Qc7Dw1p/2+f1rp6WPJAY3ljiHFoDg8DaaPlQV3Cyb4u/etGHTD4ao5zblvZbQ3qhNnVaDkaqEKMjw3r5kD6yaC0nIdrx+VN+qrJPG2zQsdRazNQztrbdQ8LgXPY9jQDI1vtCyDzx6qlLnfSBoJMjXlzQbc5he4xsDwzh0dWeTY4XCWZLY0w4aUlZvjI45FO4Lmgg7WkkWT6cL2Y8Hp5cLlflrW923Y+Nm8BjX7x+UL2uDjyHmxYB4pauBL+cSXVCHWS5wdt8w3wt+rhSGZN0XJw7irNdeQed5b5bA767IUo3X/8AlLyP5U/sh94rQZSwhcPg6zqUbAH40k8jy6y4BrY3hzfDwB4du43zyKtPO7TajC4Mdhs3Oe1jS0SuaXFhdxR5uq8tvnaA7dC4s9o9Uuvm4fl3M9skbBfn9hvolrGbq7oInQxNjm72Xvmx0WmMQF7K33/ipteddRaA7VC4sdodUsj5vBqZ7BTnDe0NcWmzwLIHPvUcXtFqr3MadPa3ewlznF4ax/ebRfurqPcgO2QuU0rVdRkyG97jtZAaZINrmmN/jJLST4qpoJ6GwQqseq6lGXnuJJnGcscx8bGxReJ20ROadzmkBniI43En0QHaoXHs1/UnUW4AFECRr3OaS7cAQw+nN2fRe+h6hnzZA76IxwGMk+HaN+1tcHkc2gOpQhCA8ioqRSXkpS0z2P35PvlXFS0z2P35PvlXLXPH8qPUuY0KG5G5etSJRJV8iOxS9tyRXl0yo5rP0ON5st5TwtFZGeG0uhLAgRhZv08Lujr4rqitDjgeStsbSKTtd4pI5t2TCahuRuXuzyTQkCherBzWvPqR59GN/us3QMovBN/4ir3aIHdIQCajbdc+qzez+K5jS3rtcQT+tfP9bXypt+L6muNaDrGOsA+5SZ1VfEdxSst6rdF2jgzUVLOl2tcQ7oK9oNa11W3c7yB4H1q6s7UQQd5LQG9Xv/JNbbbD23yTzR8l3yP4TzjScjEypDdNcG8vLiXzAsviVoe7w3u2ht+V0s3UtWjxoy6QiERvjm+kqOGJzjT4nOYfpHmya9Vbzxs3GUV4I9xnjdOSwTu8Jc00TyCBVhcT/wBRNzGQT+wzG1V78iRkNhhPsS7HGnAe/jlYYrVPS2fUm9GPUldd9+50Gha5jzOLIZWAR79zojIx8GOXAgmKQWbN80r+k9r8CR7Y4cmIFwmcIg55ETY7txqg1u0E8+a5LSdRxsnVGTt1KTNljxJWl8eHHFCI3dGPeDwb6WFk6Jpgk7PZboYw7IkdLucIy6ZzWz9A702g8BdvCjB8++130yPPPJG2u+33vf1LS+3ulzSjHjzI3SOdtjvftkPo17hTj8Cuj/zT+zb94r5HpHazRn4un4vyY5WQx8LG47IwZMeYcOkd6i+f6r64Pyp/Zt+8VqXIxvmUm6sdoLopLIshrSa9Aos1gkX3Et1YG08mul/0WnFM13LXNcASCWkGiOoU7VJyMyTVvzYZTQcTbSPZF0E36t0LYZXAuId4eW1V8efX+i0HyBoskAepNBDXAixVHmx0KAoO1Mgg93JsMe/2TvB3VVf+dUjrLQaMU11urZzVLRDwfTjrz0TtAZztUsO2RSW3oXtLWk7q+Neafzr/AOzMa60zi/ctC0WgM751H6Kb+Dp0/FeuLqAkO3u5G8E25tNv0VmOVrvZINEg0bojqFMFANCEIDyKSZSXkpR0z2P35PvlWyqWmnwfvyffKuLjD5Ue5cyKzu0ue/GwsnJjDS/HxZ5mB4JaXsjc4WBViwtFVNXwG5WPLjPLmsyIZIXObW5rZGFpIvi+VQcI/thmM0/5Y6WDc+fCiBk07Mx2QNmP0ji177mABFFtDg9bXth9s8uXHYI248s2VqT8HEygyWLFlja0udOYi4upu17du7kt6rbZ2SuFkE2blTxwzYk0IkbjNMRxnbmtBZGLBoA3Z8PFJZPYnHeJAJZ4zJnfOETonNa7Ey9tOdFx0dyS11jkr1tff09zzvXf19jWw2ZjYXiaTGkyPF3T2RyRQnwjbvYXOI5u6PSlxw7YZ0bM1jxi5D8bLxMPGyYmSR48mROWte17S5x+jLhdO93C62LSZBjSQPzMmR8wePlLjE2ePc3b9HsaGtqrHHWysfE7DRsxDguy8mSCo+5BbjRuxpGSCRsrHRxgl+4Akuu/Pqoq6l6Fc9oc9kOfGRivytMNmUNljgfC7HMwd3dk7h7O3cB52rGqavlt06PUGT40DW4TcjIEuNJNve6NrgI6lbt5JFG+oXueyDfk88PyvJ7zNeXZWURAZ52933ewgs2NbtoeFo6KZ7JsdiwYcuRPNFjTQygPEIMzYaMcUm1oBYCAfU0LKe3uPc09AlyH4sL8trG5D4mPmZGCGMe4XtAJPS66+SvoQowTaheb5KWdmansNDz/AKBSU1FblUWzH7QTyMyWiIOJcQPD1oNWjiDaPEA1x5PFWVWOoMDt4bbzxuPWlPvzMQy9pddHrXCxJrU3fPod3ySosYk4dIQ3o1vJ998K+zqvHExWxN2sHvJPVx9SvdvVaoJpbnKT8jTVPMbxwOvmCAS/o0UeD1/oriRC1NWjlF07OSnYWHvAdu3cSSIW950Y83u47x20g1xtVZ2M2R4adwcdkTZC7fP3LD4+9a+tzS4bbF3wuiycIXbW+yI+WiNgc0PJcCSOnmR9io5Wng7RtaSHubuoPDPF3kZc5/iJuuAasrDPEz6mPOmu+/8Apj6fhxxtt1DvGy7e8ijhhD99Rh8Y5LuDRW1p8LejGtY32i1rW13jhZdtNFt8iq814Q6ewU5sRYNu+nhpMW3lschNnlzi4EchauFjFtBwPh7sNJp/LWckP6nzFuTHjd79/c858ka27+yPTD0+FjjIyGNj3clwjja/nysBe/8Amn9m37xXsxlen1Lx/wA0/s2/eK3LkfNZhDR2ObujyOu8AcNYbNgAeQseSUGhNB3HI8DY6JY4NIcd19OjeennS0ToUXkXD4Vz093Hsj+qb9DiLHRguaJK3bdoJAN+nvWTwP4/7N/6nprfoil8xQ0QZrcNpslvhoOuh5DxH4UFW1LSGBoDJwDI4Nt76bdO54uzR46dArruzUQqi7hzS4miXtB6X7xx8CVI9mYDd7yHG6JBaOvAFdOR/CFHhbVaF6nqPERTvxH6Hnk6PG575BNtLn7y0Fo8QYAQT+6PgCfVQxtGYI2MfOSQS8lrqaS+Puxt+y/jyvSPszFTtxdb3SHh26gSQDZA5r7LI56q0NDi2sbbiI2bW9Pfz8fEVVid24L1PDzpKlkfp9DOOiRu+jGSdwa1tA9Swkm+f1ui9fmNnJOQ4l29zSSKG4jn3+zXvsq9JosbnOcS4F7nOsUCC6ro/UvKfs/C8MsvHdivCa3DdfP9ftKvg/wXqP1F/wBx+iKWRpEIBccjb9IHOoii4E8UD18X1cK3pODGyVzo5d5YwRPb1p3tWT6qMXZqFoIt5u6J2+GyORx1469Vd0vS2Y27YXHeQTuryFeQVhiaknpS+5MmZODSm39i8hCFqMJ5FJSKS8lM3TfY/fk++ValfTS6i4hpIaOrqHQe9VNNPg/fk++VYlaXNLQ4sJaQHiiWkjggHix71wh8p0fM4PC/6gSnBn1B8ONIIIw75LjSyuyseTcQY8lrmeCuLeBXB4W9ldsMeFsb54cyJsjYy578WQRwd5J3bRK7o0k+XPBF9QqMvYYz/KH5eWZp8rCdg99HjxY4ZEXB24taTvduA5J6cClV1v8A6eOzXB8+bueYYYnvOJE43FIXtdFZ+hB4Dg32q6rptZ43ov6326hx2ZZigyZ5NPDhKGwvEIeNtNMtEDh1+dAEkKMva5kUj5ZnSxQR6dHlPxZMUtmj3ZLo+8LrvyrZXTnzVyTsq18OfA6V23VJZZXEMAMHeQsjoc+Ktl3x1VDUuxDslsvfZhdJkadFgvkGO1oqPIdKJA0Or/Ftr3Xaiqu/Ir79S9D20xHtcQMgPZPDj9w/HkZkPknbui2xuo05oJs1wDdL2h7UwPwpdQDZmw44nLhJHskJhsPAaT+cC34grne23ZSWR0k8Imn+VZeDJNFAMfvIo8aCRgLBMdkluLTTqrrzS2OzOkyP004edE1jHtmhETRFG8YjiRGJBD4GybTZ28WnQdUVtJ7UZD5mR5TdPiMsTpnYseYX5+OzujI3dGWgP467aq75Ctwds8eTHblRwZ0kUhpmzDlLnjZuLwPzB03dL6WquH2MkbLDJNnSZDcSGeHHD4ImyBssfd/SyNNyENA8h0SzuwwlxMPF+UV83sDAX48c0U/0ezc6F5Ldw6tPO0+qOuhFfU9srt/gxta68iRr8RmaHQ48kgbiuJBkfQ8AFG7pWNL7UDIzpsJsEwbBHC9uTsd3UgkaXWTVNB42mzu56Us/G7BNZC6AZLiH6T817u6Fhu97u9rd18fs+7qtXTuz7sfKOSzIJZJjQQSwGJtPdA0tY8Pu28E23n4q7Dc1MlcprwcCHC+OvwXXShU8jFa7qFlz43NUjtjlpZxsWW0+YW7oDN79/wDhYKvyLj/9WsvN0qISkbfMdCR5D0XXYcDGMDY2hrasAe//AJWbh8bc9+h1ySVbdT1QzqhDeq+gZzTQhC0HIRFqBiF351X/AIF6IQHm2ECutjzs2ePP1UmtA6CvgpISi2CiGC93nVfVdqSEICEIQAhCEAIQhACEihANK0ihAStK1EoUAikmkoUy9P8AY/fk++VbVKAOjBa5jydzjbWOcCC4kchevf8A6kv8t/4LPF0qOr5li0bl4d/+rJ/Lf+CO/H5sn8t/4K6kSj3tFrw78ej/AOW/8Ejkt8w/+W/8E1IUWLRarfKm/rfwP/BHypv638D/AME1LzFFncjcq/ypnv8A4X/gvN+oRN4c8N/3WP8AlNS8xpZc3JFypfOkH6Vn2ps1GF3SRpr0N0prj5l0vyLRKRXj8sj/ADx/VQdqEPTvWA+m4I5R8xTMTUvyx+I+6Fu4Drjb8K+zhc7qM7XSktIcLHI5HQLc0d9x/BxWbC/6jOk18KLqG9UFNvVaziaKEIWg5ghCEAIQhACEIQAhCEAIQhACEIQAkmkUAJJpFACSaRUAJItJQoIQSkSgBFJWglCjpCSRKlglaLXmXKBkU1Cj3tczr3ilP6rWj+/91uOnAWLmlpcSbBcVm4iVxo641TswMhi3+xEVRySfnybR8GD8SVkZreDS3ezcrRjNA8i7d/uuysvDpLLfkdsr+A3ty4XtbFtyy7ykjY76x4T/AMBdf3y5jtYQ6WOuoY6/gXcf3Wji2pYznh2kZcC6vQPYd/u/sudxsf3rpNIbsBB86IWfhVUj3lexeIQ3qmUN6r6BnNBCELucwQhCAEIQgBCEIAQhCAEIQgBCEIAQhCASEFCASiVIopQpBCdIpQEUlOkqQpGkKVIpSgRpRcFMhRcEYPCRyqyzUrUjVWfDfouM76HtGFkauGyuaT5iufKl5T5zSLsLRy9Ehl5fGxx9SOftVT/0vj/mD4FzyPsKwyhlO6lA5/M1dgO1tvd6MFq9omY9jTuaW7nXXpwtiLRo2cNawD3L1+bx7l4jhyJ3Z7c41RWOpH0WFqupfSh7mkNIAvqBXqumOB8F5v0pruoaV6njySVWeYyimZ2BlNoEEG/NaHzkAqbuysR6FzP9j3NH2dE4uykQNl8jvcZHUpGOZckG4PqbuJkh7QfUK2w8qnjYYYAB0A9SrcbFvhqrc4Srof/Z"/>
-          <p:cNvSpPr>
-            <a:spLocks noChangeAspect="1" noChangeArrowheads="1"/>
-          </p:cNvSpPr>
-          <p:nvPr/>
-        </p:nvSpPr>
-        <p:spPr bwMode="auto">
-          <a:xfrm>
-            <a:off x="155575" y="-144463"/>
-            <a:ext cx="304800" cy="304801"/>
-          </a:xfrm>
-          <a:prstGeom prst="rect">
-            <a:avLst/>
-          </a:prstGeom>
-          <a:noFill/>
-          <a:extLst>
-            <a:ext uri="{909E8E84-426E-40DD-AFC4-6F175D3DCCD1}">
-              <a14:hiddenFill xmlns:a14="http://schemas.microsoft.com/office/drawing/2010/main">
-                <a:solidFill>
-                  <a:srgbClr val="FFFFFF"/>
-                </a:solidFill>
-              </a14:hiddenFill>
-            </a:ext>
-          </a:extLst>
-        </p:spPr>
-        <p:txBody>
-          <a:bodyPr vert="horz" wrap="square" lIns="91440" tIns="45720" rIns="91440" bIns="45720" numCol="1" anchor="t" anchorCtr="0" compatLnSpc="1">
-            <a:prstTxWarp prst="textNoShape">
-              <a:avLst/>
-            </a:prstTxWarp>
-          </a:bodyPr>
-          <a:lstStyle/>
-          <a:p>
-            <a:endParaRPr lang="en-US"/>
-          </a:p>
-        </p:txBody>
-      </p:sp>
     </p:spTree>
     <p:extLst>
       <p:ext uri="{BB962C8B-B14F-4D97-AF65-F5344CB8AC3E}">
-        <p14:creationId xmlns:p14="http://schemas.microsoft.com/office/powerpoint/2010/main" val="436262983"/>
+        <p14:creationId xmlns:p14="http://schemas.microsoft.com/office/powerpoint/2010/main" val="3587298211"/>
       </p:ext>
     </p:extLst>
   </p:cSld>
@@ -8002,7 +7875,7 @@
           <a:p>
             <a:r>
               <a:rPr lang="da-DK" sz="3200" b="1" dirty="0" smtClean="0"/>
-              <a:t>Why shell?</a:t>
+              <a:t>Linux shells</a:t>
             </a:r>
             <a:endParaRPr lang="en-US" sz="3200" dirty="0"/>
           </a:p>
@@ -8021,7 +7894,7 @@
         <p:spPr>
           <a:xfrm>
             <a:off x="304800" y="1371600"/>
-            <a:ext cx="8686800" cy="1600200"/>
+            <a:ext cx="8686800" cy="5029200"/>
           </a:xfrm>
         </p:spPr>
         <p:txBody>
@@ -8031,29 +7904,90 @@
           <a:lstStyle/>
           <a:p>
             <a:r>
-              <a:rPr lang="en-GB" dirty="0"/>
-              <a:t>The shell translates the commands you type </a:t>
-            </a:r>
-            <a:r>
-              <a:rPr lang="en-GB" dirty="0" smtClean="0"/>
-              <a:t>into </a:t>
-            </a:r>
-            <a:r>
-              <a:rPr lang="en-GB" dirty="0"/>
-              <a:t>a format which the computer can </a:t>
-            </a:r>
-            <a:r>
-              <a:rPr lang="en-GB" dirty="0" smtClean="0"/>
-              <a:t>understand</a:t>
+              <a:rPr lang="en-US" dirty="0" smtClean="0"/>
+              <a:t>Loosely speaking, shell is </a:t>
+            </a:r>
+            <a:r>
+              <a:rPr lang="en-US" dirty="0"/>
+              <a:t>any program that </a:t>
+            </a:r>
+            <a:r>
+              <a:rPr lang="en-US" dirty="0" smtClean="0"/>
+              <a:t>user employs </a:t>
+            </a:r>
+            <a:r>
+              <a:rPr lang="en-US" dirty="0"/>
+              <a:t>to type </a:t>
+            </a:r>
+            <a:r>
+              <a:rPr lang="en-US" dirty="0" smtClean="0"/>
+              <a:t>commands in the terminal (text window)</a:t>
+            </a:r>
+          </a:p>
+          <a:p>
+            <a:r>
+              <a:rPr lang="da-DK" dirty="0" smtClean="0"/>
+              <a:t>Example shells:</a:t>
             </a:r>
           </a:p>
           <a:p>
             <a:pPr lvl="1"/>
             <a:r>
-              <a:rPr lang="en-GB" dirty="0" smtClean="0"/>
-              <a:t>It works both ways: User is shielded from Linux kernel, and Linux kernel is shielded from user</a:t>
-            </a:r>
-            <a:endParaRPr lang="en-US" dirty="0" smtClean="0"/>
+              <a:rPr lang="da-DK" dirty="0"/>
+              <a:t>s</a:t>
+            </a:r>
+            <a:r>
+              <a:rPr lang="da-DK" dirty="0" smtClean="0"/>
+              <a:t>h</a:t>
+            </a:r>
+          </a:p>
+          <a:p>
+            <a:pPr lvl="1"/>
+            <a:r>
+              <a:rPr lang="da-DK" dirty="0" smtClean="0"/>
+              <a:t>bash</a:t>
+            </a:r>
+          </a:p>
+          <a:p>
+            <a:pPr lvl="1"/>
+            <a:r>
+              <a:rPr lang="da-DK" dirty="0" smtClean="0"/>
+              <a:t>ksh</a:t>
+            </a:r>
+          </a:p>
+          <a:p>
+            <a:pPr lvl="1"/>
+            <a:r>
+              <a:rPr lang="da-DK" dirty="0" smtClean="0"/>
+              <a:t>csh</a:t>
+            </a:r>
+          </a:p>
+          <a:p>
+            <a:pPr lvl="1"/>
+            <a:r>
+              <a:rPr lang="da-DK" dirty="0" smtClean="0"/>
+              <a:t>fish</a:t>
+            </a:r>
+          </a:p>
+          <a:p>
+            <a:pPr lvl="1"/>
+            <a:r>
+              <a:rPr lang="da-DK" dirty="0" smtClean="0"/>
+              <a:t>PowerShell (developed by Microsoft!)</a:t>
+            </a:r>
+          </a:p>
+          <a:p>
+            <a:r>
+              <a:rPr lang="da-DK" dirty="0" smtClean="0"/>
+              <a:t>Since ‘bash’ is the default shell on most Linux distributions nowadays, we focus on it</a:t>
+            </a:r>
+          </a:p>
+          <a:p>
+            <a:pPr lvl="1"/>
+            <a:r>
+              <a:rPr lang="da-DK" dirty="0" smtClean="0"/>
+              <a:t>If not set by default, just type ‘bash’ in the terminal, and you are in the ‘bash’ wonderland </a:t>
+            </a:r>
           </a:p>
         </p:txBody>
       </p:sp>
@@ -8125,51 +8059,10 @@
           </a:p>
         </p:txBody>
       </p:sp>
-      <p:pic>
-        <p:nvPicPr>
-          <p:cNvPr id="6" name="Picture 2" descr="SHELL.PNG"/>
-          <p:cNvPicPr>
-            <a:picLocks noChangeAspect="1" noChangeArrowheads="1"/>
-          </p:cNvPicPr>
-          <p:nvPr/>
-        </p:nvPicPr>
-        <p:blipFill>
-          <a:blip r:embed="rId2">
-            <a:extLst>
-              <a:ext uri="{28A0092B-C50C-407E-A947-70E740481C1C}">
-                <a14:useLocalDpi xmlns:a14="http://schemas.microsoft.com/office/drawing/2010/main" val="0"/>
-              </a:ext>
-            </a:extLst>
-          </a:blip>
-          <a:srcRect/>
-          <a:stretch>
-            <a:fillRect/>
-          </a:stretch>
-        </p:blipFill>
-        <p:spPr bwMode="auto">
-          <a:xfrm>
-            <a:off x="2393694" y="3048000"/>
-            <a:ext cx="4235706" cy="3495675"/>
-          </a:xfrm>
-          <a:prstGeom prst="rect">
-            <a:avLst/>
-          </a:prstGeom>
-          <a:noFill/>
-          <a:extLst>
-            <a:ext uri="{909E8E84-426E-40DD-AFC4-6F175D3DCCD1}">
-              <a14:hiddenFill xmlns:a14="http://schemas.microsoft.com/office/drawing/2010/main">
-                <a:solidFill>
-                  <a:srgbClr val="FFFFFF"/>
-                </a:solidFill>
-              </a14:hiddenFill>
-            </a:ext>
-          </a:extLst>
-        </p:spPr>
-      </p:pic>
     </p:spTree>
     <p:extLst>
       <p:ext uri="{BB962C8B-B14F-4D97-AF65-F5344CB8AC3E}">
-        <p14:creationId xmlns:p14="http://schemas.microsoft.com/office/powerpoint/2010/main" val="2973984211"/>
+        <p14:creationId xmlns:p14="http://schemas.microsoft.com/office/powerpoint/2010/main" val="436262983"/>
       </p:ext>
     </p:extLst>
   </p:cSld>
@@ -8368,24 +8261,10 @@
           <a:lstStyle/>
           <a:p>
             <a:r>
-              <a:rPr lang="en-US" sz="3200" b="1" dirty="0" smtClean="0"/>
-              <a:t>A </a:t>
-            </a:r>
-            <a:r>
-              <a:rPr lang="en-US" sz="3200" b="1" dirty="0"/>
-              <a:t>bit of </a:t>
-            </a:r>
-            <a:r>
-              <a:rPr lang="en-US" sz="3200" b="1" dirty="0" smtClean="0"/>
-              <a:t>‘bash’ history</a:t>
-            </a:r>
-            <a:r>
-              <a:rPr lang="en-US" sz="3200" b="1" dirty="0"/>
-              <a:t> </a:t>
-            </a:r>
-            <a:endParaRPr lang="en-US" sz="3200" b="1" dirty="0">
-              <a:effectLst/>
-            </a:endParaRPr>
+              <a:rPr lang="da-DK" sz="3200" b="1" dirty="0" smtClean="0"/>
+              <a:t>Why shell?</a:t>
+            </a:r>
+            <a:endParaRPr lang="en-US" sz="3200" dirty="0"/>
           </a:p>
         </p:txBody>
       </p:sp>
@@ -8402,7 +8281,7 @@
         <p:spPr>
           <a:xfrm>
             <a:off x="304800" y="1371600"/>
-            <a:ext cx="8686800" cy="3962400"/>
+            <a:ext cx="8686800" cy="1600200"/>
           </a:xfrm>
         </p:spPr>
         <p:txBody>
@@ -8412,51 +8291,29 @@
           <a:lstStyle/>
           <a:p>
             <a:r>
-              <a:rPr lang="da-DK" dirty="0" smtClean="0"/>
-              <a:t>Written by Brian Fox in 1989... And it’s still alive!!</a:t>
-            </a:r>
-          </a:p>
-          <a:p>
-            <a:r>
-              <a:rPr lang="da-DK" dirty="0" smtClean="0"/>
-              <a:t>‘bash’ is an acronym for ‘Bourne-again shell</a:t>
-            </a:r>
-            <a:r>
-              <a:rPr lang="da-DK" dirty="0"/>
-              <a:t>’ (the original shell was </a:t>
-            </a:r>
-            <a:r>
-              <a:rPr lang="da-DK" dirty="0" smtClean="0"/>
-              <a:t>written in 1977 by </a:t>
-            </a:r>
-            <a:r>
-              <a:rPr lang="da-DK" dirty="0"/>
-              <a:t>Stephen Bourne)</a:t>
-            </a:r>
-          </a:p>
-          <a:p>
-            <a:r>
-              <a:rPr lang="da-DK" dirty="0" smtClean="0"/>
-              <a:t>Written entirely in C </a:t>
-            </a:r>
-          </a:p>
-          <a:p>
-            <a:r>
-              <a:rPr lang="da-DK" dirty="0" smtClean="0"/>
-              <a:t>Executable: /bin/bash</a:t>
-            </a:r>
-          </a:p>
-          <a:p>
-            <a:r>
-              <a:rPr lang="da-DK" dirty="0" smtClean="0"/>
-              <a:t>File extension: .sh</a:t>
-            </a:r>
-          </a:p>
-          <a:p>
-            <a:r>
-              <a:rPr lang="da-DK" dirty="0" smtClean="0"/>
-              <a:t>Command processor / interpreted / scripting language</a:t>
-            </a:r>
+              <a:rPr lang="en-GB" dirty="0"/>
+              <a:t>The shell translates the commands you type </a:t>
+            </a:r>
+            <a:r>
+              <a:rPr lang="en-GB" dirty="0" smtClean="0"/>
+              <a:t>into </a:t>
+            </a:r>
+            <a:r>
+              <a:rPr lang="en-GB" dirty="0"/>
+              <a:t>a format which the computer can </a:t>
+            </a:r>
+            <a:r>
+              <a:rPr lang="en-GB" dirty="0" smtClean="0"/>
+              <a:t>understand</a:t>
+            </a:r>
+          </a:p>
+          <a:p>
+            <a:pPr lvl="1"/>
+            <a:r>
+              <a:rPr lang="en-GB" dirty="0" smtClean="0"/>
+              <a:t>It works both ways: User is shielded from Linux kernel, and Linux kernel is shielded from user</a:t>
+            </a:r>
+            <a:endParaRPr lang="en-US" dirty="0" smtClean="0"/>
           </a:p>
         </p:txBody>
       </p:sp>
@@ -8530,7 +8387,7 @@
       </p:sp>
       <p:pic>
         <p:nvPicPr>
-          <p:cNvPr id="2050" name="Picture 2" descr="https://camo.githubusercontent.com/7c9b27101ba491969d016f2f2427c3e066f7bd0b/68747470733a2f2f63646e2e7261776769742e636f6d2f6f64622f6f6666696369616c2d626173682d6c6f676f2f6d61737465722f6173736574732f4c6f676f732f4964656e746974792f504e472f424153485f6c6f676f2d7472616e73706172656e742d62672d636f6c6f722e706e67"/>
+          <p:cNvPr id="6" name="Picture 2" descr="SHELL.PNG"/>
           <p:cNvPicPr>
             <a:picLocks noChangeAspect="1" noChangeArrowheads="1"/>
           </p:cNvPicPr>
@@ -8551,8 +8408,8 @@
         </p:blipFill>
         <p:spPr bwMode="auto">
           <a:xfrm>
-            <a:off x="2590800" y="4657725"/>
-            <a:ext cx="3581400" cy="1514475"/>
+            <a:off x="2393694" y="3048000"/>
+            <a:ext cx="4235706" cy="3495675"/>
           </a:xfrm>
           <a:prstGeom prst="rect">
             <a:avLst/>
@@ -8572,7 +8429,7 @@
     </p:spTree>
     <p:extLst>
       <p:ext uri="{BB962C8B-B14F-4D97-AF65-F5344CB8AC3E}">
-        <p14:creationId xmlns:p14="http://schemas.microsoft.com/office/powerpoint/2010/main" val="1837489500"/>
+        <p14:creationId xmlns:p14="http://schemas.microsoft.com/office/powerpoint/2010/main" val="2973984211"/>
       </p:ext>
     </p:extLst>
   </p:cSld>
@@ -8630,7 +8487,15 @@
           <a:p>
             <a:r>
               <a:rPr lang="en-US" sz="3200" b="1" dirty="0" smtClean="0"/>
-              <a:t>‘bash’ current status</a:t>
+              <a:t>A </a:t>
+            </a:r>
+            <a:r>
+              <a:rPr lang="en-US" sz="3200" b="1" dirty="0"/>
+              <a:t>bit of </a:t>
+            </a:r>
+            <a:r>
+              <a:rPr lang="en-US" sz="3200" b="1" dirty="0" smtClean="0"/>
+              <a:t>‘bash’ history</a:t>
             </a:r>
             <a:r>
               <a:rPr lang="en-US" sz="3200" b="1" dirty="0"/>
@@ -8666,86 +8531,49 @@
           <a:p>
             <a:r>
               <a:rPr lang="da-DK" dirty="0" smtClean="0"/>
-              <a:t>‘bash’ is well maintained and still under development</a:t>
-            </a:r>
-          </a:p>
-          <a:p>
-            <a:pPr lvl="1"/>
-            <a:r>
-              <a:rPr lang="en-US" dirty="0"/>
-              <a:t>Webpage: </a:t>
-            </a:r>
-            <a:r>
-              <a:rPr lang="en-US" dirty="0">
-                <a:hlinkClick r:id="rId2"/>
-              </a:rPr>
-              <a:t>https://www.gnu.org/software/bash/</a:t>
-            </a:r>
-            <a:endParaRPr lang="en-US" dirty="0"/>
-          </a:p>
-          <a:p>
-            <a:pPr lvl="1"/>
-            <a:r>
-              <a:rPr lang="en-US" dirty="0" smtClean="0"/>
-              <a:t>Source code:</a:t>
-            </a:r>
-            <a:r>
-              <a:rPr lang="en-US" dirty="0"/>
-              <a:t> </a:t>
-            </a:r>
-            <a:r>
-              <a:rPr lang="en-US" dirty="0">
-                <a:hlinkClick r:id="rId3"/>
-              </a:rPr>
-              <a:t>http://</a:t>
-            </a:r>
-            <a:r>
-              <a:rPr lang="en-US" dirty="0" smtClean="0">
-                <a:hlinkClick r:id="rId3"/>
-              </a:rPr>
-              <a:t>git.savannah.gnu.org/cgit/bash.git</a:t>
-            </a:r>
-            <a:endParaRPr lang="da-DK" dirty="0" smtClean="0"/>
+              <a:t>Written by Brian Fox in 1989... And it’s still alive!!</a:t>
+            </a:r>
           </a:p>
           <a:p>
             <a:r>
               <a:rPr lang="da-DK" dirty="0" smtClean="0"/>
-              <a:t>Latest release: version </a:t>
-            </a:r>
-            <a:r>
-              <a:rPr lang="en-GB" dirty="0" smtClean="0"/>
-              <a:t>5.0 </a:t>
-            </a:r>
-            <a:r>
-              <a:rPr lang="en-GB" dirty="0"/>
-              <a:t>(January 7, </a:t>
-            </a:r>
-            <a:r>
-              <a:rPr lang="en-GB" dirty="0" smtClean="0"/>
-              <a:t>2019)</a:t>
-            </a:r>
-          </a:p>
-          <a:p>
-            <a:pPr lvl="1"/>
-            <a:r>
-              <a:rPr lang="en-GB" dirty="0" smtClean="0"/>
-              <a:t>The current main maintaine</a:t>
-            </a:r>
-            <a:r>
-              <a:rPr lang="en-GB" dirty="0"/>
-              <a:t>r: </a:t>
-            </a:r>
-            <a:r>
-              <a:rPr lang="en-GB" dirty="0" smtClean="0"/>
-              <a:t>Chet </a:t>
-            </a:r>
-            <a:r>
-              <a:rPr lang="en-GB" dirty="0"/>
-              <a:t>Ramey</a:t>
+              <a:t>‘bash’ is an acronym for ‘Bourne-again shell</a:t>
+            </a:r>
+            <a:r>
+              <a:rPr lang="da-DK" dirty="0"/>
+              <a:t>’ (the original shell was </a:t>
             </a:r>
             <a:r>
               <a:rPr lang="da-DK" dirty="0" smtClean="0"/>
-              <a:t> </a:t>
+              <a:t>written in 1977 by </a:t>
+            </a:r>
+            <a:r>
+              <a:rPr lang="da-DK" dirty="0"/>
+              <a:t>Stephen Bourne)</a:t>
+            </a:r>
+          </a:p>
+          <a:p>
+            <a:r>
+              <a:rPr lang="da-DK" dirty="0" smtClean="0"/>
+              <a:t>Written entirely in C </a:t>
+            </a:r>
+          </a:p>
+          <a:p>
+            <a:r>
+              <a:rPr lang="da-DK" dirty="0" smtClean="0"/>
+              <a:t>Executable: /bin/bash</a:t>
+            </a:r>
+          </a:p>
+          <a:p>
+            <a:r>
+              <a:rPr lang="da-DK" dirty="0" smtClean="0"/>
+              <a:t>File extension: .sh</a:t>
+            </a:r>
+          </a:p>
+          <a:p>
+            <a:r>
+              <a:rPr lang="da-DK" dirty="0" smtClean="0"/>
+              <a:t>Command processor / interpreted / scripting language</a:t>
             </a:r>
           </a:p>
         </p:txBody>
@@ -8827,7 +8655,7 @@
           <p:nvPr/>
         </p:nvPicPr>
         <p:blipFill>
-          <a:blip r:embed="rId4">
+          <a:blip r:embed="rId2">
             <a:extLst>
               <a:ext uri="{28A0092B-C50C-407E-A947-70E740481C1C}">
                 <a14:useLocalDpi xmlns:a14="http://schemas.microsoft.com/office/drawing/2010/main" val="0"/>
@@ -8841,7 +8669,7 @@
         </p:blipFill>
         <p:spPr bwMode="auto">
           <a:xfrm>
-            <a:off x="2590800" y="4364182"/>
+            <a:off x="2590800" y="4657725"/>
             <a:ext cx="3581400" cy="1514475"/>
           </a:xfrm>
           <a:prstGeom prst="rect">
@@ -8862,7 +8690,7 @@
     </p:spTree>
     <p:extLst>
       <p:ext uri="{BB962C8B-B14F-4D97-AF65-F5344CB8AC3E}">
-        <p14:creationId xmlns:p14="http://schemas.microsoft.com/office/powerpoint/2010/main" val="1664372768"/>
+        <p14:creationId xmlns:p14="http://schemas.microsoft.com/office/powerpoint/2010/main" val="1837489500"/>
       </p:ext>
     </p:extLst>
   </p:cSld>
@@ -8920,7 +8748,11 @@
           <a:p>
             <a:r>
               <a:rPr lang="en-US" sz="3200" b="1" dirty="0" smtClean="0"/>
-              <a:t>Testing ‘bash’ code online</a:t>
+              <a:t>‘bash’ current status</a:t>
+            </a:r>
+            <a:r>
+              <a:rPr lang="en-US" sz="3200" b="1" dirty="0"/>
+              <a:t> </a:t>
             </a:r>
             <a:endParaRPr lang="en-US" sz="3200" b="1" dirty="0">
               <a:effectLst/>
@@ -8941,7 +8773,7 @@
         <p:spPr>
           <a:xfrm>
             <a:off x="304800" y="1371600"/>
-            <a:ext cx="8686800" cy="1828800"/>
+            <a:ext cx="8686800" cy="3962400"/>
           </a:xfrm>
         </p:spPr>
         <p:txBody>
@@ -8951,37 +8783,88 @@
           <a:lstStyle/>
           <a:p>
             <a:r>
-              <a:rPr lang="en-GB" dirty="0" smtClean="0"/>
-              <a:t>In the case you do not have currently the access to </a:t>
-            </a:r>
-            <a:r>
               <a:rPr lang="da-DK" dirty="0" smtClean="0"/>
-              <a:t>the machine running Linux, you can test your ‘bash’ code online</a:t>
+              <a:t>‘bash’ is well maintained and still under development</a:t>
             </a:r>
           </a:p>
           <a:p>
             <a:pPr lvl="1"/>
             <a:r>
-              <a:rPr lang="da-DK" dirty="0" smtClean="0"/>
-              <a:t>For instance: </a:t>
-            </a:r>
-            <a:r>
-              <a:rPr lang="en-GB" dirty="0">
+              <a:rPr lang="en-US" dirty="0"/>
+              <a:t>Webpage: </a:t>
+            </a:r>
+            <a:r>
+              <a:rPr lang="en-US" dirty="0">
                 <a:hlinkClick r:id="rId2"/>
               </a:rPr>
-              <a:t>https://</a:t>
-            </a:r>
-            <a:r>
-              <a:rPr lang="en-GB" dirty="0" smtClean="0">
-                <a:hlinkClick r:id="rId2"/>
+              <a:t>https://www.gnu.org/software/bash/</a:t>
+            </a:r>
+            <a:endParaRPr lang="en-US" dirty="0"/>
+          </a:p>
+          <a:p>
+            <a:pPr lvl="1"/>
+            <a:r>
+              <a:rPr lang="en-US" dirty="0" smtClean="0"/>
+              <a:t>Source code:</a:t>
+            </a:r>
+            <a:r>
+              <a:rPr lang="en-US" dirty="0"/>
+              <a:t> </a:t>
+            </a:r>
+            <a:r>
+              <a:rPr lang="en-US" dirty="0">
+                <a:hlinkClick r:id="rId3"/>
               </a:rPr>
-              <a:t>www.tutorialspoint.com/execute_bash_online.php</a:t>
-            </a:r>
+              <a:t>http://</a:t>
+            </a:r>
+            <a:r>
+              <a:rPr lang="en-US" dirty="0" smtClean="0">
+                <a:hlinkClick r:id="rId3"/>
+              </a:rPr>
+              <a:t>git.savannah.gnu.org/cgit/bash.git</a:t>
+            </a:r>
+            <a:endParaRPr lang="da-DK" dirty="0" smtClean="0"/>
+          </a:p>
+          <a:p>
             <a:r>
               <a:rPr lang="da-DK" dirty="0" smtClean="0"/>
-              <a:t>  </a:t>
-            </a:r>
-            <a:endParaRPr lang="da-DK" dirty="0" smtClean="0"/>
+              <a:t>Latest release: version </a:t>
+            </a:r>
+            <a:r>
+              <a:rPr lang="en-GB" dirty="0" smtClean="0"/>
+              <a:t>5.0 </a:t>
+            </a:r>
+            <a:r>
+              <a:rPr lang="en-GB" dirty="0"/>
+              <a:t>(January 7, </a:t>
+            </a:r>
+            <a:r>
+              <a:rPr lang="en-GB" dirty="0" smtClean="0"/>
+              <a:t>2019)</a:t>
+            </a:r>
+          </a:p>
+          <a:p>
+            <a:pPr lvl="1"/>
+            <a:r>
+              <a:rPr lang="en-GB" dirty="0" smtClean="0"/>
+              <a:t>The current main maintaine</a:t>
+            </a:r>
+            <a:r>
+              <a:rPr lang="en-GB" dirty="0"/>
+              <a:t>r: </a:t>
+            </a:r>
+            <a:r>
+              <a:rPr lang="en-GB" dirty="0" smtClean="0"/>
+              <a:t>Chet </a:t>
+            </a:r>
+            <a:r>
+              <a:rPr lang="en-GB" dirty="0"/>
+              <a:t>Ramey</a:t>
+            </a:r>
+            <a:r>
+              <a:rPr lang="da-DK" dirty="0" smtClean="0"/>
+              <a:t> </a:t>
+            </a:r>
           </a:p>
         </p:txBody>
       </p:sp>
@@ -9009,6 +8892,240 @@
                 <a:defRPr/>
               </a:pPr>
               <a:t>22</a:t>
+            </a:fld>
+            <a:endParaRPr lang="en-US" dirty="0"/>
+          </a:p>
+        </p:txBody>
+      </p:sp>
+      <p:sp>
+        <p:nvSpPr>
+          <p:cNvPr id="5" name="AutoShape 2" descr="data:image/jpeg;base64,/9j/4AAQSkZJRgABAQAAAQABAAD/2wCEAAkGBxAPEBUPDxAQEBAPDxAQEA8PEBAQDw4PFREWFhUVFRUYHiggGBomHRYXITEhJSkrLi4uGB8zODMsNygtLisBCgoKDg0OGxAQFzIlHh8tListKy0tMS0tLS0tLS8tLi0tLS0vLSstLS0tLS0tLSstLS0wLS0tNzUtNzcrNy8tLv/AABEIAJ4BPwMBIgACEQEDEQH/xAAbAAACAwEBAQAAAAAAAAAAAAAAAQIEBQYDB//EAEMQAAEEAQMBBQMHCgUDBQAAAAEAAgMRBAUSITEGEyJBUTJhcRQVI4GRstEzUlNic4KSk6HBQkNUcrEHovAWY6Ph8f/EABkBAQEBAQEBAAAAAAAAAAAAAAABBAMCBf/EAC8RAAICAQIEBAUDBQAAAAAAAAABAhEDEiEEMUHwE1GR4SIyYYGxFEJiI0NSodH/2gAMAwEAAhEDEQA/APuKEIQAhCEAIQhACSaRQAkmkgEUJpKASCmkoUSSZQgEkmhCiKSaSgEkmkoASTSUKJJNCAikpJKAikpJKFEkmkoBJJpWEKAYSpdyfUJGVR71S0NxujPx+C8yp96k42psUghnVCbOqA2EIQtRxBCEIAQhCAEIQgEhBQgEkmUKASSaEKIpJpKAEk0kAkJpKFEkmkgEhMpKASSaShRJJpIBJKSShSKE0lAQkdQJ9FRdOvfUXVGT8P8AlYhn96zZZ06OkI2aJnS79Zpn96O/XHxDppNMTKbZllCf3qbZ/eqshNJsxutejOqpae+7+r+6us6rTB2rObVGuhCFsOAIQhACEIQAhCEAJJpFACSaRQAUk0lACRTSQokIKFAJJNBQokk0lAJJNCgEkmkoUSSaSASSkkoBJFNJQpXzot8bmjqWmviOQuNM67krj+1GnGN3fRj6N3tgf4HevwKx8XF1qXQ74WrplTv0d+sc5CXylfO8Q1aDaE69GzrEblLe0HTXzESOFRA3z/me4e73rpjbm6R4klFWzoNKiLYwT1f4vgPJXWdUJs6r6sVSSMbdmshCFrOIIQhACEIQAhCEAIQhAJCChAJBQhQCQhCFEUk0lAJCaSFEhMpKASSy4ceSW3meVtveA1pAa0BxAA49y9Pm1/8AqJv4m/guam3uonql5l9CofNr/wDUzfa38Ejpsn+pm/7PwU1S/wAfwKXmX1EmlROmyf6mb/s/BUs/Ela01kSurmjso1zR4XmWRpXp/B6UU+psd631XhmZrI2l3p6rEh1WM8FwBHUHghUdYzWTMMDHW5xF1zQXCfErTaPaxb7nSadqLZ2GSqYDV31I60vbHyWvBIPAJB+K4zE0zIa3YyTbH6bel9aW/h6RI1u0TvA61tZ1+xTFmyS/aWcIrqX58wDpR+KpS57zYLGOBFEG+QvX5kf+nd/BH+CkNFf+nP8ALj/Be34r6fg8rQupyc+jNJJbbbJpvUAelqo/Qz5O/ou2OiP/AE5/lsS+Y3/pv/iYsr4Nv9p2Wf6mLoXZ3HAD3u72Qc7Dw1p/2+f1rp6WPJAY3ljiHFoDg8DaaPlQV3Cyb4u/etGHTD4ao5zblvZbQ3qhNnVaDkaqEKMjw3r5kD6yaC0nIdrx+VN+qrJPG2zQsdRazNQztrbdQ8LgXPY9jQDI1vtCyDzx6qlLnfSBoJMjXlzQbc5he4xsDwzh0dWeTY4XCWZLY0w4aUlZvjI45FO4Lmgg7WkkWT6cL2Y8Hp5cLlflrW923Y+Nm8BjX7x+UL2uDjyHmxYB4pauBL+cSXVCHWS5wdt8w3wt+rhSGZN0XJw7irNdeQed5b5bA767IUo3X/8AlLyP5U/sh94rQZSwhcPg6zqUbAH40k8jy6y4BrY3hzfDwB4du43zyKtPO7TajC4Mdhs3Oe1jS0SuaXFhdxR5uq8tvnaA7dC4s9o9Uuvm4fl3M9skbBfn9hvolrGbq7oInQxNjm72Xvmx0WmMQF7K33/ipteddRaA7VC4sdodUsj5vBqZ7BTnDe0NcWmzwLIHPvUcXtFqr3MadPa3ewlznF4ax/ebRfurqPcgO2QuU0rVdRkyG97jtZAaZINrmmN/jJLST4qpoJ6GwQqseq6lGXnuJJnGcscx8bGxReJ20ROadzmkBniI43En0QHaoXHs1/UnUW4AFECRr3OaS7cAQw+nN2fRe+h6hnzZA76IxwGMk+HaN+1tcHkc2gOpQhCA8ioqRSXkpS0z2P35PvlXFS0z2P35PvlXLXPH8qPUuY0KG5G5etSJRJV8iOxS9tyRXl0yo5rP0ON5st5TwtFZGeG0uhLAgRhZv08Lujr4rqitDjgeStsbSKTtd4pI5t2TCahuRuXuzyTQkCherBzWvPqR59GN/us3QMovBN/4ir3aIHdIQCajbdc+qzez+K5jS3rtcQT+tfP9bXypt+L6muNaDrGOsA+5SZ1VfEdxSst6rdF2jgzUVLOl2tcQ7oK9oNa11W3c7yB4H1q6s7UQQd5LQG9Xv/JNbbbD23yTzR8l3yP4TzjScjEypDdNcG8vLiXzAsviVoe7w3u2ht+V0s3UtWjxoy6QiERvjm+kqOGJzjT4nOYfpHmya9Vbzxs3GUV4I9xnjdOSwTu8Jc00TyCBVhcT/wBRNzGQT+wzG1V78iRkNhhPsS7HGnAe/jlYYrVPS2fUm9GPUldd9+50Gha5jzOLIZWAR79zojIx8GOXAgmKQWbN80r+k9r8CR7Y4cmIFwmcIg55ETY7txqg1u0E8+a5LSdRxsnVGTt1KTNljxJWl8eHHFCI3dGPeDwb6WFk6Jpgk7PZboYw7IkdLucIy6ZzWz9A702g8BdvCjB8++130yPPPJG2u+33vf1LS+3ulzSjHjzI3SOdtjvftkPo17hTj8Cuj/zT+zb94r5HpHazRn4un4vyY5WQx8LG47IwZMeYcOkd6i+f6r64Pyp/Zt+8VqXIxvmUm6sdoLopLIshrSa9Aos1gkX3Et1YG08mul/0WnFM13LXNcASCWkGiOoU7VJyMyTVvzYZTQcTbSPZF0E36t0LYZXAuId4eW1V8efX+i0HyBoskAepNBDXAixVHmx0KAoO1Mgg93JsMe/2TvB3VVf+dUjrLQaMU11urZzVLRDwfTjrz0TtAZztUsO2RSW3oXtLWk7q+Neafzr/AOzMa60zi/ctC0WgM751H6Kb+Dp0/FeuLqAkO3u5G8E25tNv0VmOVrvZINEg0bojqFMFANCEIDyKSZSXkpR0z2P35PvlWyqWmnwfvyffKuLjD5Ue5cyKzu0ue/GwsnJjDS/HxZ5mB4JaXsjc4WBViwtFVNXwG5WPLjPLmsyIZIXObW5rZGFpIvi+VQcI/thmM0/5Y6WDc+fCiBk07Mx2QNmP0ji177mABFFtDg9bXth9s8uXHYI248s2VqT8HEygyWLFlja0udOYi4upu17du7kt6rbZ2SuFkE2blTxwzYk0IkbjNMRxnbmtBZGLBoA3Z8PFJZPYnHeJAJZ4zJnfOETonNa7Ey9tOdFx0dyS11jkr1tff09zzvXf19jWw2ZjYXiaTGkyPF3T2RyRQnwjbvYXOI5u6PSlxw7YZ0bM1jxi5D8bLxMPGyYmSR48mROWte17S5x+jLhdO93C62LSZBjSQPzMmR8wePlLjE2ePc3b9HsaGtqrHHWysfE7DRsxDguy8mSCo+5BbjRuxpGSCRsrHRxgl+4Akuu/Pqoq6l6Fc9oc9kOfGRivytMNmUNljgfC7HMwd3dk7h7O3cB52rGqavlt06PUGT40DW4TcjIEuNJNve6NrgI6lbt5JFG+oXueyDfk88PyvJ7zNeXZWURAZ52933ewgs2NbtoeFo6KZ7JsdiwYcuRPNFjTQygPEIMzYaMcUm1oBYCAfU0LKe3uPc09AlyH4sL8trG5D4mPmZGCGMe4XtAJPS66+SvoQowTaheb5KWdmansNDz/AKBSU1FblUWzH7QTyMyWiIOJcQPD1oNWjiDaPEA1x5PFWVWOoMDt4bbzxuPWlPvzMQy9pddHrXCxJrU3fPod3ySosYk4dIQ3o1vJ998K+zqvHExWxN2sHvJPVx9SvdvVaoJpbnKT8jTVPMbxwOvmCAS/o0UeD1/oriRC1NWjlF07OSnYWHvAdu3cSSIW950Y83u47x20g1xtVZ2M2R4adwcdkTZC7fP3LD4+9a+tzS4bbF3wuiycIXbW+yI+WiNgc0PJcCSOnmR9io5Wng7RtaSHubuoPDPF3kZc5/iJuuAasrDPEz6mPOmu+/8Apj6fhxxtt1DvGy7e8ijhhD99Rh8Y5LuDRW1p8LejGtY32i1rW13jhZdtNFt8iq814Q6ewU5sRYNu+nhpMW3lschNnlzi4EchauFjFtBwPh7sNJp/LWckP6nzFuTHjd79/c858ka27+yPTD0+FjjIyGNj3clwjja/nysBe/8Amn9m37xXsxlen1Lx/wA0/s2/eK3LkfNZhDR2ObujyOu8AcNYbNgAeQseSUGhNB3HI8DY6JY4NIcd19OjeennS0ToUXkXD4Vz093Hsj+qb9DiLHRguaJK3bdoJAN+nvWTwP4/7N/6nprfoil8xQ0QZrcNpslvhoOuh5DxH4UFW1LSGBoDJwDI4Nt76bdO54uzR46dArruzUQqi7hzS4miXtB6X7xx8CVI9mYDd7yHG6JBaOvAFdOR/CFHhbVaF6nqPERTvxH6Hnk6PG575BNtLn7y0Fo8QYAQT+6PgCfVQxtGYI2MfOSQS8lrqaS+Puxt+y/jyvSPszFTtxdb3SHh26gSQDZA5r7LI56q0NDi2sbbiI2bW9Pfz8fEVVid24L1PDzpKlkfp9DOOiRu+jGSdwa1tA9Swkm+f1ui9fmNnJOQ4l29zSSKG4jn3+zXvsq9JosbnOcS4F7nOsUCC6ro/UvKfs/C8MsvHdivCa3DdfP9ftKvg/wXqP1F/wBx+iKWRpEIBccjb9IHOoii4E8UD18X1cK3pODGyVzo5d5YwRPb1p3tWT6qMXZqFoIt5u6J2+GyORx1469Vd0vS2Y27YXHeQTuryFeQVhiaknpS+5MmZODSm39i8hCFqMJ5FJSKS8lM3TfY/fk++ValfTS6i4hpIaOrqHQe9VNNPg/fk++VYlaXNLQ4sJaQHiiWkjggHix71wh8p0fM4PC/6gSnBn1B8ONIIIw75LjSyuyseTcQY8lrmeCuLeBXB4W9ldsMeFsb54cyJsjYy578WQRwd5J3bRK7o0k+XPBF9QqMvYYz/KH5eWZp8rCdg99HjxY4ZEXB24taTvduA5J6cClV1v8A6eOzXB8+bueYYYnvOJE43FIXtdFZ+hB4Dg32q6rptZ43ov6326hx2ZZigyZ5NPDhKGwvEIeNtNMtEDh1+dAEkKMva5kUj5ZnSxQR6dHlPxZMUtmj3ZLo+8LrvyrZXTnzVyTsq18OfA6V23VJZZXEMAMHeQsjoc+Ktl3x1VDUuxDslsvfZhdJkadFgvkGO1oqPIdKJA0Or/Ftr3Xaiqu/Ir79S9D20xHtcQMgPZPDj9w/HkZkPknbui2xuo05oJs1wDdL2h7UwPwpdQDZmw44nLhJHskJhsPAaT+cC34grne23ZSWR0k8Imn+VZeDJNFAMfvIo8aCRgLBMdkluLTTqrrzS2OzOkyP004edE1jHtmhETRFG8YjiRGJBD4GybTZ28WnQdUVtJ7UZD5mR5TdPiMsTpnYseYX5+OzujI3dGWgP467aq75Ctwds8eTHblRwZ0kUhpmzDlLnjZuLwPzB03dL6WquH2MkbLDJNnSZDcSGeHHD4ImyBssfd/SyNNyENA8h0SzuwwlxMPF+UV83sDAX48c0U/0ezc6F5Ldw6tPO0+qOuhFfU9srt/gxta68iRr8RmaHQ48kgbiuJBkfQ8AFG7pWNL7UDIzpsJsEwbBHC9uTsd3UgkaXWTVNB42mzu56Us/G7BNZC6AZLiH6T817u6Fhu97u9rd18fs+7qtXTuz7sfKOSzIJZJjQQSwGJtPdA0tY8Pu28E23n4q7Dc1MlcprwcCHC+OvwXXShU8jFa7qFlz43NUjtjlpZxsWW0+YW7oDN79/wDhYKvyLj/9WsvN0qISkbfMdCR5D0XXYcDGMDY2hrasAe//AJWbh8bc9+h1ySVbdT1QzqhDeq+gZzTQhC0HIRFqBiF351X/AIF6IQHm2ECutjzs2ePP1UmtA6CvgpISi2CiGC93nVfVdqSEICEIQAhCEAIQhACEihANK0ihAStK1EoUAikmkoUy9P8AY/fk++VbVKAOjBa5jydzjbWOcCC4kchevf8A6kv8t/4LPF0qOr5li0bl4d/+rJ/Lf+CO/H5sn8t/4K6kSj3tFrw78ej/AOW/8Ejkt8w/+W/8E1IUWLRarfKm/rfwP/BHypv638D/AME1LzFFncjcq/ypnv8A4X/gvN+oRN4c8N/3WP8AlNS8xpZc3JFypfOkH6Vn2ps1GF3SRpr0N0prj5l0vyLRKRXj8sj/ADx/VQdqEPTvWA+m4I5R8xTMTUvyx+I+6Fu4Drjb8K+zhc7qM7XSktIcLHI5HQLc0d9x/BxWbC/6jOk18KLqG9UFNvVaziaKEIWg5ghCEAIQhACEIQAhCEAIQhACEIQAkmkUAJJpFACSaRUAJItJQoIQSkSgBFJWglCjpCSRKlglaLXmXKBkU1Cj3tczr3ilP6rWj+/91uOnAWLmlpcSbBcVm4iVxo641TswMhi3+xEVRySfnybR8GD8SVkZreDS3ezcrRjNA8i7d/uuysvDpLLfkdsr+A3ty4XtbFtyy7ykjY76x4T/AMBdf3y5jtYQ6WOuoY6/gXcf3Wji2pYznh2kZcC6vQPYd/u/sudxsf3rpNIbsBB86IWfhVUj3lexeIQ3qmUN6r6BnNBCELucwQhCAEIQgBCEIAQhCAEIQgBCEIAQhCASEFCASiVIopQpBCdIpQEUlOkqQpGkKVIpSgRpRcFMhRcEYPCRyqyzUrUjVWfDfouM76HtGFkauGyuaT5iufKl5T5zSLsLRy9Ehl5fGxx9SOftVT/0vj/mD4FzyPsKwyhlO6lA5/M1dgO1tvd6MFq9omY9jTuaW7nXXpwtiLRo2cNawD3L1+bx7l4jhyJ3Z7c41RWOpH0WFqupfSh7mkNIAvqBXqumOB8F5v0pruoaV6njySVWeYyimZ2BlNoEEG/NaHzkAqbuysR6FzP9j3NH2dE4uykQNl8jvcZHUpGOZckG4PqbuJkh7QfUK2w8qnjYYYAB0A9SrcbFvhqrc4Srof/Z"/>
+          <p:cNvSpPr>
+            <a:spLocks noChangeAspect="1" noChangeArrowheads="1"/>
+          </p:cNvSpPr>
+          <p:nvPr/>
+        </p:nvSpPr>
+        <p:spPr bwMode="auto">
+          <a:xfrm>
+            <a:off x="155575" y="-144463"/>
+            <a:ext cx="304800" cy="304801"/>
+          </a:xfrm>
+          <a:prstGeom prst="rect">
+            <a:avLst/>
+          </a:prstGeom>
+          <a:noFill/>
+          <a:extLst>
+            <a:ext uri="{909E8E84-426E-40DD-AFC4-6F175D3DCCD1}">
+              <a14:hiddenFill xmlns:a14="http://schemas.microsoft.com/office/drawing/2010/main">
+                <a:solidFill>
+                  <a:srgbClr val="FFFFFF"/>
+                </a:solidFill>
+              </a14:hiddenFill>
+            </a:ext>
+          </a:extLst>
+        </p:spPr>
+        <p:txBody>
+          <a:bodyPr vert="horz" wrap="square" lIns="91440" tIns="45720" rIns="91440" bIns="45720" numCol="1" anchor="t" anchorCtr="0" compatLnSpc="1">
+            <a:prstTxWarp prst="textNoShape">
+              <a:avLst/>
+            </a:prstTxWarp>
+          </a:bodyPr>
+          <a:lstStyle/>
+          <a:p>
+            <a:endParaRPr lang="en-US"/>
+          </a:p>
+        </p:txBody>
+      </p:sp>
+      <p:pic>
+        <p:nvPicPr>
+          <p:cNvPr id="2050" name="Picture 2" descr="https://camo.githubusercontent.com/7c9b27101ba491969d016f2f2427c3e066f7bd0b/68747470733a2f2f63646e2e7261776769742e636f6d2f6f64622f6f6666696369616c2d626173682d6c6f676f2f6d61737465722f6173736574732f4c6f676f732f4964656e746974792f504e472f424153485f6c6f676f2d7472616e73706172656e742d62672d636f6c6f722e706e67"/>
+          <p:cNvPicPr>
+            <a:picLocks noChangeAspect="1" noChangeArrowheads="1"/>
+          </p:cNvPicPr>
+          <p:nvPr/>
+        </p:nvPicPr>
+        <p:blipFill>
+          <a:blip r:embed="rId4">
+            <a:extLst>
+              <a:ext uri="{28A0092B-C50C-407E-A947-70E740481C1C}">
+                <a14:useLocalDpi xmlns:a14="http://schemas.microsoft.com/office/drawing/2010/main" val="0"/>
+              </a:ext>
+            </a:extLst>
+          </a:blip>
+          <a:srcRect/>
+          <a:stretch>
+            <a:fillRect/>
+          </a:stretch>
+        </p:blipFill>
+        <p:spPr bwMode="auto">
+          <a:xfrm>
+            <a:off x="2590800" y="4364182"/>
+            <a:ext cx="3581400" cy="1514475"/>
+          </a:xfrm>
+          <a:prstGeom prst="rect">
+            <a:avLst/>
+          </a:prstGeom>
+          <a:noFill/>
+          <a:extLst>
+            <a:ext uri="{909E8E84-426E-40DD-AFC4-6F175D3DCCD1}">
+              <a14:hiddenFill xmlns:a14="http://schemas.microsoft.com/office/drawing/2010/main">
+                <a:solidFill>
+                  <a:srgbClr val="FFFFFF"/>
+                </a:solidFill>
+              </a14:hiddenFill>
+            </a:ext>
+          </a:extLst>
+        </p:spPr>
+      </p:pic>
+    </p:spTree>
+    <p:extLst>
+      <p:ext uri="{BB962C8B-B14F-4D97-AF65-F5344CB8AC3E}">
+        <p14:creationId xmlns:p14="http://schemas.microsoft.com/office/powerpoint/2010/main" val="1664372768"/>
+      </p:ext>
+    </p:extLst>
+  </p:cSld>
+  <p:clrMapOvr>
+    <a:masterClrMapping/>
+  </p:clrMapOvr>
+  <p:timing>
+    <p:tnLst>
+      <p:par>
+        <p:cTn id="1" dur="indefinite" restart="never" nodeType="tmRoot"/>
+      </p:par>
+    </p:tnLst>
+  </p:timing>
+</p:sld>
+</file>
+
+<file path=ppt/slides/slide23.xml><?xml version="1.0" encoding="utf-8"?>
+<p:sld xmlns:a="http://schemas.openxmlformats.org/drawingml/2006/main" xmlns:r="http://schemas.openxmlformats.org/officeDocument/2006/relationships" xmlns:p="http://schemas.openxmlformats.org/presentationml/2006/main">
+  <p:cSld>
+    <p:spTree>
+      <p:nvGrpSpPr>
+        <p:cNvPr id="1" name=""/>
+        <p:cNvGrpSpPr/>
+        <p:nvPr/>
+      </p:nvGrpSpPr>
+      <p:grpSpPr>
+        <a:xfrm>
+          <a:off x="0" y="0"/>
+          <a:ext cx="0" cy="0"/>
+          <a:chOff x="0" y="0"/>
+          <a:chExt cx="0" cy="0"/>
+        </a:xfrm>
+      </p:grpSpPr>
+      <p:sp>
+        <p:nvSpPr>
+          <p:cNvPr id="2" name="Title 1"/>
+          <p:cNvSpPr>
+            <a:spLocks noGrp="1"/>
+          </p:cNvSpPr>
+          <p:nvPr>
+            <p:ph type="title"/>
+          </p:nvPr>
+        </p:nvSpPr>
+        <p:spPr>
+          <a:xfrm>
+            <a:off x="304800" y="533400"/>
+            <a:ext cx="8839200" cy="838200"/>
+          </a:xfrm>
+        </p:spPr>
+        <p:txBody>
+          <a:bodyPr>
+            <a:noAutofit/>
+          </a:bodyPr>
+          <a:lstStyle/>
+          <a:p>
+            <a:r>
+              <a:rPr lang="en-US" sz="3200" b="1" dirty="0" smtClean="0"/>
+              <a:t>Testing ‘bash’ code online</a:t>
+            </a:r>
+            <a:endParaRPr lang="en-US" sz="3200" b="1" dirty="0">
+              <a:effectLst/>
+            </a:endParaRPr>
+          </a:p>
+        </p:txBody>
+      </p:sp>
+      <p:sp>
+        <p:nvSpPr>
+          <p:cNvPr id="3" name="Content Placeholder 2"/>
+          <p:cNvSpPr>
+            <a:spLocks noGrp="1"/>
+          </p:cNvSpPr>
+          <p:nvPr>
+            <p:ph idx="1"/>
+          </p:nvPr>
+        </p:nvSpPr>
+        <p:spPr>
+          <a:xfrm>
+            <a:off x="304800" y="1371600"/>
+            <a:ext cx="8686800" cy="1828800"/>
+          </a:xfrm>
+        </p:spPr>
+        <p:txBody>
+          <a:bodyPr>
+            <a:normAutofit/>
+          </a:bodyPr>
+          <a:lstStyle/>
+          <a:p>
+            <a:r>
+              <a:rPr lang="en-GB" dirty="0" smtClean="0"/>
+              <a:t>In the case you do not have currently the access to </a:t>
+            </a:r>
+            <a:r>
+              <a:rPr lang="da-DK" dirty="0" smtClean="0"/>
+              <a:t>the machine running Linux, you can test your ‘bash’ code online</a:t>
+            </a:r>
+          </a:p>
+          <a:p>
+            <a:pPr lvl="1"/>
+            <a:r>
+              <a:rPr lang="da-DK" dirty="0" smtClean="0"/>
+              <a:t>For instance: </a:t>
+            </a:r>
+            <a:r>
+              <a:rPr lang="en-GB" dirty="0">
+                <a:hlinkClick r:id="rId2"/>
+              </a:rPr>
+              <a:t>https://</a:t>
+            </a:r>
+            <a:r>
+              <a:rPr lang="en-GB" dirty="0" smtClean="0">
+                <a:hlinkClick r:id="rId2"/>
+              </a:rPr>
+              <a:t>www.tutorialspoint.com/execute_bash_online.php</a:t>
+            </a:r>
+            <a:r>
+              <a:rPr lang="da-DK" dirty="0" smtClean="0"/>
+              <a:t>  </a:t>
+            </a:r>
+          </a:p>
+        </p:txBody>
+      </p:sp>
+      <p:sp>
+        <p:nvSpPr>
+          <p:cNvPr id="4" name="Slide Number Placeholder 3"/>
+          <p:cNvSpPr>
+            <a:spLocks noGrp="1"/>
+          </p:cNvSpPr>
+          <p:nvPr>
+            <p:ph type="sldNum" sz="quarter" idx="12"/>
+          </p:nvPr>
+        </p:nvSpPr>
+        <p:spPr/>
+        <p:txBody>
+          <a:bodyPr/>
+          <a:lstStyle/>
+          <a:p>
+            <a:pPr>
+              <a:defRPr/>
+            </a:pPr>
+            <a:fld id="{B3B39CE4-1B0F-442B-AED0-7E4EF4FD7138}" type="slidenum">
+              <a:rPr lang="en-US" smtClean="0"/>
+              <a:pPr>
+                <a:defRPr/>
+              </a:pPr>
+              <a:t>23</a:t>
             </a:fld>
             <a:endParaRPr lang="en-US" dirty="0"/>
           </a:p>
@@ -9319,7 +9436,7 @@
 </p:sld>
 </file>
 
-<file path=ppt/slides/slide23.xml><?xml version="1.0" encoding="utf-8"?>
+<file path=ppt/slides/slide24.xml><?xml version="1.0" encoding="utf-8"?>
 <p:sld xmlns:a="http://schemas.openxmlformats.org/drawingml/2006/main" xmlns:r="http://schemas.openxmlformats.org/officeDocument/2006/relationships" xmlns:p="http://schemas.openxmlformats.org/presentationml/2006/main">
   <p:cSld>
     <p:spTree>
@@ -9456,21 +9573,8 @@
             <a:pPr lvl="1"/>
             <a:r>
               <a:rPr lang="en-US" dirty="0" smtClean="0"/>
-              <a:t>generally </a:t>
-            </a:r>
-            <a:r>
-              <a:rPr lang="en-US" dirty="0" smtClean="0"/>
-              <a:t>runs </a:t>
-            </a:r>
-            <a:r>
-              <a:rPr lang="en-US" dirty="0" smtClean="0"/>
-              <a:t>faster than </a:t>
-            </a:r>
-            <a:r>
-              <a:rPr lang="en-US" dirty="0" smtClean="0"/>
-              <a:t>interpreted code</a:t>
-            </a:r>
-            <a:endParaRPr lang="en-US" dirty="0" smtClean="0"/>
+              <a:t>generally runs faster than interpreted code</a:t>
+            </a:r>
           </a:p>
           <a:p>
             <a:pPr lvl="1"/>
@@ -9504,7 +9608,7 @@
               <a:pPr>
                 <a:defRPr/>
               </a:pPr>
-              <a:t>23</a:t>
+              <a:t>24</a:t>
             </a:fld>
             <a:endParaRPr lang="en-US" dirty="0"/>
           </a:p>
@@ -9569,7 +9673,7 @@
 </p:sld>
 </file>
 
-<file path=ppt/slides/slide24.xml><?xml version="1.0" encoding="utf-8"?>
+<file path=ppt/slides/slide25.xml><?xml version="1.0" encoding="utf-8"?>
 <p:sld xmlns:a="http://schemas.openxmlformats.org/drawingml/2006/main" xmlns:r="http://schemas.openxmlformats.org/officeDocument/2006/relationships" xmlns:p="http://schemas.openxmlformats.org/presentationml/2006/main">
   <p:cSld>
     <p:spTree>
@@ -9693,23 +9797,7 @@
             <a:pPr lvl="1"/>
             <a:r>
               <a:rPr lang="en-GB" dirty="0" smtClean="0"/>
-              <a:t>If you </a:t>
-            </a:r>
-            <a:r>
-              <a:rPr lang="en-GB" dirty="0" smtClean="0"/>
-              <a:t>have ever </a:t>
-            </a:r>
-            <a:r>
-              <a:rPr lang="en-GB" dirty="0" smtClean="0"/>
-              <a:t>asked yourself </a:t>
-            </a:r>
-            <a:r>
-              <a:rPr lang="en-GB" dirty="0" smtClean="0"/>
-              <a:t>what is the software in which </a:t>
-            </a:r>
-            <a:r>
-              <a:rPr lang="en-GB" dirty="0" smtClean="0"/>
-              <a:t>the Higgs discovery plots were actually made</a:t>
+              <a:t>If you have ever asked yourself what is the software in which the Higgs discovery plots were actually made</a:t>
             </a:r>
             <a:r>
               <a:rPr lang="en-DE" dirty="0" smtClean="0"/>
@@ -9750,7 +9838,7 @@
               <a:pPr>
                 <a:defRPr/>
               </a:pPr>
-              <a:t>24</a:t>
+              <a:t>25</a:t>
             </a:fld>
             <a:endParaRPr lang="en-US" dirty="0"/>
           </a:p>
@@ -10020,19 +10108,7 @@
               <a:rPr lang="en-GB" dirty="0" smtClean="0">
                 <a:effectLst/>
               </a:rPr>
-              <a:t>At </a:t>
-            </a:r>
-            <a:r>
-              <a:rPr lang="en-GB" dirty="0" smtClean="0">
-                <a:effectLst/>
-              </a:rPr>
-              <a:t>the very </a:t>
-            </a:r>
-            <a:r>
-              <a:rPr lang="en-GB" dirty="0" smtClean="0">
-                <a:effectLst/>
-              </a:rPr>
-              <a:t>basic level, we can use ROOT for plotting, </a:t>
+              <a:t>At the very basic level, we can use ROOT for plotting, </a:t>
             </a:r>
             <a:r>
               <a:rPr lang="en-GB" dirty="0" err="1" smtClean="0">
@@ -10052,9 +10128,6 @@
               </a:rPr>
               <a:t> fitting, etc.</a:t>
             </a:r>
-            <a:endParaRPr lang="en-GB" dirty="0" smtClean="0">
-              <a:effectLst/>
-            </a:endParaRPr>
           </a:p>
           <a:p>
             <a:pPr lvl="1" fontAlgn="auto">
@@ -10072,186 +10145,6 @@
     <p:extLst>
       <p:ext uri="{BB962C8B-B14F-4D97-AF65-F5344CB8AC3E}">
         <p14:creationId xmlns:p14="http://schemas.microsoft.com/office/powerpoint/2010/main" val="3773157246"/>
-      </p:ext>
-    </p:extLst>
-  </p:cSld>
-  <p:clrMapOvr>
-    <a:masterClrMapping/>
-  </p:clrMapOvr>
-  <p:timing>
-    <p:tnLst>
-      <p:par>
-        <p:cTn id="1" dur="indefinite" restart="never" nodeType="tmRoot"/>
-      </p:par>
-    </p:tnLst>
-  </p:timing>
-</p:sld>
-</file>
-
-<file path=ppt/slides/slide25.xml><?xml version="1.0" encoding="utf-8"?>
-<p:sld xmlns:a="http://schemas.openxmlformats.org/drawingml/2006/main" xmlns:r="http://schemas.openxmlformats.org/officeDocument/2006/relationships" xmlns:p="http://schemas.openxmlformats.org/presentationml/2006/main">
-  <p:cSld>
-    <p:spTree>
-      <p:nvGrpSpPr>
-        <p:cNvPr id="1" name=""/>
-        <p:cNvGrpSpPr/>
-        <p:nvPr/>
-      </p:nvGrpSpPr>
-      <p:grpSpPr>
-        <a:xfrm>
-          <a:off x="0" y="0"/>
-          <a:ext cx="0" cy="0"/>
-          <a:chOff x="0" y="0"/>
-          <a:chExt cx="0" cy="0"/>
-        </a:xfrm>
-      </p:grpSpPr>
-      <p:sp>
-        <p:nvSpPr>
-          <p:cNvPr id="2" name="Title 1"/>
-          <p:cNvSpPr>
-            <a:spLocks noGrp="1"/>
-          </p:cNvSpPr>
-          <p:nvPr>
-            <p:ph type="title"/>
-          </p:nvPr>
-        </p:nvSpPr>
-        <p:spPr>
-          <a:xfrm>
-            <a:off x="228600" y="381000"/>
-            <a:ext cx="8686800" cy="1066800"/>
-          </a:xfrm>
-        </p:spPr>
-        <p:txBody>
-          <a:bodyPr>
-            <a:normAutofit/>
-          </a:bodyPr>
-          <a:lstStyle/>
-          <a:p>
-            <a:r>
-              <a:rPr lang="da-DK" sz="3200" b="1" dirty="0"/>
-              <a:t>Free advert (#3)</a:t>
-            </a:r>
-            <a:endParaRPr lang="en-US" sz="3200" dirty="0"/>
-          </a:p>
-        </p:txBody>
-      </p:sp>
-      <p:sp>
-        <p:nvSpPr>
-          <p:cNvPr id="3" name="Content Placeholder 2"/>
-          <p:cNvSpPr>
-            <a:spLocks noGrp="1"/>
-          </p:cNvSpPr>
-          <p:nvPr>
-            <p:ph idx="1"/>
-          </p:nvPr>
-        </p:nvSpPr>
-        <p:spPr>
-          <a:xfrm>
-            <a:off x="304800" y="1371600"/>
-            <a:ext cx="8686800" cy="1295399"/>
-          </a:xfrm>
-        </p:spPr>
-        <p:txBody>
-          <a:bodyPr>
-            <a:normAutofit/>
-          </a:bodyPr>
-          <a:lstStyle/>
-          <a:p>
-            <a:r>
-              <a:rPr lang="da-DK" dirty="0" smtClean="0"/>
-              <a:t>This is the typical heavy-ion event at Large Hadron Collider reconstructed by ALICE Collaboration</a:t>
-            </a:r>
-            <a:endParaRPr lang="en-US" dirty="0" smtClean="0"/>
-          </a:p>
-        </p:txBody>
-      </p:sp>
-      <p:sp>
-        <p:nvSpPr>
-          <p:cNvPr id="4" name="Slide Number Placeholder 3"/>
-          <p:cNvSpPr>
-            <a:spLocks noGrp="1"/>
-          </p:cNvSpPr>
-          <p:nvPr>
-            <p:ph type="sldNum" sz="quarter" idx="12"/>
-          </p:nvPr>
-        </p:nvSpPr>
-        <p:spPr/>
-        <p:txBody>
-          <a:bodyPr/>
-          <a:lstStyle/>
-          <a:p>
-            <a:pPr>
-              <a:defRPr/>
-            </a:pPr>
-            <a:fld id="{B3B39CE4-1B0F-442B-AED0-7E4EF4FD7138}" type="slidenum">
-              <a:rPr lang="en-US" smtClean="0"/>
-              <a:pPr>
-                <a:defRPr/>
-              </a:pPr>
-              <a:t>25</a:t>
-            </a:fld>
-            <a:endParaRPr lang="en-US" dirty="0"/>
-          </a:p>
-        </p:txBody>
-      </p:sp>
-      <p:pic>
-        <p:nvPicPr>
-          <p:cNvPr id="6" name="Picture 2" descr="realHI"/>
-          <p:cNvPicPr>
-            <a:picLocks noChangeAspect="1" noChangeArrowheads="1"/>
-          </p:cNvPicPr>
-          <p:nvPr/>
-        </p:nvPicPr>
-        <p:blipFill>
-          <a:blip r:embed="rId2" cstate="print">
-            <a:extLst>
-              <a:ext uri="{28A0092B-C50C-407E-A947-70E740481C1C}">
-                <a14:useLocalDpi xmlns:a14="http://schemas.microsoft.com/office/drawing/2010/main" val="0"/>
-              </a:ext>
-            </a:extLst>
-          </a:blip>
-          <a:srcRect/>
-          <a:stretch>
-            <a:fillRect/>
-          </a:stretch>
-        </p:blipFill>
-        <p:spPr bwMode="auto">
-          <a:xfrm>
-            <a:off x="1600200" y="2286000"/>
-            <a:ext cx="5955100" cy="4383617"/>
-          </a:xfrm>
-          <a:prstGeom prst="rect">
-            <a:avLst/>
-          </a:prstGeom>
-          <a:noFill/>
-          <a:ln>
-            <a:noFill/>
-          </a:ln>
-          <a:extLst>
-            <a:ext uri="{909E8E84-426E-40DD-AFC4-6F175D3DCCD1}">
-              <a14:hiddenFill xmlns:a14="http://schemas.microsoft.com/office/drawing/2010/main">
-                <a:solidFill>
-                  <a:srgbClr val="FFFFFF"/>
-                </a:solidFill>
-              </a14:hiddenFill>
-            </a:ext>
-            <a:ext uri="{91240B29-F687-4F45-9708-019B960494DF}">
-              <a14:hiddenLine xmlns:a14="http://schemas.microsoft.com/office/drawing/2010/main" w="9525">
-                <a:solidFill>
-                  <a:srgbClr val="000000"/>
-                </a:solidFill>
-                <a:miter lim="800000"/>
-                <a:headEnd/>
-                <a:tailEnd/>
-              </a14:hiddenLine>
-            </a:ext>
-          </a:extLst>
-        </p:spPr>
-      </p:pic>
-    </p:spTree>
-    <p:extLst>
-      <p:ext uri="{BB962C8B-B14F-4D97-AF65-F5344CB8AC3E}">
-        <p14:creationId xmlns:p14="http://schemas.microsoft.com/office/powerpoint/2010/main" val="2354057611"/>
       </p:ext>
     </p:extLst>
   </p:cSld>
@@ -10328,7 +10221,7 @@
         <p:spPr>
           <a:xfrm>
             <a:off x="304800" y="1371600"/>
-            <a:ext cx="8686800" cy="3581400"/>
+            <a:ext cx="8686800" cy="1295399"/>
           </a:xfrm>
         </p:spPr>
         <p:txBody>
@@ -10339,32 +10232,7 @@
           <a:p>
             <a:r>
               <a:rPr lang="da-DK" dirty="0" smtClean="0"/>
-              <a:t>Trajectories of more than 10000 particles are reconstructed by AliROOT (C++ code specific to ALICE Collaboration built on top of ROOT)</a:t>
-            </a:r>
-          </a:p>
-          <a:p>
-            <a:r>
-              <a:rPr lang="da-DK" dirty="0" smtClean="0"/>
-              <a:t>Most important major collaborations worldwide in high-energy physics currently use ROOT </a:t>
-            </a:r>
-          </a:p>
-          <a:p>
-            <a:pPr lvl="1"/>
-            <a:r>
-              <a:rPr lang="en-GB" dirty="0" smtClean="0"/>
-              <a:t>Also the future ones (e.g. CBM at GSI, which will start data taking in 2025, is developing </a:t>
-            </a:r>
-            <a:r>
-              <a:rPr lang="en-GB" dirty="0" smtClean="0"/>
-              <a:t>Cb</a:t>
-            </a:r>
-            <a:r>
-              <a:rPr lang="en-GB" dirty="0" smtClean="0"/>
-              <a:t>mRoot</a:t>
-            </a:r>
-            <a:r>
-              <a:rPr lang="en-GB" dirty="0" smtClean="0"/>
-              <a:t>) </a:t>
+              <a:t>This is the typical heavy-ion event at Large Hadron Collider reconstructed by ALICE Collaboration</a:t>
             </a:r>
             <a:endParaRPr lang="en-US" dirty="0" smtClean="0"/>
           </a:p>
@@ -10399,10 +10267,64 @@
           </a:p>
         </p:txBody>
       </p:sp>
+      <p:pic>
+        <p:nvPicPr>
+          <p:cNvPr id="6" name="Picture 2" descr="realHI"/>
+          <p:cNvPicPr>
+            <a:picLocks noChangeAspect="1" noChangeArrowheads="1"/>
+          </p:cNvPicPr>
+          <p:nvPr/>
+        </p:nvPicPr>
+        <p:blipFill>
+          <a:blip r:embed="rId2" cstate="print">
+            <a:extLst>
+              <a:ext uri="{28A0092B-C50C-407E-A947-70E740481C1C}">
+                <a14:useLocalDpi xmlns:a14="http://schemas.microsoft.com/office/drawing/2010/main" val="0"/>
+              </a:ext>
+            </a:extLst>
+          </a:blip>
+          <a:srcRect/>
+          <a:stretch>
+            <a:fillRect/>
+          </a:stretch>
+        </p:blipFill>
+        <p:spPr bwMode="auto">
+          <a:xfrm>
+            <a:off x="1600200" y="2286000"/>
+            <a:ext cx="5955100" cy="4383617"/>
+          </a:xfrm>
+          <a:prstGeom prst="rect">
+            <a:avLst/>
+          </a:prstGeom>
+          <a:noFill/>
+          <a:ln>
+            <a:noFill/>
+          </a:ln>
+          <a:extLst>
+            <a:ext uri="{909E8E84-426E-40DD-AFC4-6F175D3DCCD1}">
+              <a14:hiddenFill xmlns:a14="http://schemas.microsoft.com/office/drawing/2010/main">
+                <a:solidFill>
+                  <a:srgbClr val="FFFFFF"/>
+                </a:solidFill>
+              </a14:hiddenFill>
+            </a:ext>
+            <a:ext uri="{91240B29-F687-4F45-9708-019B960494DF}">
+              <a14:hiddenLine xmlns:a14="http://schemas.microsoft.com/office/drawing/2010/main" w="9525">
+                <a:solidFill>
+                  <a:srgbClr val="000000"/>
+                </a:solidFill>
+                <a:miter lim="800000"/>
+                <a:headEnd/>
+                <a:tailEnd/>
+              </a14:hiddenLine>
+            </a:ext>
+          </a:extLst>
+        </p:spPr>
+      </p:pic>
     </p:spTree>
     <p:extLst>
       <p:ext uri="{BB962C8B-B14F-4D97-AF65-F5344CB8AC3E}">
-        <p14:creationId xmlns:p14="http://schemas.microsoft.com/office/powerpoint/2010/main" val="2036440008"/>
+        <p14:creationId xmlns:p14="http://schemas.microsoft.com/office/powerpoint/2010/main" val="2354057611"/>
       </p:ext>
     </p:extLst>
   </p:cSld>
@@ -10460,11 +10382,7 @@
           <a:p>
             <a:r>
               <a:rPr lang="da-DK" sz="3200" b="1" dirty="0"/>
-              <a:t>Free advert </a:t>
-            </a:r>
-            <a:r>
-              <a:rPr lang="da-DK" sz="3200" b="1" dirty="0" smtClean="0"/>
-              <a:t>(#4)</a:t>
+              <a:t>Free advert (#3)</a:t>
             </a:r>
             <a:endParaRPr lang="en-US" sz="3200" dirty="0"/>
           </a:p>
@@ -10483,7 +10401,7 @@
         <p:spPr>
           <a:xfrm>
             <a:off x="304800" y="1371600"/>
-            <a:ext cx="8686800" cy="1295399"/>
+            <a:ext cx="8686800" cy="3581400"/>
           </a:xfrm>
         </p:spPr>
         <p:txBody>
@@ -10494,7 +10412,20 @@
           <a:p>
             <a:r>
               <a:rPr lang="da-DK" dirty="0" smtClean="0"/>
-              <a:t>In terms of histogramming quality and performance, it’s difficult to beat ROOT...</a:t>
+              <a:t>Trajectories of more than 10000 particles are reconstructed by AliROOT (C++ code specific to ALICE Collaboration built on top of ROOT)</a:t>
+            </a:r>
+          </a:p>
+          <a:p>
+            <a:r>
+              <a:rPr lang="da-DK" dirty="0" smtClean="0"/>
+              <a:t>Most important major collaborations worldwide in high-energy physics currently use ROOT </a:t>
+            </a:r>
+          </a:p>
+          <a:p>
+            <a:pPr lvl="1"/>
+            <a:r>
+              <a:rPr lang="en-GB" dirty="0" smtClean="0"/>
+              <a:t>Also the future ones (e.g. CBM at GSI, which will start data taking in 2025, is developing CbmRoot) </a:t>
             </a:r>
             <a:endParaRPr lang="en-US" dirty="0" smtClean="0"/>
           </a:p>
@@ -10529,64 +10460,10 @@
           </a:p>
         </p:txBody>
       </p:sp>
-      <p:pic>
-        <p:nvPicPr>
-          <p:cNvPr id="41986" name="Picture 2"/>
-          <p:cNvPicPr>
-            <a:picLocks noChangeAspect="1" noChangeArrowheads="1"/>
-          </p:cNvPicPr>
-          <p:nvPr/>
-        </p:nvPicPr>
-        <p:blipFill>
-          <a:blip r:embed="rId2">
-            <a:extLst>
-              <a:ext uri="{28A0092B-C50C-407E-A947-70E740481C1C}">
-                <a14:useLocalDpi xmlns:a14="http://schemas.microsoft.com/office/drawing/2010/main" val="0"/>
-              </a:ext>
-            </a:extLst>
-          </a:blip>
-          <a:srcRect/>
-          <a:stretch>
-            <a:fillRect/>
-          </a:stretch>
-        </p:blipFill>
-        <p:spPr bwMode="auto">
-          <a:xfrm>
-            <a:off x="1066800" y="2470562"/>
-            <a:ext cx="6905625" cy="3930238"/>
-          </a:xfrm>
-          <a:prstGeom prst="rect">
-            <a:avLst/>
-          </a:prstGeom>
-          <a:noFill/>
-          <a:ln>
-            <a:noFill/>
-          </a:ln>
-          <a:extLst>
-            <a:ext uri="{909E8E84-426E-40DD-AFC4-6F175D3DCCD1}">
-              <a14:hiddenFill xmlns:a14="http://schemas.microsoft.com/office/drawing/2010/main">
-                <a:solidFill>
-                  <a:schemeClr val="accent1"/>
-                </a:solidFill>
-              </a14:hiddenFill>
-            </a:ext>
-            <a:ext uri="{91240B29-F687-4F45-9708-019B960494DF}">
-              <a14:hiddenLine xmlns:a14="http://schemas.microsoft.com/office/drawing/2010/main" w="9525">
-                <a:solidFill>
-                  <a:schemeClr val="tx1"/>
-                </a:solidFill>
-                <a:miter lim="800000"/>
-                <a:headEnd/>
-                <a:tailEnd/>
-              </a14:hiddenLine>
-            </a:ext>
-          </a:extLst>
-        </p:spPr>
-      </p:pic>
     </p:spTree>
     <p:extLst>
       <p:ext uri="{BB962C8B-B14F-4D97-AF65-F5344CB8AC3E}">
-        <p14:creationId xmlns:p14="http://schemas.microsoft.com/office/powerpoint/2010/main" val="3267303927"/>
+        <p14:creationId xmlns:p14="http://schemas.microsoft.com/office/powerpoint/2010/main" val="2036440008"/>
       </p:ext>
     </p:extLst>
   </p:cSld>
@@ -10643,8 +10520,12 @@
           <a:lstStyle/>
           <a:p>
             <a:r>
+              <a:rPr lang="da-DK" sz="3200" b="1" dirty="0"/>
+              <a:t>Free advert </a:t>
+            </a:r>
+            <a:r>
               <a:rPr lang="da-DK" sz="3200" b="1" dirty="0" smtClean="0"/>
-              <a:t>ROOT</a:t>
+              <a:t>(#4)</a:t>
             </a:r>
             <a:endParaRPr lang="en-US" sz="3200" dirty="0"/>
           </a:p>
@@ -10663,132 +10544,19 @@
         <p:spPr>
           <a:xfrm>
             <a:off x="304800" y="1371600"/>
-            <a:ext cx="8686800" cy="3124200"/>
+            <a:ext cx="8686800" cy="1295399"/>
           </a:xfrm>
         </p:spPr>
         <p:txBody>
           <a:bodyPr>
-            <a:normAutofit lnSpcReduction="10000"/>
+            <a:normAutofit/>
           </a:bodyPr>
           <a:lstStyle/>
           <a:p>
             <a:r>
-              <a:rPr lang="en-GB" dirty="0" smtClean="0"/>
-              <a:t>Object-oriented framework, written </a:t>
-            </a:r>
-            <a:r>
-              <a:rPr lang="en-GB" dirty="0"/>
-              <a:t>mostly in C++ and developed at </a:t>
-            </a:r>
-            <a:r>
-              <a:rPr lang="en-GB" dirty="0" smtClean="0"/>
-              <a:t>CERN, </a:t>
-            </a:r>
-            <a:r>
-              <a:rPr lang="en-GB" dirty="0"/>
-              <a:t>for data analysis in high-energy </a:t>
-            </a:r>
-            <a:r>
-              <a:rPr lang="en-GB" dirty="0" smtClean="0"/>
-              <a:t>physics</a:t>
-            </a:r>
-          </a:p>
-          <a:p>
-            <a:r>
-              <a:rPr lang="en-GB" dirty="0" smtClean="0"/>
-              <a:t>The </a:t>
-            </a:r>
-            <a:r>
-              <a:rPr lang="en-GB" dirty="0"/>
-              <a:t>development was initiated by René </a:t>
-            </a:r>
-            <a:r>
-              <a:rPr lang="en-GB" dirty="0" err="1"/>
-              <a:t>Brun</a:t>
-            </a:r>
-            <a:r>
-              <a:rPr lang="en-GB" dirty="0"/>
-              <a:t> and </a:t>
-            </a:r>
-            <a:r>
-              <a:rPr lang="en-GB" dirty="0" err="1"/>
-              <a:t>Fons</a:t>
-            </a:r>
-            <a:r>
-              <a:rPr lang="en-GB" dirty="0"/>
-              <a:t> </a:t>
-            </a:r>
-            <a:r>
-              <a:rPr lang="en-GB" dirty="0" err="1"/>
-              <a:t>Rademakers</a:t>
-            </a:r>
-            <a:r>
-              <a:rPr lang="en-GB" dirty="0"/>
-              <a:t> in </a:t>
-            </a:r>
-            <a:r>
-              <a:rPr lang="en-GB" dirty="0" smtClean="0"/>
-              <a:t>1994, and is still under active development</a:t>
-            </a:r>
-          </a:p>
-          <a:p>
-            <a:pPr lvl="1"/>
-            <a:r>
-              <a:rPr lang="en-GB" dirty="0" smtClean="0"/>
-              <a:t>Latest release</a:t>
-            </a:r>
-            <a:r>
-              <a:rPr lang="en-GB" dirty="0"/>
-              <a:t>: Version </a:t>
-            </a:r>
-            <a:r>
-              <a:rPr lang="en-GB" dirty="0" smtClean="0"/>
-              <a:t>6.18.04 (September 11, </a:t>
-            </a:r>
-            <a:r>
-              <a:rPr lang="en-GB" dirty="0" smtClean="0"/>
-              <a:t>2019)</a:t>
-            </a:r>
-          </a:p>
-          <a:p>
-            <a:r>
-              <a:rPr lang="en-GB" dirty="0" smtClean="0"/>
-              <a:t>Webpage: </a:t>
-            </a:r>
-            <a:r>
-              <a:rPr lang="en-US" dirty="0">
-                <a:hlinkClick r:id="rId2"/>
-              </a:rPr>
-              <a:t>https://root.cern.ch</a:t>
-            </a:r>
-            <a:r>
-              <a:rPr lang="en-US" dirty="0" smtClean="0">
-                <a:hlinkClick r:id="rId2"/>
-              </a:rPr>
-              <a:t>/</a:t>
-            </a:r>
-            <a:endParaRPr lang="en-US" dirty="0" smtClean="0"/>
-          </a:p>
-          <a:p>
-            <a:r>
-              <a:rPr lang="en-GB" dirty="0" smtClean="0"/>
-              <a:t>Root forum: </a:t>
-            </a:r>
-            <a:r>
-              <a:rPr lang="en-US" dirty="0">
-                <a:hlinkClick r:id="rId3"/>
-              </a:rPr>
-              <a:t>https://root-forum.cern.ch</a:t>
-            </a:r>
-            <a:r>
-              <a:rPr lang="en-US" dirty="0" smtClean="0">
-                <a:hlinkClick r:id="rId3"/>
-              </a:rPr>
-              <a:t>/</a:t>
-            </a:r>
-            <a:endParaRPr lang="en-US" dirty="0" smtClean="0"/>
-          </a:p>
-          <a:p>
+              <a:rPr lang="da-DK" dirty="0" smtClean="0"/>
+              <a:t>In terms of histogramming quality and performance, it’s difficult to beat ROOT...</a:t>
+            </a:r>
             <a:endParaRPr lang="en-US" dirty="0" smtClean="0"/>
           </a:p>
         </p:txBody>
@@ -10824,14 +10592,14 @@
       </p:sp>
       <p:pic>
         <p:nvPicPr>
-          <p:cNvPr id="5122" name="Picture 2" descr="https://root.cern.ch/img/logos/ROOT_Logo/misc/logo_full-plus-text-hor.png"/>
+          <p:cNvPr id="41986" name="Picture 2"/>
           <p:cNvPicPr>
             <a:picLocks noChangeAspect="1" noChangeArrowheads="1"/>
           </p:cNvPicPr>
           <p:nvPr/>
         </p:nvPicPr>
         <p:blipFill>
-          <a:blip r:embed="rId4">
+          <a:blip r:embed="rId2">
             <a:extLst>
               <a:ext uri="{28A0092B-C50C-407E-A947-70E740481C1C}">
                 <a14:useLocalDpi xmlns:a14="http://schemas.microsoft.com/office/drawing/2010/main" val="0"/>
@@ -10845,20 +10613,33 @@
         </p:blipFill>
         <p:spPr bwMode="auto">
           <a:xfrm>
-            <a:off x="1143000" y="4343400"/>
-            <a:ext cx="6626225" cy="2264823"/>
+            <a:off x="1066800" y="2470562"/>
+            <a:ext cx="6905625" cy="3930238"/>
           </a:xfrm>
           <a:prstGeom prst="rect">
             <a:avLst/>
           </a:prstGeom>
           <a:noFill/>
+          <a:ln>
+            <a:noFill/>
+          </a:ln>
           <a:extLst>
             <a:ext uri="{909E8E84-426E-40DD-AFC4-6F175D3DCCD1}">
               <a14:hiddenFill xmlns:a14="http://schemas.microsoft.com/office/drawing/2010/main">
                 <a:solidFill>
-                  <a:srgbClr val="FFFFFF"/>
+                  <a:schemeClr val="accent1"/>
                 </a:solidFill>
               </a14:hiddenFill>
+            </a:ext>
+            <a:ext uri="{91240B29-F687-4F45-9708-019B960494DF}">
+              <a14:hiddenLine xmlns:a14="http://schemas.microsoft.com/office/drawing/2010/main" w="9525">
+                <a:solidFill>
+                  <a:schemeClr val="tx1"/>
+                </a:solidFill>
+                <a:miter lim="800000"/>
+                <a:headEnd/>
+                <a:tailEnd/>
+              </a14:hiddenLine>
             </a:ext>
           </a:extLst>
         </p:spPr>
@@ -10866,7 +10647,7 @@
     </p:spTree>
     <p:extLst>
       <p:ext uri="{BB962C8B-B14F-4D97-AF65-F5344CB8AC3E}">
-        <p14:creationId xmlns:p14="http://schemas.microsoft.com/office/powerpoint/2010/main" val="2747857359"/>
+        <p14:creationId xmlns:p14="http://schemas.microsoft.com/office/powerpoint/2010/main" val="3267303927"/>
       </p:ext>
     </p:extLst>
   </p:cSld>
@@ -10912,22 +10693,160 @@
         </p:nvSpPr>
         <p:spPr>
           <a:xfrm>
-            <a:off x="152400" y="2895600"/>
-            <a:ext cx="8839200" cy="838200"/>
+            <a:off x="228600" y="381000"/>
+            <a:ext cx="8686800" cy="1066800"/>
           </a:xfrm>
         </p:spPr>
         <p:txBody>
           <a:bodyPr>
-            <a:noAutofit/>
+            <a:normAutofit/>
           </a:bodyPr>
           <a:lstStyle/>
           <a:p>
-            <a:pPr algn="ctr"/>
-            <a:r>
-              <a:rPr lang="da-DK" b="1" dirty="0" smtClean="0"/>
-              <a:t>Thanks!</a:t>
-            </a:r>
-            <a:endParaRPr lang="en-US" dirty="0"/>
+            <a:r>
+              <a:rPr lang="da-DK" sz="3200" b="1" dirty="0" smtClean="0"/>
+              <a:t>ROOT</a:t>
+            </a:r>
+            <a:endParaRPr lang="en-US" sz="3200" dirty="0"/>
+          </a:p>
+        </p:txBody>
+      </p:sp>
+      <p:sp>
+        <p:nvSpPr>
+          <p:cNvPr id="3" name="Content Placeholder 2"/>
+          <p:cNvSpPr>
+            <a:spLocks noGrp="1"/>
+          </p:cNvSpPr>
+          <p:nvPr>
+            <p:ph idx="1"/>
+          </p:nvPr>
+        </p:nvSpPr>
+        <p:spPr>
+          <a:xfrm>
+            <a:off x="304800" y="1371600"/>
+            <a:ext cx="8686800" cy="3124200"/>
+          </a:xfrm>
+        </p:spPr>
+        <p:txBody>
+          <a:bodyPr>
+            <a:normAutofit lnSpcReduction="10000"/>
+          </a:bodyPr>
+          <a:lstStyle/>
+          <a:p>
+            <a:r>
+              <a:rPr lang="en-GB" dirty="0" smtClean="0"/>
+              <a:t>Object-oriented framework, written </a:t>
+            </a:r>
+            <a:r>
+              <a:rPr lang="en-GB" dirty="0"/>
+              <a:t>mostly in C++ and developed at </a:t>
+            </a:r>
+            <a:r>
+              <a:rPr lang="en-GB" dirty="0" smtClean="0"/>
+              <a:t>CERN, </a:t>
+            </a:r>
+            <a:r>
+              <a:rPr lang="en-GB" dirty="0"/>
+              <a:t>for data analysis in high-energy </a:t>
+            </a:r>
+            <a:r>
+              <a:rPr lang="en-GB" dirty="0" smtClean="0"/>
+              <a:t>physics</a:t>
+            </a:r>
+          </a:p>
+          <a:p>
+            <a:r>
+              <a:rPr lang="en-GB" dirty="0" smtClean="0"/>
+              <a:t>The </a:t>
+            </a:r>
+            <a:r>
+              <a:rPr lang="en-GB" dirty="0"/>
+              <a:t>development was initiated by René </a:t>
+            </a:r>
+            <a:r>
+              <a:rPr lang="en-GB" dirty="0" err="1"/>
+              <a:t>Brun</a:t>
+            </a:r>
+            <a:r>
+              <a:rPr lang="en-GB" dirty="0"/>
+              <a:t> and </a:t>
+            </a:r>
+            <a:r>
+              <a:rPr lang="en-GB" dirty="0" err="1"/>
+              <a:t>Fons</a:t>
+            </a:r>
+            <a:r>
+              <a:rPr lang="en-GB" dirty="0"/>
+              <a:t> </a:t>
+            </a:r>
+            <a:r>
+              <a:rPr lang="en-GB" dirty="0" err="1"/>
+              <a:t>Rademakers</a:t>
+            </a:r>
+            <a:r>
+              <a:rPr lang="en-GB" dirty="0"/>
+              <a:t> in </a:t>
+            </a:r>
+            <a:r>
+              <a:rPr lang="en-GB" dirty="0" smtClean="0"/>
+              <a:t>1994, and is still under active development</a:t>
+            </a:r>
+          </a:p>
+          <a:p>
+            <a:pPr lvl="1"/>
+            <a:r>
+              <a:rPr lang="en-GB" dirty="0" smtClean="0"/>
+              <a:t>Latest release</a:t>
+            </a:r>
+            <a:r>
+              <a:rPr lang="en-GB" dirty="0"/>
+              <a:t>: Version </a:t>
+            </a:r>
+            <a:r>
+              <a:rPr lang="en-GB" dirty="0" smtClean="0"/>
+              <a:t>6.18.04 (September 11, 2019)</a:t>
+            </a:r>
+          </a:p>
+          <a:p>
+            <a:r>
+              <a:rPr lang="en-GB" dirty="0" smtClean="0"/>
+              <a:t>Webpage: </a:t>
+            </a:r>
+            <a:r>
+              <a:rPr lang="en-US" dirty="0">
+                <a:hlinkClick r:id="rId2"/>
+              </a:rPr>
+              <a:t>https://root.cern.ch</a:t>
+            </a:r>
+            <a:r>
+              <a:rPr lang="en-US" dirty="0" smtClean="0">
+                <a:hlinkClick r:id="rId2"/>
+              </a:rPr>
+              <a:t>/</a:t>
+            </a:r>
+            <a:endParaRPr lang="en-US" dirty="0" smtClean="0"/>
+          </a:p>
+          <a:p>
+            <a:r>
+              <a:rPr lang="en-GB" dirty="0" smtClean="0"/>
+              <a:t>Root forum: </a:t>
+            </a:r>
+            <a:r>
+              <a:rPr lang="en-US" dirty="0">
+                <a:hlinkClick r:id="rId3"/>
+              </a:rPr>
+              <a:t>https://root-forum.cern.ch</a:t>
+            </a:r>
+            <a:r>
+              <a:rPr lang="en-US" dirty="0" smtClean="0">
+                <a:hlinkClick r:id="rId3"/>
+              </a:rPr>
+              <a:t>/</a:t>
+            </a:r>
+            <a:endParaRPr lang="en-US" dirty="0" smtClean="0"/>
+          </a:p>
+          <a:p>
+            <a:endParaRPr lang="en-US" dirty="0" smtClean="0"/>
           </a:p>
         </p:txBody>
       </p:sp>
@@ -10960,10 +10879,51 @@
           </a:p>
         </p:txBody>
       </p:sp>
+      <p:pic>
+        <p:nvPicPr>
+          <p:cNvPr id="5122" name="Picture 2" descr="https://root.cern.ch/img/logos/ROOT_Logo/misc/logo_full-plus-text-hor.png"/>
+          <p:cNvPicPr>
+            <a:picLocks noChangeAspect="1" noChangeArrowheads="1"/>
+          </p:cNvPicPr>
+          <p:nvPr/>
+        </p:nvPicPr>
+        <p:blipFill>
+          <a:blip r:embed="rId4">
+            <a:extLst>
+              <a:ext uri="{28A0092B-C50C-407E-A947-70E740481C1C}">
+                <a14:useLocalDpi xmlns:a14="http://schemas.microsoft.com/office/drawing/2010/main" val="0"/>
+              </a:ext>
+            </a:extLst>
+          </a:blip>
+          <a:srcRect/>
+          <a:stretch>
+            <a:fillRect/>
+          </a:stretch>
+        </p:blipFill>
+        <p:spPr bwMode="auto">
+          <a:xfrm>
+            <a:off x="1143000" y="4343400"/>
+            <a:ext cx="6626225" cy="2264823"/>
+          </a:xfrm>
+          <a:prstGeom prst="rect">
+            <a:avLst/>
+          </a:prstGeom>
+          <a:noFill/>
+          <a:extLst>
+            <a:ext uri="{909E8E84-426E-40DD-AFC4-6F175D3DCCD1}">
+              <a14:hiddenFill xmlns:a14="http://schemas.microsoft.com/office/drawing/2010/main">
+                <a:solidFill>
+                  <a:srgbClr val="FFFFFF"/>
+                </a:solidFill>
+              </a14:hiddenFill>
+            </a:ext>
+          </a:extLst>
+        </p:spPr>
+      </p:pic>
     </p:spTree>
     <p:extLst>
       <p:ext uri="{BB962C8B-B14F-4D97-AF65-F5344CB8AC3E}">
-        <p14:creationId xmlns:p14="http://schemas.microsoft.com/office/powerpoint/2010/main" val="2990561687"/>
+        <p14:creationId xmlns:p14="http://schemas.microsoft.com/office/powerpoint/2010/main" val="2747857359"/>
       </p:ext>
     </p:extLst>
   </p:cSld>
@@ -11055,15 +11015,7 @@
             </a:r>
             <a:r>
               <a:rPr lang="en-US" dirty="0" smtClean="0"/>
-              <a:t> </a:t>
-            </a:r>
-            <a:r>
-              <a:rPr lang="en-US" dirty="0" smtClean="0"/>
-              <a:t>‘Scientific computing in high-energy physics</a:t>
-            </a:r>
-            <a:r>
-              <a:rPr lang="en-US" dirty="0" smtClean="0"/>
-              <a:t>’</a:t>
+              <a:t> ‘Scientific computing in high-energy physics’</a:t>
             </a:r>
           </a:p>
           <a:p>
@@ -11357,13 +11309,7 @@
               <a:rPr lang="da-DK" dirty="0" smtClean="0">
                 <a:effectLst/>
               </a:rPr>
-              <a:t>SS </a:t>
-            </a:r>
-            <a:r>
-              <a:rPr lang="da-DK" dirty="0" smtClean="0">
-                <a:effectLst/>
-              </a:rPr>
-              <a:t>2020</a:t>
+              <a:t>SS 2020</a:t>
             </a:r>
             <a:endParaRPr lang="en-US" dirty="0" smtClean="0">
               <a:effectLst/>
@@ -11405,17 +11351,8 @@
               <a:rPr lang="en-US" dirty="0" smtClean="0">
                 <a:effectLst/>
               </a:rPr>
-              <a:t>12 contact days (last lecture is on July </a:t>
-            </a:r>
-            <a:r>
-              <a:rPr lang="en-US" dirty="0" smtClean="0">
-                <a:effectLst/>
-              </a:rPr>
-              <a:t>23rd) </a:t>
-            </a:r>
-            <a:endParaRPr lang="en-US" dirty="0" smtClean="0">
-              <a:effectLst/>
-            </a:endParaRPr>
+              <a:t>12 contact days (last lecture is on July 23rd) </a:t>
+            </a:r>
           </a:p>
           <a:p>
             <a:pPr marL="109728" indent="0" fontAlgn="auto">
@@ -11655,13 +11592,7 @@
               <a:rPr lang="en-GB" dirty="0" err="1" smtClean="0">
                 <a:effectLst/>
               </a:rPr>
-              <a:t>H</a:t>
-            </a:r>
-            <a:r>
-              <a:rPr lang="en-GB" dirty="0" err="1" smtClean="0">
-                <a:effectLst/>
-              </a:rPr>
-              <a:t>omeworks</a:t>
+              <a:t>Homeworks</a:t>
             </a:r>
             <a:r>
               <a:rPr lang="en-GB" dirty="0" smtClean="0">
@@ -11683,17 +11614,8 @@
               <a:rPr lang="en-US" dirty="0" smtClean="0">
                 <a:effectLst/>
               </a:rPr>
-              <a:t>Final oral </a:t>
-            </a:r>
-            <a:r>
-              <a:rPr lang="en-US" dirty="0" smtClean="0">
-                <a:effectLst/>
-              </a:rPr>
-              <a:t>examination over the final project presentation</a:t>
-            </a:r>
-            <a:endParaRPr lang="en-US" dirty="0" smtClean="0">
-              <a:effectLst/>
-            </a:endParaRPr>
+              <a:t>Final oral examination over the final project presentation</a:t>
+            </a:r>
           </a:p>
         </p:txBody>
       </p:sp>
@@ -11960,6 +11882,103 @@
 </p:sld>
 </file>
 
+<file path=ppt/slides/slide30.xml><?xml version="1.0" encoding="utf-8"?>
+<p:sld xmlns:a="http://schemas.openxmlformats.org/drawingml/2006/main" xmlns:r="http://schemas.openxmlformats.org/officeDocument/2006/relationships" xmlns:p="http://schemas.openxmlformats.org/presentationml/2006/main">
+  <p:cSld>
+    <p:spTree>
+      <p:nvGrpSpPr>
+        <p:cNvPr id="1" name=""/>
+        <p:cNvGrpSpPr/>
+        <p:nvPr/>
+      </p:nvGrpSpPr>
+      <p:grpSpPr>
+        <a:xfrm>
+          <a:off x="0" y="0"/>
+          <a:ext cx="0" cy="0"/>
+          <a:chOff x="0" y="0"/>
+          <a:chExt cx="0" cy="0"/>
+        </a:xfrm>
+      </p:grpSpPr>
+      <p:sp>
+        <p:nvSpPr>
+          <p:cNvPr id="2" name="Title 1"/>
+          <p:cNvSpPr>
+            <a:spLocks noGrp="1"/>
+          </p:cNvSpPr>
+          <p:nvPr>
+            <p:ph type="title"/>
+          </p:nvPr>
+        </p:nvSpPr>
+        <p:spPr>
+          <a:xfrm>
+            <a:off x="152400" y="2895600"/>
+            <a:ext cx="8839200" cy="838200"/>
+          </a:xfrm>
+        </p:spPr>
+        <p:txBody>
+          <a:bodyPr>
+            <a:noAutofit/>
+          </a:bodyPr>
+          <a:lstStyle/>
+          <a:p>
+            <a:pPr algn="ctr"/>
+            <a:r>
+              <a:rPr lang="da-DK" b="1" dirty="0" smtClean="0"/>
+              <a:t>Thanks!</a:t>
+            </a:r>
+            <a:endParaRPr lang="en-US" dirty="0"/>
+          </a:p>
+        </p:txBody>
+      </p:sp>
+      <p:sp>
+        <p:nvSpPr>
+          <p:cNvPr id="4" name="Slide Number Placeholder 3"/>
+          <p:cNvSpPr>
+            <a:spLocks noGrp="1"/>
+          </p:cNvSpPr>
+          <p:nvPr>
+            <p:ph type="sldNum" sz="quarter" idx="12"/>
+          </p:nvPr>
+        </p:nvSpPr>
+        <p:spPr/>
+        <p:txBody>
+          <a:bodyPr/>
+          <a:lstStyle/>
+          <a:p>
+            <a:pPr>
+              <a:defRPr/>
+            </a:pPr>
+            <a:fld id="{B3B39CE4-1B0F-442B-AED0-7E4EF4FD7138}" type="slidenum">
+              <a:rPr lang="en-US" smtClean="0"/>
+              <a:pPr>
+                <a:defRPr/>
+              </a:pPr>
+              <a:t>30</a:t>
+            </a:fld>
+            <a:endParaRPr lang="en-US" dirty="0"/>
+          </a:p>
+        </p:txBody>
+      </p:sp>
+    </p:spTree>
+    <p:extLst>
+      <p:ext uri="{BB962C8B-B14F-4D97-AF65-F5344CB8AC3E}">
+        <p14:creationId xmlns:p14="http://schemas.microsoft.com/office/powerpoint/2010/main" val="2990561687"/>
+      </p:ext>
+    </p:extLst>
+  </p:cSld>
+  <p:clrMapOvr>
+    <a:masterClrMapping/>
+  </p:clrMapOvr>
+  <p:timing>
+    <p:tnLst>
+      <p:par>
+        <p:cTn id="1" dur="indefinite" restart="never" nodeType="tmRoot"/>
+      </p:par>
+    </p:tnLst>
+  </p:timing>
+</p:sld>
+</file>
+
 <file path=ppt/slides/slide4.xml><?xml version="1.0" encoding="utf-8"?>
 <p:sld xmlns:a="http://schemas.openxmlformats.org/drawingml/2006/main" xmlns:r="http://schemas.openxmlformats.org/officeDocument/2006/relationships" xmlns:p="http://schemas.openxmlformats.org/presentationml/2006/main">
   <p:cSld>
@@ -12001,7 +12020,7 @@
           <a:p>
             <a:r>
               <a:rPr lang="da-DK" sz="3200" b="1" dirty="0" smtClean="0"/>
-              <a:t>Trivia</a:t>
+              <a:t>Webpage</a:t>
             </a:r>
             <a:endParaRPr lang="en-US" sz="3200" dirty="0"/>
           </a:p>
@@ -12020,164 +12039,34 @@
         <p:spPr>
           <a:xfrm>
             <a:off x="304800" y="1371600"/>
-            <a:ext cx="8686800" cy="4724400"/>
+            <a:ext cx="8686800" cy="1447800"/>
           </a:xfrm>
         </p:spPr>
         <p:txBody>
           <a:bodyPr>
-            <a:normAutofit lnSpcReduction="10000"/>
+            <a:normAutofit/>
           </a:bodyPr>
           <a:lstStyle/>
           <a:p>
             <a:r>
               <a:rPr lang="en-US" dirty="0" smtClean="0"/>
-              <a:t>After each lecture, the pdf and/or html files with the summary of material covered will be shared via email via official </a:t>
-            </a:r>
+              <a:t>The lecture has a dedicated webpage:</a:t>
+            </a:r>
+          </a:p>
+          <a:p>
+            <a:pPr lvl="1"/>
             <a:r>
               <a:rPr lang="en-US" dirty="0" smtClean="0"/>
-              <a:t>TUM online </a:t>
-            </a:r>
-            <a:r>
-              <a:rPr lang="en-US" dirty="0" smtClean="0"/>
-              <a:t>interface for this course</a:t>
-            </a:r>
-          </a:p>
-          <a:p>
-            <a:pPr lvl="1"/>
-            <a:r>
-              <a:rPr lang="en-GB" dirty="0" smtClean="0"/>
-              <a:t>I </a:t>
-            </a:r>
-            <a:r>
-              <a:rPr lang="en-GB" dirty="0" smtClean="0"/>
-              <a:t>am planning eventually to establish a </a:t>
-            </a:r>
-            <a:r>
-              <a:rPr lang="en-GB" dirty="0" smtClean="0"/>
-              <a:t>dedicated </a:t>
-            </a:r>
-            <a:r>
-              <a:rPr lang="en-GB" dirty="0" smtClean="0"/>
-              <a:t>webpage for the course where all that material will be </a:t>
-            </a:r>
-            <a:r>
-              <a:rPr lang="en-GB" dirty="0" smtClean="0"/>
-              <a:t>integrated</a:t>
-            </a:r>
-          </a:p>
-          <a:p>
-            <a:r>
-              <a:rPr lang="en-GB" dirty="0" smtClean="0"/>
-              <a:t>In the same way, I will also share the homework exercises</a:t>
+              <a:t>Link: https</a:t>
+            </a:r>
+            <a:r>
+              <a:rPr lang="en-US" dirty="0"/>
+              <a:t>://abilandz.gitbook.io/ph8124/v/SS2020/</a:t>
             </a:r>
             <a:endParaRPr lang="en-US" dirty="0" smtClean="0"/>
           </a:p>
           <a:p>
-            <a:pPr fontAlgn="auto">
-              <a:spcAft>
-                <a:spcPts val="0"/>
-              </a:spcAft>
-            </a:pPr>
-            <a:r>
-              <a:rPr lang="da-DK" dirty="0" smtClean="0"/>
-              <a:t>Recommended literature:</a:t>
-            </a:r>
-          </a:p>
-          <a:p>
-            <a:pPr lvl="1"/>
-            <a:r>
-              <a:rPr lang="en-GB" dirty="0" smtClean="0"/>
-              <a:t>Mendel </a:t>
-            </a:r>
-            <a:r>
-              <a:rPr lang="en-GB" dirty="0"/>
-              <a:t>Cooper: </a:t>
-            </a:r>
-            <a:r>
-              <a:rPr lang="en-GB" dirty="0" smtClean="0"/>
-              <a:t>‘Advanced </a:t>
-            </a:r>
-            <a:r>
-              <a:rPr lang="en-GB" dirty="0"/>
-              <a:t>Bash-Scripting </a:t>
-            </a:r>
-            <a:r>
-              <a:rPr lang="en-GB" dirty="0" smtClean="0"/>
-              <a:t>Guide’ </a:t>
-            </a:r>
-            <a:r>
-              <a:rPr lang="en-GB" sz="1600" dirty="0"/>
-              <a:t>(</a:t>
-            </a:r>
-            <a:r>
-              <a:rPr lang="en-GB" sz="1600" dirty="0">
-                <a:hlinkClick r:id="rId2"/>
-              </a:rPr>
-              <a:t>http://tldp.org/LDP/abs/abs-guide.pdf</a:t>
-            </a:r>
-            <a:r>
-              <a:rPr lang="en-GB" sz="1600" dirty="0"/>
-              <a:t>)</a:t>
-            </a:r>
-            <a:r>
-              <a:rPr lang="en-GB" dirty="0"/>
-              <a:t> </a:t>
-            </a:r>
-            <a:endParaRPr lang="en-GB" dirty="0" smtClean="0"/>
-          </a:p>
-          <a:p>
-            <a:pPr lvl="1"/>
-            <a:r>
-              <a:rPr lang="en-GB" dirty="0" smtClean="0"/>
-              <a:t>Cameron </a:t>
-            </a:r>
-            <a:r>
-              <a:rPr lang="en-GB" dirty="0"/>
-              <a:t>Newham and Bill Rosenblatt, </a:t>
-            </a:r>
-            <a:r>
-              <a:rPr lang="en-GB" dirty="0" smtClean="0"/>
-              <a:t>‘Learning </a:t>
-            </a:r>
-            <a:r>
-              <a:rPr lang="en-GB" dirty="0"/>
-              <a:t>the bash Shell: Unix Shell Programming (In a Nutshell (O'Reilly</a:t>
-            </a:r>
-            <a:r>
-              <a:rPr lang="en-GB" dirty="0" smtClean="0"/>
-              <a:t>))’</a:t>
-            </a:r>
-            <a:r>
-              <a:rPr lang="en-GB" dirty="0"/>
-              <a:t> </a:t>
-            </a:r>
-            <a:endParaRPr lang="en-GB" dirty="0" smtClean="0"/>
-          </a:p>
-          <a:p>
-            <a:pPr lvl="1"/>
-            <a:r>
-              <a:rPr lang="en-GB" dirty="0" smtClean="0"/>
-              <a:t>ROOT User’s </a:t>
-            </a:r>
-            <a:r>
-              <a:rPr lang="en-GB" dirty="0"/>
-              <a:t>Guide </a:t>
-            </a:r>
-            <a:r>
-              <a:rPr lang="en-GB" sz="1600" dirty="0"/>
-              <a:t>(</a:t>
-            </a:r>
-            <a:r>
-              <a:rPr lang="en-GB" sz="1600" dirty="0">
-                <a:hlinkClick r:id="rId3"/>
-              </a:rPr>
-              <a:t>https://root.cern.ch/root/htmldoc/guides/users-guide/ROOTUsersGuide.html</a:t>
-            </a:r>
-            <a:r>
-              <a:rPr lang="en-GB" sz="1600" dirty="0" smtClean="0"/>
-              <a:t>)</a:t>
-            </a:r>
-            <a:endParaRPr lang="en-GB" sz="1600" dirty="0"/>
+            <a:endParaRPr lang="en-US" dirty="0" smtClean="0"/>
           </a:p>
         </p:txBody>
       </p:sp>
@@ -12210,10 +12099,34 @@
           </a:p>
         </p:txBody>
       </p:sp>
+      <p:pic>
+        <p:nvPicPr>
+          <p:cNvPr id="8" name="Picture 7"/>
+          <p:cNvPicPr>
+            <a:picLocks noChangeAspect="1"/>
+          </p:cNvPicPr>
+          <p:nvPr/>
+        </p:nvPicPr>
+        <p:blipFill>
+          <a:blip r:embed="rId2"/>
+          <a:stretch>
+            <a:fillRect/>
+          </a:stretch>
+        </p:blipFill>
+        <p:spPr>
+          <a:xfrm>
+            <a:off x="986311" y="2286000"/>
+            <a:ext cx="7167089" cy="4328303"/>
+          </a:xfrm>
+          <a:prstGeom prst="rect">
+            <a:avLst/>
+          </a:prstGeom>
+        </p:spPr>
+      </p:pic>
     </p:spTree>
     <p:extLst>
       <p:ext uri="{BB962C8B-B14F-4D97-AF65-F5344CB8AC3E}">
-        <p14:creationId xmlns:p14="http://schemas.microsoft.com/office/powerpoint/2010/main" val="2656517080"/>
+        <p14:creationId xmlns:p14="http://schemas.microsoft.com/office/powerpoint/2010/main" val="2098265673"/>
       </p:ext>
     </p:extLst>
   </p:cSld>
@@ -12290,7 +12203,7 @@
         <p:spPr>
           <a:xfrm>
             <a:off x="304800" y="1371600"/>
-            <a:ext cx="8686800" cy="1981200"/>
+            <a:ext cx="8686800" cy="4724400"/>
           </a:xfrm>
         </p:spPr>
         <p:txBody>
@@ -12301,57 +12214,153 @@
           <a:p>
             <a:r>
               <a:rPr lang="en-US" dirty="0" smtClean="0"/>
-              <a:t>Grading:</a:t>
+              <a:t>After each lecture</a:t>
+            </a:r>
+            <a:r>
+              <a:rPr lang="en-US" dirty="0" smtClean="0"/>
+              <a:t>, executive summary </a:t>
+            </a:r>
+            <a:r>
+              <a:rPr lang="en-US" dirty="0" smtClean="0"/>
+              <a:t>of </a:t>
+            </a:r>
+            <a:r>
+              <a:rPr lang="en-US" dirty="0" smtClean="0"/>
+              <a:t>the covered material will </a:t>
+            </a:r>
+            <a:r>
+              <a:rPr lang="en-US" dirty="0" smtClean="0"/>
+              <a:t>be shared via email via official TUM online interface for this </a:t>
+            </a:r>
+            <a:r>
+              <a:rPr lang="en-US" dirty="0" smtClean="0"/>
+              <a:t>course</a:t>
+            </a:r>
+          </a:p>
+          <a:p>
+            <a:r>
+              <a:rPr lang="en-US" dirty="0" smtClean="0"/>
+              <a:t>The course webpage will be updated regularly</a:t>
+            </a:r>
+            <a:endParaRPr lang="en-US" dirty="0" smtClean="0"/>
+          </a:p>
+          <a:p>
+            <a:r>
+              <a:rPr lang="en-GB" dirty="0" smtClean="0"/>
+              <a:t>In </a:t>
+            </a:r>
+            <a:r>
+              <a:rPr lang="en-GB" dirty="0" smtClean="0"/>
+              <a:t>the same way, I will also share the homework exercises</a:t>
+            </a:r>
+            <a:endParaRPr lang="en-US" dirty="0" smtClean="0"/>
+          </a:p>
+          <a:p>
+            <a:pPr fontAlgn="auto">
+              <a:spcAft>
+                <a:spcPts val="0"/>
+              </a:spcAft>
+            </a:pPr>
+            <a:r>
+              <a:rPr lang="da-DK" dirty="0" smtClean="0"/>
+              <a:t>Recommended literature:</a:t>
             </a:r>
           </a:p>
           <a:p>
             <a:pPr lvl="1"/>
             <a:r>
-              <a:rPr lang="da-DK" dirty="0" smtClean="0"/>
-              <a:t>3 </a:t>
-            </a:r>
-            <a:r>
-              <a:rPr lang="da-DK" dirty="0" smtClean="0"/>
-              <a:t>ECTS points</a:t>
-            </a:r>
+              <a:rPr lang="en-GB" dirty="0" smtClean="0"/>
+              <a:t>Mendel </a:t>
+            </a:r>
+            <a:r>
+              <a:rPr lang="en-GB" dirty="0"/>
+              <a:t>Cooper: </a:t>
+            </a:r>
+            <a:r>
+              <a:rPr lang="en-GB" dirty="0" smtClean="0"/>
+              <a:t>‘Advanced </a:t>
+            </a:r>
+            <a:r>
+              <a:rPr lang="en-GB" dirty="0"/>
+              <a:t>Bash-Scripting </a:t>
+            </a:r>
+            <a:r>
+              <a:rPr lang="en-GB" dirty="0" smtClean="0"/>
+              <a:t>Guide’ </a:t>
+            </a:r>
+            <a:r>
+              <a:rPr lang="en-GB" sz="1600" dirty="0"/>
+              <a:t>(</a:t>
+            </a:r>
+            <a:r>
+              <a:rPr lang="en-GB" sz="1600" dirty="0">
+                <a:hlinkClick r:id="rId2"/>
+              </a:rPr>
+              <a:t>http://tldp.org/LDP/abs/abs-guide.pdf</a:t>
+            </a:r>
+            <a:r>
+              <a:rPr lang="en-GB" sz="1600" dirty="0"/>
+              <a:t>)</a:t>
+            </a:r>
+            <a:r>
+              <a:rPr lang="en-GB" dirty="0"/>
+              <a:t> </a:t>
+            </a:r>
+            <a:endParaRPr lang="en-GB" dirty="0" smtClean="0"/>
           </a:p>
           <a:p>
             <a:pPr lvl="1"/>
             <a:r>
-              <a:rPr lang="da-DK" dirty="0" smtClean="0"/>
-              <a:t>Final grade = grade </a:t>
-            </a:r>
-            <a:r>
-              <a:rPr lang="da-DK" dirty="0" smtClean="0"/>
-              <a:t>at final project </a:t>
-            </a:r>
-            <a:r>
-              <a:rPr lang="da-DK" dirty="0" smtClean="0"/>
-              <a:t>examination - ‘1 unit’ if you have completed correctly 75% of all homeworks</a:t>
-            </a:r>
-          </a:p>
-          <a:p>
-            <a:pPr lvl="2"/>
-            <a:r>
-              <a:rPr lang="da-DK" dirty="0" smtClean="0"/>
-              <a:t>There will be in total 10 homework </a:t>
-            </a:r>
-            <a:r>
-              <a:rPr lang="da-DK" dirty="0" smtClean="0"/>
-              <a:t>exercises, </a:t>
-            </a:r>
-            <a:r>
-              <a:rPr lang="da-DK" dirty="0" smtClean="0"/>
-              <a:t>one after each lecture</a:t>
-            </a:r>
-          </a:p>
-          <a:p>
-            <a:pPr lvl="2"/>
-            <a:endParaRPr lang="da-DK" dirty="0" smtClean="0"/>
+              <a:rPr lang="en-GB" dirty="0" smtClean="0"/>
+              <a:t>Cameron </a:t>
+            </a:r>
+            <a:r>
+              <a:rPr lang="en-GB" dirty="0"/>
+              <a:t>Newham and Bill Rosenblatt, </a:t>
+            </a:r>
+            <a:r>
+              <a:rPr lang="en-GB" dirty="0" smtClean="0"/>
+              <a:t>‘Learning </a:t>
+            </a:r>
+            <a:r>
+              <a:rPr lang="en-GB" dirty="0"/>
+              <a:t>the bash Shell: Unix Shell Programming (In a Nutshell (O'Reilly</a:t>
+            </a:r>
+            <a:r>
+              <a:rPr lang="en-GB" dirty="0" smtClean="0"/>
+              <a:t>))’</a:t>
+            </a:r>
+            <a:r>
+              <a:rPr lang="en-GB" dirty="0"/>
+              <a:t> </a:t>
+            </a:r>
+            <a:endParaRPr lang="en-GB" dirty="0" smtClean="0"/>
           </a:p>
           <a:p>
             <a:pPr lvl="1"/>
-            <a:endParaRPr lang="da-DK" dirty="0" smtClean="0"/>
+            <a:r>
+              <a:rPr lang="en-GB" dirty="0" smtClean="0"/>
+              <a:t>ROOT User’s </a:t>
+            </a:r>
+            <a:r>
+              <a:rPr lang="en-GB" dirty="0"/>
+              <a:t>Guide </a:t>
+            </a:r>
+            <a:r>
+              <a:rPr lang="en-GB" sz="1600" dirty="0"/>
+              <a:t>(</a:t>
+            </a:r>
+            <a:r>
+              <a:rPr lang="en-GB" sz="1600" dirty="0">
+                <a:hlinkClick r:id="rId3"/>
+              </a:rPr>
+              <a:t>https://root.cern.ch/root/htmldoc/guides/users-guide/ROOTUsersGuide.html</a:t>
+            </a:r>
+            <a:r>
+              <a:rPr lang="en-GB" sz="1600" dirty="0" smtClean="0"/>
+              <a:t>)</a:t>
+            </a:r>
+            <a:endParaRPr lang="en-GB" sz="1600" dirty="0"/>
           </a:p>
         </p:txBody>
       </p:sp>
@@ -12379,6 +12388,160 @@
                 <a:defRPr/>
               </a:pPr>
               <a:t>5</a:t>
+            </a:fld>
+            <a:endParaRPr lang="en-US" dirty="0"/>
+          </a:p>
+        </p:txBody>
+      </p:sp>
+    </p:spTree>
+    <p:extLst>
+      <p:ext uri="{BB962C8B-B14F-4D97-AF65-F5344CB8AC3E}">
+        <p14:creationId xmlns:p14="http://schemas.microsoft.com/office/powerpoint/2010/main" val="2656517080"/>
+      </p:ext>
+    </p:extLst>
+  </p:cSld>
+  <p:clrMapOvr>
+    <a:masterClrMapping/>
+  </p:clrMapOvr>
+  <p:timing>
+    <p:tnLst>
+      <p:par>
+        <p:cTn id="1" dur="indefinite" restart="never" nodeType="tmRoot"/>
+      </p:par>
+    </p:tnLst>
+  </p:timing>
+</p:sld>
+</file>
+
+<file path=ppt/slides/slide6.xml><?xml version="1.0" encoding="utf-8"?>
+<p:sld xmlns:a="http://schemas.openxmlformats.org/drawingml/2006/main" xmlns:r="http://schemas.openxmlformats.org/officeDocument/2006/relationships" xmlns:p="http://schemas.openxmlformats.org/presentationml/2006/main">
+  <p:cSld>
+    <p:spTree>
+      <p:nvGrpSpPr>
+        <p:cNvPr id="1" name=""/>
+        <p:cNvGrpSpPr/>
+        <p:nvPr/>
+      </p:nvGrpSpPr>
+      <p:grpSpPr>
+        <a:xfrm>
+          <a:off x="0" y="0"/>
+          <a:ext cx="0" cy="0"/>
+          <a:chOff x="0" y="0"/>
+          <a:chExt cx="0" cy="0"/>
+        </a:xfrm>
+      </p:grpSpPr>
+      <p:sp>
+        <p:nvSpPr>
+          <p:cNvPr id="2" name="Title 1"/>
+          <p:cNvSpPr>
+            <a:spLocks noGrp="1"/>
+          </p:cNvSpPr>
+          <p:nvPr>
+            <p:ph type="title"/>
+          </p:nvPr>
+        </p:nvSpPr>
+        <p:spPr>
+          <a:xfrm>
+            <a:off x="228600" y="381000"/>
+            <a:ext cx="8686800" cy="1066800"/>
+          </a:xfrm>
+        </p:spPr>
+        <p:txBody>
+          <a:bodyPr>
+            <a:normAutofit/>
+          </a:bodyPr>
+          <a:lstStyle/>
+          <a:p>
+            <a:r>
+              <a:rPr lang="da-DK" sz="3200" b="1" dirty="0" smtClean="0"/>
+              <a:t>Trivia</a:t>
+            </a:r>
+            <a:endParaRPr lang="en-US" sz="3200" dirty="0"/>
+          </a:p>
+        </p:txBody>
+      </p:sp>
+      <p:sp>
+        <p:nvSpPr>
+          <p:cNvPr id="3" name="Content Placeholder 2"/>
+          <p:cNvSpPr>
+            <a:spLocks noGrp="1"/>
+          </p:cNvSpPr>
+          <p:nvPr>
+            <p:ph idx="1"/>
+          </p:nvPr>
+        </p:nvSpPr>
+        <p:spPr>
+          <a:xfrm>
+            <a:off x="304800" y="1371600"/>
+            <a:ext cx="8686800" cy="1981200"/>
+          </a:xfrm>
+        </p:spPr>
+        <p:txBody>
+          <a:bodyPr>
+            <a:normAutofit/>
+          </a:bodyPr>
+          <a:lstStyle/>
+          <a:p>
+            <a:r>
+              <a:rPr lang="en-US" dirty="0" smtClean="0"/>
+              <a:t>Grading:</a:t>
+            </a:r>
+          </a:p>
+          <a:p>
+            <a:pPr lvl="1"/>
+            <a:r>
+              <a:rPr lang="da-DK" dirty="0" smtClean="0"/>
+              <a:t>3 ECTS points</a:t>
+            </a:r>
+          </a:p>
+          <a:p>
+            <a:pPr lvl="1"/>
+            <a:r>
+              <a:rPr lang="da-DK" dirty="0" smtClean="0"/>
+              <a:t>Final grade = grade at final project examination - ‘1 unit’ if you have completed correctly 75% of all homeworks</a:t>
+            </a:r>
+          </a:p>
+          <a:p>
+            <a:pPr lvl="2"/>
+            <a:r>
+              <a:rPr lang="da-DK" dirty="0" smtClean="0"/>
+              <a:t>There will be in total 10 homework exercises, one after each lecture</a:t>
+            </a:r>
+          </a:p>
+          <a:p>
+            <a:pPr lvl="2"/>
+            <a:endParaRPr lang="da-DK" dirty="0" smtClean="0"/>
+          </a:p>
+          <a:p>
+            <a:pPr lvl="1"/>
+            <a:endParaRPr lang="da-DK" dirty="0" smtClean="0"/>
+          </a:p>
+        </p:txBody>
+      </p:sp>
+      <p:sp>
+        <p:nvSpPr>
+          <p:cNvPr id="4" name="Slide Number Placeholder 3"/>
+          <p:cNvSpPr>
+            <a:spLocks noGrp="1"/>
+          </p:cNvSpPr>
+          <p:nvPr>
+            <p:ph type="sldNum" sz="quarter" idx="12"/>
+          </p:nvPr>
+        </p:nvSpPr>
+        <p:spPr/>
+        <p:txBody>
+          <a:bodyPr/>
+          <a:lstStyle/>
+          <a:p>
+            <a:pPr>
+              <a:defRPr/>
+            </a:pPr>
+            <a:fld id="{B3B39CE4-1B0F-442B-AED0-7E4EF4FD7138}" type="slidenum">
+              <a:rPr lang="en-US" smtClean="0"/>
+              <a:pPr>
+                <a:defRPr/>
+              </a:pPr>
+              <a:t>6</a:t>
             </a:fld>
             <a:endParaRPr lang="en-US" dirty="0"/>
           </a:p>
@@ -12581,13 +12744,7 @@
               <a:rPr lang="da-DK" dirty="0" smtClean="0">
                 <a:effectLst/>
               </a:rPr>
-              <a:t>Oral </a:t>
-            </a:r>
-            <a:r>
-              <a:rPr lang="da-DK" dirty="0" smtClean="0">
-                <a:effectLst/>
-              </a:rPr>
-              <a:t>examination at the final project presentation:</a:t>
+              <a:t>Oral examination at the final project presentation:</a:t>
             </a:r>
             <a:endParaRPr lang="en-US" dirty="0" smtClean="0">
               <a:effectLst/>
@@ -12697,204 +12854,6 @@
     <p:extLst>
       <p:ext uri="{BB962C8B-B14F-4D97-AF65-F5344CB8AC3E}">
         <p14:creationId xmlns:p14="http://schemas.microsoft.com/office/powerpoint/2010/main" val="552673270"/>
-      </p:ext>
-    </p:extLst>
-  </p:cSld>
-  <p:clrMapOvr>
-    <a:masterClrMapping/>
-  </p:clrMapOvr>
-  <p:timing>
-    <p:tnLst>
-      <p:par>
-        <p:cTn id="1" dur="indefinite" restart="never" nodeType="tmRoot"/>
-      </p:par>
-    </p:tnLst>
-  </p:timing>
-</p:sld>
-</file>
-
-<file path=ppt/slides/slide6.xml><?xml version="1.0" encoding="utf-8"?>
-<p:sld xmlns:a="http://schemas.openxmlformats.org/drawingml/2006/main" xmlns:r="http://schemas.openxmlformats.org/officeDocument/2006/relationships" xmlns:p="http://schemas.openxmlformats.org/presentationml/2006/main">
-  <p:cSld>
-    <p:spTree>
-      <p:nvGrpSpPr>
-        <p:cNvPr id="1" name=""/>
-        <p:cNvGrpSpPr/>
-        <p:nvPr/>
-      </p:nvGrpSpPr>
-      <p:grpSpPr>
-        <a:xfrm>
-          <a:off x="0" y="0"/>
-          <a:ext cx="0" cy="0"/>
-          <a:chOff x="0" y="0"/>
-          <a:chExt cx="0" cy="0"/>
-        </a:xfrm>
-      </p:grpSpPr>
-      <p:sp>
-        <p:nvSpPr>
-          <p:cNvPr id="2" name="Title 1"/>
-          <p:cNvSpPr>
-            <a:spLocks noGrp="1"/>
-          </p:cNvSpPr>
-          <p:nvPr>
-            <p:ph type="title"/>
-          </p:nvPr>
-        </p:nvSpPr>
-        <p:spPr>
-          <a:xfrm>
-            <a:off x="228600" y="381000"/>
-            <a:ext cx="8686800" cy="1066800"/>
-          </a:xfrm>
-        </p:spPr>
-        <p:txBody>
-          <a:bodyPr>
-            <a:normAutofit/>
-          </a:bodyPr>
-          <a:lstStyle/>
-          <a:p>
-            <a:r>
-              <a:rPr lang="en-US" sz="3200" b="1" dirty="0" smtClean="0">
-                <a:effectLst/>
-              </a:rPr>
-              <a:t>Trivia</a:t>
-            </a:r>
-            <a:endParaRPr lang="en-US" sz="3200" dirty="0"/>
-          </a:p>
-        </p:txBody>
-      </p:sp>
-      <p:sp>
-        <p:nvSpPr>
-          <p:cNvPr id="3" name="Content Placeholder 2"/>
-          <p:cNvSpPr>
-            <a:spLocks noGrp="1"/>
-          </p:cNvSpPr>
-          <p:nvPr>
-            <p:ph idx="1"/>
-          </p:nvPr>
-        </p:nvSpPr>
-        <p:spPr>
-          <a:xfrm>
-            <a:off x="304800" y="1371600"/>
-            <a:ext cx="8686800" cy="4724400"/>
-          </a:xfrm>
-        </p:spPr>
-        <p:txBody>
-          <a:bodyPr>
-            <a:normAutofit/>
-          </a:bodyPr>
-          <a:lstStyle/>
-          <a:p>
-            <a:r>
-              <a:rPr lang="da-DK" dirty="0" smtClean="0"/>
-              <a:t>Preliminary list of topics to be covered:</a:t>
-            </a:r>
-            <a:endParaRPr lang="en-US" dirty="0" smtClean="0"/>
-          </a:p>
-          <a:p>
-            <a:pPr lvl="1"/>
-            <a:r>
-              <a:rPr lang="en-GB" b="1" dirty="0"/>
-              <a:t>Linux: </a:t>
-            </a:r>
-            <a:r>
-              <a:rPr lang="en-GB" dirty="0" err="1"/>
-              <a:t>filesystem</a:t>
-            </a:r>
-            <a:r>
-              <a:rPr lang="en-GB" dirty="0"/>
-              <a:t> hierarchy and file manipulation, handling processes and jobs, frequently used </a:t>
-            </a:r>
-            <a:r>
-              <a:rPr lang="en-GB" dirty="0" smtClean="0"/>
-              <a:t>commands, etc.</a:t>
-            </a:r>
-          </a:p>
-          <a:p>
-            <a:pPr lvl="1"/>
-            <a:r>
-              <a:rPr lang="en-US" b="1" dirty="0"/>
-              <a:t>Bash: </a:t>
-            </a:r>
-            <a:r>
-              <a:rPr lang="en-US" dirty="0"/>
-              <a:t>shell environment, variables, string manipulation, built-in commands, aliases, functions, conditional statements, loops, command substitution, command chain, test constructs, piping, redirections, code blocks, subshells, process substitution, brace expansion, regular expressions, here-strings and here-documents, etc</a:t>
-            </a:r>
-            <a:r>
-              <a:rPr lang="en-US" dirty="0" smtClean="0"/>
-              <a:t>.</a:t>
-            </a:r>
-          </a:p>
-          <a:p>
-            <a:pPr lvl="1"/>
-            <a:r>
-              <a:rPr lang="en-GB" b="1" dirty="0"/>
-              <a:t>ROOT: </a:t>
-            </a:r>
-            <a:r>
-              <a:rPr lang="en-GB" dirty="0"/>
-              <a:t>using ROOT GUI, plotting, </a:t>
-            </a:r>
-            <a:r>
-              <a:rPr lang="en-GB" dirty="0" err="1"/>
-              <a:t>histogramming</a:t>
-            </a:r>
-            <a:r>
-              <a:rPr lang="en-GB" dirty="0" smtClean="0"/>
-              <a:t>, functions, </a:t>
-            </a:r>
-            <a:r>
-              <a:rPr lang="en-GB" dirty="0"/>
-              <a:t>fitting, trees</a:t>
-            </a:r>
-            <a:r>
-              <a:rPr lang="en-GB" dirty="0" smtClean="0"/>
-              <a:t>, file merging, </a:t>
-            </a:r>
-            <a:r>
-              <a:rPr lang="en-GB" dirty="0"/>
-              <a:t>etc</a:t>
-            </a:r>
-            <a:r>
-              <a:rPr lang="en-GB" dirty="0" smtClean="0"/>
-              <a:t>.</a:t>
-            </a:r>
-            <a:endParaRPr lang="en-GB" dirty="0"/>
-          </a:p>
-        </p:txBody>
-      </p:sp>
-      <p:sp>
-        <p:nvSpPr>
-          <p:cNvPr id="4" name="Slide Number Placeholder 3"/>
-          <p:cNvSpPr>
-            <a:spLocks noGrp="1"/>
-          </p:cNvSpPr>
-          <p:nvPr>
-            <p:ph type="sldNum" sz="quarter" idx="12"/>
-          </p:nvPr>
-        </p:nvSpPr>
-        <p:spPr/>
-        <p:txBody>
-          <a:bodyPr/>
-          <a:lstStyle/>
-          <a:p>
-            <a:pPr>
-              <a:defRPr/>
-            </a:pPr>
-            <a:fld id="{B3B39CE4-1B0F-442B-AED0-7E4EF4FD7138}" type="slidenum">
-              <a:rPr lang="en-US" smtClean="0"/>
-              <a:pPr>
-                <a:defRPr/>
-              </a:pPr>
-              <a:t>6</a:t>
-            </a:fld>
-            <a:endParaRPr lang="en-US" dirty="0"/>
-          </a:p>
-        </p:txBody>
-      </p:sp>
-    </p:spTree>
-    <p:extLst>
-      <p:ext uri="{BB962C8B-B14F-4D97-AF65-F5344CB8AC3E}">
-        <p14:creationId xmlns:p14="http://schemas.microsoft.com/office/powerpoint/2010/main" val="4048055160"/>
       </p:ext>
     </p:extLst>
   </p:cSld>
@@ -12983,80 +12942,80 @@
           <a:lstStyle/>
           <a:p>
             <a:r>
-              <a:rPr lang="da-DK" dirty="0"/>
-              <a:t>Course </a:t>
-            </a:r>
-            <a:r>
               <a:rPr lang="da-DK" dirty="0" smtClean="0"/>
-              <a:t>classification</a:t>
-            </a:r>
+              <a:t>Preliminary list of topics to be covered:</a:t>
+            </a:r>
+            <a:endParaRPr lang="en-US" dirty="0" smtClean="0"/>
           </a:p>
           <a:p>
             <a:pPr lvl="1"/>
             <a:r>
-              <a:rPr lang="da-DK" dirty="0" smtClean="0"/>
-              <a:t>At the moment, classified as a </a:t>
-            </a:r>
-            <a:r>
-              <a:rPr lang="da-DK" dirty="0" smtClean="0"/>
-              <a:t>‘</a:t>
+              <a:rPr lang="en-GB" b="1" dirty="0"/>
+              <a:t>Linux: </a:t>
+            </a:r>
+            <a:r>
+              <a:rPr lang="en-GB" dirty="0" err="1"/>
+              <a:t>filesystem</a:t>
+            </a:r>
+            <a:r>
+              <a:rPr lang="en-GB" dirty="0"/>
+              <a:t> hierarchy and file manipulation, handling processes and jobs, frequently used </a:t>
             </a:r>
             <a:r>
               <a:rPr lang="en-GB" dirty="0" smtClean="0"/>
-              <a:t>Non-physics elective course’, </a:t>
+              <a:t>commands, etc.</a:t>
+            </a:r>
+          </a:p>
+          <a:p>
+            <a:pPr lvl="1"/>
+            <a:r>
+              <a:rPr lang="en-US" b="1" dirty="0"/>
+              <a:t>Bash: </a:t>
+            </a:r>
+            <a:r>
+              <a:rPr lang="en-US" dirty="0"/>
+              <a:t>shell environment, variables, string manipulation, built-in commands, aliases, functions, conditional statements, loops, command substitution, command chain, test constructs, piping, redirections, code blocks, subshells, process substitution, brace expansion, regular expressions, here-strings and here-documents, etc</a:t>
+            </a:r>
+            <a:r>
+              <a:rPr lang="en-US" dirty="0" smtClean="0"/>
+              <a:t>.</a:t>
+            </a:r>
+          </a:p>
+          <a:p>
+            <a:pPr lvl="1"/>
+            <a:r>
+              <a:rPr lang="en-GB" b="1" dirty="0"/>
+              <a:t>ROOT: </a:t>
             </a:r>
             <a:r>
               <a:rPr lang="en-GB" dirty="0"/>
-              <a:t>open both to Bachelor and </a:t>
+              <a:t>using ROOT GUI, plotting, </a:t>
+            </a:r>
+            <a:r>
+              <a:rPr lang="en-GB" dirty="0" err="1"/>
+              <a:t>histogramming</a:t>
             </a:r>
             <a:r>
               <a:rPr lang="en-GB" dirty="0" smtClean="0"/>
-              <a:t>Master students</a:t>
-            </a:r>
-          </a:p>
-          <a:p>
-            <a:pPr lvl="2"/>
-            <a:r>
-              <a:rPr lang="en-GB" dirty="0">
-                <a:hlinkClick r:id="rId2"/>
-              </a:rPr>
-              <a:t>https://www.ph.tum.de/academics/msc/physics/nonphys/</a:t>
+              <a:t>, functions, </a:t>
+            </a:r>
+            <a:r>
+              <a:rPr lang="en-GB" dirty="0"/>
+              <a:t>fitting, trees</a:t>
             </a:r>
             <a:r>
               <a:rPr lang="en-GB" dirty="0" smtClean="0"/>
-              <a:t> </a:t>
-            </a:r>
-            <a:endParaRPr lang="da-DK" dirty="0" smtClean="0"/>
-          </a:p>
-          <a:p>
-            <a:r>
-              <a:rPr lang="da-DK" dirty="0" smtClean="0"/>
-              <a:t>Course evaluation</a:t>
-            </a:r>
-            <a:endParaRPr lang="en-US" dirty="0" smtClean="0"/>
-          </a:p>
-          <a:p>
-            <a:pPr lvl="1"/>
+              <a:t>, file merging, </a:t>
+            </a:r>
+            <a:r>
+              <a:rPr lang="en-GB" dirty="0"/>
+              <a:t>etc</a:t>
+            </a:r>
             <a:r>
               <a:rPr lang="en-GB" dirty="0" smtClean="0"/>
-              <a:t>At some point during the lecture, you will be asked to evaluate the quality of this course: Please, do it! </a:t>
-            </a:r>
-            <a:r>
-              <a:rPr lang="en-GB" dirty="0" smtClean="0"/>
-              <a:t>(</a:t>
-            </a:r>
-            <a:r>
-              <a:rPr lang="en-GB" dirty="0"/>
-              <a:t>r</a:t>
-            </a:r>
-            <a:r>
-              <a:rPr lang="en-GB" dirty="0" smtClean="0"/>
-              <a:t>eminder </a:t>
-            </a:r>
-            <a:r>
-              <a:rPr lang="en-GB" dirty="0" smtClean="0"/>
-              <a:t>will be sent later)</a:t>
-            </a:r>
+              <a:t>.</a:t>
+            </a:r>
+            <a:endParaRPr lang="en-GB" dirty="0"/>
           </a:p>
         </p:txBody>
       </p:sp>
@@ -13092,7 +13051,7 @@
     </p:spTree>
     <p:extLst>
       <p:ext uri="{BB962C8B-B14F-4D97-AF65-F5344CB8AC3E}">
-        <p14:creationId xmlns:p14="http://schemas.microsoft.com/office/powerpoint/2010/main" val="4181811423"/>
+        <p14:creationId xmlns:p14="http://schemas.microsoft.com/office/powerpoint/2010/main" val="4048055160"/>
       </p:ext>
     </p:extLst>
   </p:cSld>
@@ -13181,77 +13140,68 @@
           <a:lstStyle/>
           <a:p>
             <a:r>
+              <a:rPr lang="da-DK" dirty="0"/>
+              <a:t>Course </a:t>
+            </a:r>
+            <a:r>
               <a:rPr lang="da-DK" dirty="0" smtClean="0"/>
-              <a:t>Whenever there are exceptional circumstances which prevent us to meet in person, course will be offered via internet</a:t>
-            </a:r>
-          </a:p>
-          <a:p>
+              <a:t>classification</a:t>
+            </a:r>
+          </a:p>
+          <a:p>
+            <a:pPr lvl="1"/>
             <a:r>
               <a:rPr lang="da-DK" dirty="0" smtClean="0"/>
-              <a:t>Software to be used for online lecturing:</a:t>
-            </a:r>
-          </a:p>
-          <a:p>
-            <a:pPr lvl="1"/>
-            <a:r>
-              <a:rPr lang="da-DK" dirty="0" smtClean="0"/>
-              <a:t>Zoom</a:t>
-            </a:r>
-            <a:r>
-              <a:rPr lang="da-DK" dirty="0"/>
-              <a:t>: </a:t>
-            </a:r>
+              <a:t>At the moment, classified as a ‘</a:t>
+            </a:r>
+            <a:r>
+              <a:rPr lang="en-GB" dirty="0" smtClean="0"/>
+              <a:t>Non-physics elective course’, </a:t>
+            </a:r>
+            <a:r>
+              <a:rPr lang="en-GB" dirty="0"/>
+              <a:t>open both to Bachelor and </a:t>
+            </a:r>
+            <a:r>
+              <a:rPr lang="en-GB" dirty="0" smtClean="0"/>
+              <a:t>Master students</a:t>
+            </a:r>
+          </a:p>
+          <a:p>
+            <a:pPr lvl="2"/>
             <a:r>
               <a:rPr lang="en-GB" dirty="0">
                 <a:hlinkClick r:id="rId2"/>
               </a:rPr>
-              <a:t>https://tum-conf.zoom.us</a:t>
-            </a:r>
-            <a:r>
-              <a:rPr lang="en-GB" dirty="0" smtClean="0">
-                <a:hlinkClick r:id="rId2"/>
-              </a:rPr>
-              <a:t>/</a:t>
+              <a:t>https://www.ph.tum.de/academics/msc/physics/nonphys/</a:t>
             </a:r>
             <a:r>
               <a:rPr lang="en-GB" dirty="0" smtClean="0"/>
               <a:t> </a:t>
             </a:r>
+            <a:endParaRPr lang="da-DK" dirty="0" smtClean="0"/>
+          </a:p>
+          <a:p>
             <a:r>
               <a:rPr lang="da-DK" dirty="0" smtClean="0"/>
-              <a:t>(licensed version!)</a:t>
-            </a:r>
+              <a:t>Course evaluation</a:t>
+            </a:r>
+            <a:endParaRPr lang="en-US" dirty="0" smtClean="0"/>
           </a:p>
           <a:p>
             <a:pPr lvl="1"/>
             <a:r>
-              <a:rPr lang="da-DK" dirty="0" smtClean="0"/>
-              <a:t>Vidyo: </a:t>
-            </a:r>
-            <a:r>
-              <a:rPr lang="en-GB" dirty="0">
-                <a:hlinkClick r:id="rId3"/>
-              </a:rPr>
-              <a:t>https://www.vidyo.com/</a:t>
-            </a:r>
-            <a:endParaRPr lang="da-DK" dirty="0" smtClean="0"/>
-          </a:p>
-          <a:p>
-            <a:r>
-              <a:rPr lang="da-DK" dirty="0" smtClean="0"/>
-              <a:t>Please install and familiarize yourself both with Zoom and Vidyo</a:t>
-            </a:r>
-          </a:p>
-          <a:p>
-            <a:pPr lvl="1"/>
-            <a:r>
-              <a:rPr lang="da-DK" dirty="0" smtClean="0"/>
-              <a:t>By default, we use Zoom</a:t>
-            </a:r>
-            <a:endParaRPr lang="da-DK" dirty="0"/>
-          </a:p>
-          <a:p>
-            <a:endParaRPr lang="da-DK" dirty="0" smtClean="0"/>
+              <a:rPr lang="en-GB" dirty="0" smtClean="0"/>
+              <a:t>At some point during the lecture, you will be asked to evaluate the quality of this course: Please, do it! (</a:t>
+            </a:r>
+            <a:r>
+              <a:rPr lang="en-GB" dirty="0"/>
+              <a:t>r</a:t>
+            </a:r>
+            <a:r>
+              <a:rPr lang="en-GB" dirty="0" smtClean="0"/>
+              <a:t>eminder will be sent later)</a:t>
+            </a:r>
           </a:p>
         </p:txBody>
       </p:sp>
@@ -13287,7 +13237,7 @@
     </p:spTree>
     <p:extLst>
       <p:ext uri="{BB962C8B-B14F-4D97-AF65-F5344CB8AC3E}">
-        <p14:creationId xmlns:p14="http://schemas.microsoft.com/office/powerpoint/2010/main" val="1118787847"/>
+        <p14:creationId xmlns:p14="http://schemas.microsoft.com/office/powerpoint/2010/main" val="4181811423"/>
       </p:ext>
     </p:extLst>
   </p:cSld>
@@ -13377,75 +13327,76 @@
           <a:p>
             <a:r>
               <a:rPr lang="da-DK" dirty="0" smtClean="0"/>
-              <a:t>No lecture on: </a:t>
+              <a:t>Whenever there are exceptional circumstances which prevent us to meet in person, course will be offered via internet</a:t>
+            </a:r>
+          </a:p>
+          <a:p>
+            <a:r>
+              <a:rPr lang="da-DK" dirty="0" smtClean="0"/>
+              <a:t>Software to be used for online lecturing:</a:t>
             </a:r>
           </a:p>
           <a:p>
             <a:pPr lvl="1"/>
             <a:r>
-              <a:rPr lang="da-DK" dirty="0" smtClean="0">
-                <a:solidFill>
-                  <a:srgbClr val="FF0000"/>
-                </a:solidFill>
+              <a:rPr lang="da-DK" dirty="0" smtClean="0"/>
+              <a:t>Zoom</a:t>
+            </a:r>
+            <a:r>
+              <a:rPr lang="da-DK" dirty="0"/>
+              <a:t>: </a:t>
+            </a:r>
+            <a:r>
+              <a:rPr lang="en-GB" dirty="0">
+                <a:hlinkClick r:id="rId2"/>
               </a:rPr>
-              <a:t>May </a:t>
-            </a:r>
-            <a:r>
-              <a:rPr lang="da-DK" dirty="0" smtClean="0">
-                <a:solidFill>
-                  <a:srgbClr val="FF0000"/>
-                </a:solidFill>
+              <a:t>https://tum-conf.zoom.us</a:t>
+            </a:r>
+            <a:r>
+              <a:rPr lang="en-GB" dirty="0" smtClean="0">
+                <a:hlinkClick r:id="rId2"/>
               </a:rPr>
-              <a:t>21</a:t>
-            </a:r>
-            <a:r>
-              <a:rPr lang="da-DK" dirty="0" smtClean="0">
-                <a:solidFill>
-                  <a:srgbClr val="FF0000"/>
-                </a:solidFill>
+              <a:t>/</a:t>
+            </a:r>
+            <a:r>
+              <a:rPr lang="en-GB" dirty="0" smtClean="0"/>
+              <a:t> </a:t>
+            </a:r>
+            <a:r>
+              <a:rPr lang="da-DK" dirty="0" smtClean="0"/>
+              <a:t>(licensed version!)</a:t>
+            </a:r>
+          </a:p>
+          <a:p>
+            <a:pPr lvl="1"/>
+            <a:r>
+              <a:rPr lang="da-DK" dirty="0" smtClean="0"/>
+              <a:t>Vidyo: </a:t>
+            </a:r>
+            <a:r>
+              <a:rPr lang="en-GB" dirty="0">
+                <a:hlinkClick r:id="rId3"/>
               </a:rPr>
-              <a:t>st </a:t>
-            </a:r>
-            <a:r>
-              <a:rPr lang="da-DK" dirty="0" smtClean="0">
-                <a:solidFill>
-                  <a:srgbClr val="FF0000"/>
-                </a:solidFill>
-              </a:rPr>
-              <a:t>– Ascension Day</a:t>
+              <a:t>https://www.vidyo.com/</a:t>
+            </a:r>
+            <a:endParaRPr lang="da-DK" dirty="0" smtClean="0"/>
+          </a:p>
+          <a:p>
+            <a:r>
+              <a:rPr lang="da-DK" dirty="0" smtClean="0"/>
+              <a:t>Please install and familiarize yourself both with Zoom and Vidyo</a:t>
             </a:r>
           </a:p>
           <a:p>
             <a:pPr lvl="1"/>
             <a:r>
-              <a:rPr lang="da-DK" dirty="0" smtClean="0">
-                <a:solidFill>
-                  <a:srgbClr val="FF0000"/>
-                </a:solidFill>
-              </a:rPr>
-              <a:t>June 11th </a:t>
-            </a:r>
-            <a:r>
-              <a:rPr lang="da-DK" dirty="0" smtClean="0">
-                <a:solidFill>
-                  <a:srgbClr val="FF0000"/>
-                </a:solidFill>
-              </a:rPr>
-              <a:t>– Corpus </a:t>
-            </a:r>
-            <a:r>
-              <a:rPr lang="da-DK" dirty="0" smtClean="0">
-                <a:solidFill>
-                  <a:srgbClr val="FF0000"/>
-                </a:solidFill>
-              </a:rPr>
-              <a:t>Christi</a:t>
-            </a:r>
-            <a:endParaRPr lang="da-DK" dirty="0" smtClean="0">
-              <a:solidFill>
-                <a:srgbClr val="FF0000"/>
-              </a:solidFill>
-            </a:endParaRPr>
+              <a:rPr lang="da-DK" dirty="0" smtClean="0"/>
+              <a:t>By default, we use Zoom</a:t>
+            </a:r>
+            <a:endParaRPr lang="da-DK" dirty="0"/>
+          </a:p>
+          <a:p>
+            <a:endParaRPr lang="da-DK" dirty="0" smtClean="0"/>
           </a:p>
         </p:txBody>
       </p:sp>
@@ -13481,7 +13432,7 @@
     </p:spTree>
     <p:extLst>
       <p:ext uri="{BB962C8B-B14F-4D97-AF65-F5344CB8AC3E}">
-        <p14:creationId xmlns:p14="http://schemas.microsoft.com/office/powerpoint/2010/main" val="3925187551"/>
+        <p14:creationId xmlns:p14="http://schemas.microsoft.com/office/powerpoint/2010/main" val="1118787847"/>
       </p:ext>
     </p:extLst>
   </p:cSld>

</xml_diff>

<commit_message>
small update in the slides
</commit_message>
<xml_diff>
--- a/Lecture_1/ABilandzic_PH8124_SS2020_0c.pptx
+++ b/Lecture_1/ABilandzic_PH8124_SS2020_0c.pptx
@@ -333,7 +333,7 @@
           <a:p>
             <a:fld id="{F929CBCE-E64B-4074-AF48-7FACC033E4C9}" type="datetimeFigureOut">
               <a:rPr lang="en-US" smtClean="0"/>
-              <a:t>4/16/2020</a:t>
+              <a:t>4/20/2020</a:t>
             </a:fld>
             <a:endParaRPr lang="en-US"/>
           </a:p>
@@ -6026,7 +6026,7 @@
           <a:p>
             <a:r>
               <a:rPr lang="da-DK" b="1" dirty="0" smtClean="0"/>
-              <a:t>Introduction</a:t>
+              <a:t>Free adverts</a:t>
             </a:r>
             <a:endParaRPr lang="en-US" b="1" dirty="0"/>
           </a:p>
@@ -6907,7 +6907,11 @@
             <a:pPr lvl="1"/>
             <a:r>
               <a:rPr lang="en-GB" dirty="0"/>
-              <a:t>install Ubuntu </a:t>
+              <a:t>install </a:t>
+            </a:r>
+            <a:r>
+              <a:rPr lang="en-GB" dirty="0" smtClean="0"/>
+              <a:t>Ubuntu on Windows </a:t>
             </a:r>
             <a:r>
               <a:rPr lang="en-GB" dirty="0" smtClean="0"/>
@@ -7217,13 +7221,7 @@
               <a:rPr lang="en-GB" dirty="0" smtClean="0">
                 <a:effectLst/>
               </a:rPr>
-              <a:t>, </a:t>
-            </a:r>
-            <a:r>
-              <a:rPr lang="en-GB" dirty="0" smtClean="0">
-                <a:effectLst/>
-              </a:rPr>
-              <a:t>on which </a:t>
+              <a:t>, on which </a:t>
             </a:r>
             <a:r>
               <a:rPr lang="en-GB" dirty="0">
@@ -7351,7 +7349,11 @@
             <a:pPr lvl="1"/>
             <a:r>
               <a:rPr lang="en-GB" dirty="0" smtClean="0"/>
-              <a:t>If, after you have opened a terminal in Linux, </a:t>
+              <a:t>If, after you have opened a terminal in </a:t>
+            </a:r>
+            <a:r>
+              <a:rPr lang="en-GB" dirty="0" smtClean="0"/>
+              <a:t>Linux </a:t>
             </a:r>
             <a:r>
               <a:rPr lang="en-DE" dirty="0" smtClean="0"/>
@@ -7979,14 +7981,46 @@
           <a:p>
             <a:r>
               <a:rPr lang="da-DK" dirty="0" smtClean="0"/>
-              <a:t>Since ‘bash’ is the default shell on most Linux distributions nowadays, we focus on it</a:t>
+              <a:t>Since </a:t>
+            </a:r>
+            <a:r>
+              <a:rPr lang="da-DK" dirty="0" smtClean="0"/>
+              <a:t>Bash </a:t>
+            </a:r>
+            <a:r>
+              <a:rPr lang="da-DK" dirty="0" smtClean="0"/>
+              <a:t>is the default shell on most Linux distributions nowadays, we focus on it</a:t>
             </a:r>
           </a:p>
           <a:p>
             <a:pPr lvl="1"/>
             <a:r>
               <a:rPr lang="da-DK" dirty="0" smtClean="0"/>
-              <a:t>If not set by default, just type ‘bash’ in the terminal, and you are in the ‘bash’ wonderland </a:t>
+              <a:t>If not set by default, just type </a:t>
+            </a:r>
+            <a:r>
+              <a:rPr lang="da-DK" b="1" dirty="0" smtClean="0"/>
+              <a:t>bash</a:t>
+            </a:r>
+            <a:r>
+              <a:rPr lang="da-DK" dirty="0" smtClean="0"/>
+              <a:t> </a:t>
+            </a:r>
+            <a:r>
+              <a:rPr lang="da-DK" dirty="0" smtClean="0"/>
+              <a:t>in the terminal, and you are in the </a:t>
+            </a:r>
+            <a:r>
+              <a:rPr lang="da-DK" dirty="0"/>
+              <a:t>B</a:t>
+            </a:r>
+            <a:r>
+              <a:rPr lang="da-DK" dirty="0" smtClean="0"/>
+              <a:t>ash </a:t>
+            </a:r>
+            <a:r>
+              <a:rPr lang="da-DK" dirty="0" smtClean="0"/>
+              <a:t>wonderland </a:t>
             </a:r>
           </a:p>
         </p:txBody>
@@ -8152,20 +8186,38 @@
           <a:p>
             <a:r>
               <a:rPr lang="da-DK" dirty="0" smtClean="0"/>
-              <a:t>Trivia</a:t>
-            </a:r>
+              <a:t>Course trivia</a:t>
+            </a:r>
+            <a:endParaRPr lang="da-DK" dirty="0" smtClean="0"/>
           </a:p>
           <a:p>
             <a:r>
               <a:rPr lang="da-DK" dirty="0" smtClean="0"/>
-              <a:t>Introduction</a:t>
-            </a:r>
-          </a:p>
-          <a:p>
+              <a:t>Free adverts</a:t>
+            </a:r>
+            <a:endParaRPr lang="da-DK" dirty="0" smtClean="0"/>
+          </a:p>
+          <a:p>
+            <a:pPr lvl="1"/>
             <a:r>
               <a:rPr lang="da-DK" dirty="0" smtClean="0"/>
-              <a:t>Hands-on: Taking off</a:t>
-            </a:r>
+              <a:t>Linux</a:t>
+            </a:r>
+          </a:p>
+          <a:p>
+            <a:pPr lvl="1"/>
+            <a:r>
+              <a:rPr lang="da-DK" dirty="0" smtClean="0"/>
+              <a:t>Bash</a:t>
+            </a:r>
+          </a:p>
+          <a:p>
+            <a:pPr lvl="1"/>
+            <a:r>
+              <a:rPr lang="da-DK" dirty="0" smtClean="0"/>
+              <a:t>ROOT</a:t>
+            </a:r>
+            <a:endParaRPr lang="da-DK" dirty="0" smtClean="0"/>
           </a:p>
           <a:p>
             <a:endParaRPr lang="da-DK" dirty="0"/>
@@ -8495,7 +8547,11 @@
             </a:r>
             <a:r>
               <a:rPr lang="en-US" sz="3200" b="1" dirty="0" smtClean="0"/>
-              <a:t>‘bash’ history</a:t>
+              <a:t>Bash </a:t>
+            </a:r>
+            <a:r>
+              <a:rPr lang="en-US" sz="3200" b="1" dirty="0" smtClean="0"/>
+              <a:t>history</a:t>
             </a:r>
             <a:r>
               <a:rPr lang="en-US" sz="3200" b="1" dirty="0"/>
@@ -8537,7 +8593,11 @@
           <a:p>
             <a:r>
               <a:rPr lang="da-DK" dirty="0" smtClean="0"/>
-              <a:t>‘bash’ is an acronym for ‘Bourne-again shell</a:t>
+              <a:t>Bash </a:t>
+            </a:r>
+            <a:r>
+              <a:rPr lang="da-DK" dirty="0" smtClean="0"/>
+              <a:t>is an acronym for ‘Bourne-again shell</a:t>
             </a:r>
             <a:r>
               <a:rPr lang="da-DK" dirty="0"/>
@@ -8748,7 +8808,15 @@
           <a:p>
             <a:r>
               <a:rPr lang="en-US" sz="3200" b="1" dirty="0" smtClean="0"/>
-              <a:t>‘bash’ current status</a:t>
+              <a:t>The </a:t>
+            </a:r>
+            <a:r>
+              <a:rPr lang="en-US" sz="3200" b="1" dirty="0" smtClean="0"/>
+              <a:t>current </a:t>
+            </a:r>
+            <a:r>
+              <a:rPr lang="en-US" sz="3200" b="1" dirty="0" smtClean="0"/>
+              <a:t>status of Bash</a:t>
             </a:r>
             <a:r>
               <a:rPr lang="en-US" sz="3200" b="1" dirty="0"/>
@@ -8784,7 +8852,19 @@
           <a:p>
             <a:r>
               <a:rPr lang="da-DK" dirty="0" smtClean="0"/>
-              <a:t>‘bash’ is well maintained and still under development</a:t>
+              <a:t>Bash </a:t>
+            </a:r>
+            <a:r>
+              <a:rPr lang="da-DK" dirty="0" smtClean="0"/>
+              <a:t>is well maintained </a:t>
+            </a:r>
+            <a:r>
+              <a:rPr lang="da-DK" dirty="0" smtClean="0"/>
+              <a:t>and is </a:t>
+            </a:r>
+            <a:r>
+              <a:rPr lang="da-DK" dirty="0" smtClean="0"/>
+              <a:t>still under development</a:t>
             </a:r>
           </a:p>
           <a:p>
@@ -9038,7 +9118,19 @@
           <a:p>
             <a:r>
               <a:rPr lang="en-US" sz="3200" b="1" dirty="0" smtClean="0"/>
-              <a:t>Testing ‘bash’ code online</a:t>
+              <a:t>Testing </a:t>
+            </a:r>
+            <a:r>
+              <a:rPr lang="en-US" sz="3200" b="1" dirty="0" smtClean="0"/>
+              <a:t>Bash </a:t>
+            </a:r>
+            <a:r>
+              <a:rPr lang="en-US" sz="3200" b="1" dirty="0" smtClean="0"/>
+              <a:t>code </a:t>
+            </a:r>
+            <a:r>
+              <a:rPr lang="en-US" sz="3200" b="1" dirty="0" smtClean="0"/>
+              <a:t>online?</a:t>
             </a:r>
             <a:endParaRPr lang="en-US" sz="3200" b="1" dirty="0">
               <a:effectLst/>
@@ -9074,7 +9166,15 @@
             </a:r>
             <a:r>
               <a:rPr lang="da-DK" dirty="0" smtClean="0"/>
-              <a:t>the machine running Linux, you can test your ‘bash’ code online</a:t>
+              <a:t>the machine running Linux, you can test your </a:t>
+            </a:r>
+            <a:r>
+              <a:rPr lang="da-DK" dirty="0" smtClean="0"/>
+              <a:t>Bash </a:t>
+            </a:r>
+            <a:r>
+              <a:rPr lang="da-DK" dirty="0" smtClean="0"/>
+              <a:t>code online</a:t>
             </a:r>
           </a:p>
           <a:p>
@@ -9549,7 +9649,15 @@
             <a:pPr lvl="1"/>
             <a:r>
               <a:rPr lang="da-DK" dirty="0" smtClean="0"/>
-              <a:t>Examples: bash, Python, Mathematica</a:t>
+              <a:t>Examples: </a:t>
+            </a:r>
+            <a:r>
+              <a:rPr lang="da-DK" dirty="0" smtClean="0"/>
+              <a:t>Bash</a:t>
+            </a:r>
+            <a:r>
+              <a:rPr lang="da-DK" dirty="0" smtClean="0"/>
+              <a:t>, Python, Mathematica</a:t>
             </a:r>
           </a:p>
           <a:p>
@@ -9797,7 +9905,11 @@
             <a:pPr lvl="1"/>
             <a:r>
               <a:rPr lang="en-GB" dirty="0" smtClean="0"/>
-              <a:t>If you have ever asked yourself what is the software in which the Higgs discovery plots were actually made</a:t>
+              <a:t>If you have ever asked yourself what is the software in which the Higgs discovery plots were actually </a:t>
+            </a:r>
+            <a:r>
+              <a:rPr lang="en-GB" dirty="0" smtClean="0"/>
+              <a:t>made </a:t>
             </a:r>
             <a:r>
               <a:rPr lang="en-DE" dirty="0" smtClean="0"/>
@@ -10981,7 +11093,11 @@
           <a:p>
             <a:r>
               <a:rPr lang="da-DK" sz="3200" b="1" dirty="0" smtClean="0"/>
-              <a:t>Trivia</a:t>
+              <a:t>Course t</a:t>
+            </a:r>
+            <a:r>
+              <a:rPr lang="da-DK" sz="3200" b="1" dirty="0" smtClean="0"/>
+              <a:t>rivia</a:t>
             </a:r>
             <a:endParaRPr lang="en-US" sz="3200" dirty="0"/>
           </a:p>
@@ -12020,7 +12136,7 @@
           <a:p>
             <a:r>
               <a:rPr lang="da-DK" sz="3200" b="1" dirty="0" smtClean="0"/>
-              <a:t>Webpage</a:t>
+              <a:t>Webpage TBI</a:t>
             </a:r>
             <a:endParaRPr lang="en-US" sz="3200" dirty="0"/>
           </a:p>
@@ -12183,8 +12299,12 @@
           <a:lstStyle/>
           <a:p>
             <a:r>
+              <a:rPr lang="da-DK" sz="3200" b="1" dirty="0"/>
+              <a:t>Course </a:t>
+            </a:r>
+            <a:r>
               <a:rPr lang="da-DK" sz="3200" b="1" dirty="0" smtClean="0"/>
-              <a:t>Trivia</a:t>
+              <a:t>trivia</a:t>
             </a:r>
             <a:endParaRPr lang="en-US" sz="3200" dirty="0"/>
           </a:p>
@@ -12214,27 +12334,7 @@
           <a:p>
             <a:r>
               <a:rPr lang="en-US" dirty="0" smtClean="0"/>
-              <a:t>After each lecture</a:t>
-            </a:r>
-            <a:r>
-              <a:rPr lang="en-US" dirty="0" smtClean="0"/>
-              <a:t>, executive summary </a:t>
-            </a:r>
-            <a:r>
-              <a:rPr lang="en-US" dirty="0" smtClean="0"/>
-              <a:t>of </a:t>
-            </a:r>
-            <a:r>
-              <a:rPr lang="en-US" dirty="0" smtClean="0"/>
-              <a:t>the covered material will </a:t>
-            </a:r>
-            <a:r>
-              <a:rPr lang="en-US" dirty="0" smtClean="0"/>
-              <a:t>be shared via email via official TUM online interface for this </a:t>
-            </a:r>
-            <a:r>
-              <a:rPr lang="en-US" dirty="0" smtClean="0"/>
-              <a:t>course</a:t>
+              <a:t>After each lecture, executive summary of the covered material will be shared via email via official TUM online interface for this course</a:t>
             </a:r>
           </a:p>
           <a:p>
@@ -12242,16 +12342,11 @@
               <a:rPr lang="en-US" dirty="0" smtClean="0"/>
               <a:t>The course webpage will be updated regularly</a:t>
             </a:r>
-            <a:endParaRPr lang="en-US" dirty="0" smtClean="0"/>
           </a:p>
           <a:p>
             <a:r>
               <a:rPr lang="en-GB" dirty="0" smtClean="0"/>
-              <a:t>In </a:t>
-            </a:r>
-            <a:r>
-              <a:rPr lang="en-GB" dirty="0" smtClean="0"/>
-              <a:t>the same way, I will also share the homework exercises</a:t>
+              <a:t>In the same way, I will also share the homework exercises</a:t>
             </a:r>
             <a:endParaRPr lang="en-US" dirty="0" smtClean="0"/>
           </a:p>
@@ -12453,8 +12548,12 @@
           <a:lstStyle/>
           <a:p>
             <a:r>
+              <a:rPr lang="da-DK" sz="3200" b="1" dirty="0"/>
+              <a:t>Course </a:t>
+            </a:r>
+            <a:r>
               <a:rPr lang="da-DK" sz="3200" b="1" dirty="0" smtClean="0"/>
-              <a:t>Trivia</a:t>
+              <a:t>trivia</a:t>
             </a:r>
             <a:endParaRPr lang="en-US" sz="3200" dirty="0"/>
           </a:p>
@@ -12760,7 +12859,13 @@
               <a:rPr lang="da-DK" dirty="0" smtClean="0">
                 <a:effectLst/>
               </a:rPr>
-              <a:t>List of topics for the final programming project will be offered at some point towards the end of the lecture</a:t>
+              <a:t>The topic </a:t>
+            </a:r>
+            <a:r>
+              <a:rPr lang="da-DK" dirty="0" smtClean="0">
+                <a:effectLst/>
+              </a:rPr>
+              <a:t>for the final programming project will be offered at some point towards the end of the lecture</a:t>
             </a:r>
           </a:p>
           <a:p>
@@ -12910,10 +13015,18 @@
           <a:lstStyle/>
           <a:p>
             <a:r>
-              <a:rPr lang="en-US" sz="3200" b="1" dirty="0" smtClean="0">
+              <a:rPr lang="da-DK" sz="3200" b="1" dirty="0"/>
+              <a:t>Course </a:t>
+            </a:r>
+            <a:r>
+              <a:rPr lang="da-DK" sz="3200" b="1" dirty="0" smtClean="0"/>
+              <a:t>t</a:t>
+            </a:r>
+            <a:r>
+              <a:rPr lang="en-US" sz="3200" b="1" dirty="0" err="1" smtClean="0">
                 <a:effectLst/>
               </a:rPr>
-              <a:t>Trivia</a:t>
+              <a:t>rivia</a:t>
             </a:r>
             <a:endParaRPr lang="en-US" sz="3200" dirty="0"/>
           </a:p>
@@ -13108,10 +13221,18 @@
           <a:lstStyle/>
           <a:p>
             <a:r>
-              <a:rPr lang="en-US" sz="3200" b="1" dirty="0" smtClean="0">
+              <a:rPr lang="da-DK" sz="3200" b="1" dirty="0"/>
+              <a:t>Course </a:t>
+            </a:r>
+            <a:r>
+              <a:rPr lang="da-DK" sz="3200" b="1" dirty="0" smtClean="0"/>
+              <a:t>t</a:t>
+            </a:r>
+            <a:r>
+              <a:rPr lang="en-US" sz="3200" b="1" dirty="0" err="1" smtClean="0">
                 <a:effectLst/>
               </a:rPr>
-              <a:t>Trivia</a:t>
+              <a:t>rivia</a:t>
             </a:r>
             <a:endParaRPr lang="en-US" sz="3200" dirty="0"/>
           </a:p>
@@ -13297,7 +13418,7 @@
               <a:rPr lang="en-US" sz="3200" b="1" dirty="0" smtClean="0">
                 <a:effectLst/>
               </a:rPr>
-              <a:t>Trivia</a:t>
+              <a:t>Software for online lecturing</a:t>
             </a:r>
             <a:endParaRPr lang="en-US" sz="3200" dirty="0"/>
           </a:p>
@@ -13364,7 +13485,15 @@
             </a:r>
             <a:r>
               <a:rPr lang="da-DK" dirty="0" smtClean="0"/>
-              <a:t>(licensed version!)</a:t>
+              <a:t>(</a:t>
+            </a:r>
+            <a:r>
+              <a:rPr lang="da-DK" dirty="0" smtClean="0"/>
+              <a:t>licensed TUM </a:t>
+            </a:r>
+            <a:r>
+              <a:rPr lang="da-DK" dirty="0" smtClean="0"/>
+              <a:t>version!)</a:t>
             </a:r>
           </a:p>
           <a:p>
@@ -13384,14 +13513,38 @@
           <a:p>
             <a:r>
               <a:rPr lang="da-DK" dirty="0" smtClean="0"/>
-              <a:t>Please install and familiarize yourself both with Zoom and Vidyo</a:t>
-            </a:r>
+              <a:t>Please install and familiarize yourself </a:t>
+            </a:r>
+            <a:r>
+              <a:rPr lang="da-DK" dirty="0" smtClean="0"/>
+              <a:t>with Zoom</a:t>
+            </a:r>
+            <a:endParaRPr lang="da-DK" dirty="0" smtClean="0"/>
           </a:p>
           <a:p>
             <a:pPr lvl="1"/>
             <a:r>
               <a:rPr lang="da-DK" dirty="0" smtClean="0"/>
-              <a:t>By default, we use Zoom</a:t>
+              <a:t>By </a:t>
+            </a:r>
+            <a:r>
+              <a:rPr lang="da-DK" dirty="0" smtClean="0"/>
+              <a:t>default, we will </a:t>
+            </a:r>
+            <a:r>
+              <a:rPr lang="da-DK" dirty="0" smtClean="0"/>
+              <a:t>use </a:t>
+            </a:r>
+            <a:r>
+              <a:rPr lang="da-DK" dirty="0" smtClean="0"/>
+              <a:t>Zoom</a:t>
+            </a:r>
+          </a:p>
+          <a:p>
+            <a:pPr lvl="1"/>
+            <a:r>
+              <a:rPr lang="da-DK" dirty="0" smtClean="0"/>
+              <a:t>If Zoom gets overloaded, as Plan B I will send you a direct link to join the online meeting in Vidyo </a:t>
             </a:r>
             <a:endParaRPr lang="da-DK" dirty="0"/>
           </a:p>

</xml_diff>

<commit_message>
Lecture 1, updated CERNBox link
</commit_message>
<xml_diff>
--- a/Lecture_1/ABilandzic_PH8124_SS2020_0c.pptx
+++ b/Lecture_1/ABilandzic_PH8124_SS2020_0c.pptx
@@ -12136,7 +12136,7 @@
           <a:p>
             <a:r>
               <a:rPr lang="da-DK" sz="3200" b="1" dirty="0" smtClean="0"/>
-              <a:t>Webpage TBI</a:t>
+              <a:t>Webpage</a:t>
             </a:r>
             <a:endParaRPr lang="en-US" sz="3200" dirty="0"/>
           </a:p>
@@ -12217,7 +12217,7 @@
       </p:sp>
       <p:pic>
         <p:nvPicPr>
-          <p:cNvPr id="8" name="Picture 7"/>
+          <p:cNvPr id="5" name="Picture 4"/>
           <p:cNvPicPr>
             <a:picLocks noChangeAspect="1"/>
           </p:cNvPicPr>
@@ -12231,8 +12231,8 @@
         </p:blipFill>
         <p:spPr>
           <a:xfrm>
-            <a:off x="986311" y="2286000"/>
-            <a:ext cx="7167089" cy="4328303"/>
+            <a:off x="904958" y="2286000"/>
+            <a:ext cx="7172242" cy="4454131"/>
           </a:xfrm>
           <a:prstGeom prst="rect">
             <a:avLst/>

</xml_diff>